<commit_message>
Po přidání pár slidů s jeho možná ne moc důležitým využitím
</commit_message>
<xml_diff>
--- a/Linux.pptx
+++ b/Linux.pptx
@@ -5,7 +5,7 @@
     <p:sldMasterId id="2147483673" r:id="rId1"/>
   </p:sldMasterIdLst>
   <p:notesMasterIdLst>
-    <p:notesMasterId r:id="rId9"/>
+    <p:notesMasterId r:id="rId14"/>
   </p:notesMasterIdLst>
   <p:sldIdLst>
     <p:sldId id="256" r:id="rId2"/>
@@ -15,6 +15,11 @@
     <p:sldId id="260" r:id="rId6"/>
     <p:sldId id="261" r:id="rId7"/>
     <p:sldId id="262" r:id="rId8"/>
+    <p:sldId id="267" r:id="rId9"/>
+    <p:sldId id="263" r:id="rId10"/>
+    <p:sldId id="264" r:id="rId11"/>
+    <p:sldId id="265" r:id="rId12"/>
+    <p:sldId id="266" r:id="rId13"/>
   </p:sldIdLst>
   <p:sldSz cx="12192000" cy="6858000"/>
   <p:notesSz cx="6858000" cy="9144000"/>
@@ -8061,7 +8066,7 @@
           <a:p>
             <a:fld id="{B3EDDFD5-A815-42F4-BC94-04648630B084}" type="datetimeFigureOut">
               <a:rPr lang="cs-CZ" smtClean="0"/>
-              <a:t>01.01.2023</a:t>
+              <a:t>03.01.2023</a:t>
             </a:fld>
             <a:endParaRPr lang="cs-CZ"/>
           </a:p>
@@ -8470,7 +8475,7 @@
           <a:p>
             <a:r>
               <a:rPr lang="cs-CZ" dirty="0"/>
-              <a:t>Podle tabulky ze serveru stacksxale.com Linux používají asi 7 nebo 8 z 10 uvedených příkladů</a:t>
+              <a:t>Podle tabulky ze serveru stacksxale.com Linux používají všech 10 uvedených příkladů</a:t>
             </a:r>
           </a:p>
         </p:txBody>
@@ -8502,6 +8507,299 @@
     <p:extLst>
       <p:ext uri="{BB962C8B-B14F-4D97-AF65-F5344CB8AC3E}">
         <p14:creationId xmlns:p14="http://schemas.microsoft.com/office/powerpoint/2010/main" val="2801908620"/>
+      </p:ext>
+    </p:extLst>
+  </p:cSld>
+  <p:clrMapOvr>
+    <a:masterClrMapping/>
+  </p:clrMapOvr>
+</p:notes>
+</file>
+
+<file path=ppt/notesSlides/notesSlide3.xml><?xml version="1.0" encoding="utf-8"?>
+<p:notes xmlns:a="http://schemas.openxmlformats.org/drawingml/2006/main" xmlns:r="http://schemas.openxmlformats.org/officeDocument/2006/relationships" xmlns:p="http://schemas.openxmlformats.org/presentationml/2006/main">
+  <p:cSld>
+    <p:spTree>
+      <p:nvGrpSpPr>
+        <p:cNvPr id="1" name=""/>
+        <p:cNvGrpSpPr/>
+        <p:nvPr/>
+      </p:nvGrpSpPr>
+      <p:grpSpPr>
+        <a:xfrm>
+          <a:off x="0" y="0"/>
+          <a:ext cx="0" cy="0"/>
+          <a:chOff x="0" y="0"/>
+          <a:chExt cx="0" cy="0"/>
+        </a:xfrm>
+      </p:grpSpPr>
+      <p:sp>
+        <p:nvSpPr>
+          <p:cNvPr id="2" name="Slide Image Placeholder 1"/>
+          <p:cNvSpPr>
+            <a:spLocks noGrp="1" noRot="1" noChangeAspect="1"/>
+          </p:cNvSpPr>
+          <p:nvPr>
+            <p:ph type="sldImg"/>
+          </p:nvPr>
+        </p:nvSpPr>
+        <p:spPr/>
+      </p:sp>
+      <p:sp>
+        <p:nvSpPr>
+          <p:cNvPr id="3" name="Notes Placeholder 2"/>
+          <p:cNvSpPr>
+            <a:spLocks noGrp="1"/>
+          </p:cNvSpPr>
+          <p:nvPr>
+            <p:ph type="body" idx="1"/>
+          </p:nvPr>
+        </p:nvSpPr>
+        <p:spPr/>
+        <p:txBody>
+          <a:bodyPr/>
+          <a:lstStyle/>
+          <a:p>
+            <a:r>
+              <a:rPr lang="cs-CZ" dirty="0"/>
+              <a:t>Co si budeme povídat, lepší je mít funkční počítač pro základní věci než funkční počítač.</a:t>
+            </a:r>
+          </a:p>
+        </p:txBody>
+      </p:sp>
+      <p:sp>
+        <p:nvSpPr>
+          <p:cNvPr id="4" name="Slide Number Placeholder 3"/>
+          <p:cNvSpPr>
+            <a:spLocks noGrp="1"/>
+          </p:cNvSpPr>
+          <p:nvPr>
+            <p:ph type="sldNum" sz="quarter" idx="5"/>
+          </p:nvPr>
+        </p:nvSpPr>
+        <p:spPr/>
+        <p:txBody>
+          <a:bodyPr/>
+          <a:lstStyle/>
+          <a:p>
+            <a:fld id="{D252E0EA-6D0E-4413-B5B0-00C1F5DDE783}" type="slidenum">
+              <a:rPr lang="cs-CZ" smtClean="0"/>
+              <a:t>8</a:t>
+            </a:fld>
+            <a:endParaRPr lang="cs-CZ"/>
+          </a:p>
+        </p:txBody>
+      </p:sp>
+    </p:spTree>
+    <p:extLst>
+      <p:ext uri="{BB962C8B-B14F-4D97-AF65-F5344CB8AC3E}">
+        <p14:creationId xmlns:p14="http://schemas.microsoft.com/office/powerpoint/2010/main" val="462965987"/>
+      </p:ext>
+    </p:extLst>
+  </p:cSld>
+  <p:clrMapOvr>
+    <a:masterClrMapping/>
+  </p:clrMapOvr>
+</p:notes>
+</file>
+
+<file path=ppt/notesSlides/notesSlide4.xml><?xml version="1.0" encoding="utf-8"?>
+<p:notes xmlns:a="http://schemas.openxmlformats.org/drawingml/2006/main" xmlns:r="http://schemas.openxmlformats.org/officeDocument/2006/relationships" xmlns:p="http://schemas.openxmlformats.org/presentationml/2006/main">
+  <p:cSld>
+    <p:spTree>
+      <p:nvGrpSpPr>
+        <p:cNvPr id="1" name=""/>
+        <p:cNvGrpSpPr/>
+        <p:nvPr/>
+      </p:nvGrpSpPr>
+      <p:grpSpPr>
+        <a:xfrm>
+          <a:off x="0" y="0"/>
+          <a:ext cx="0" cy="0"/>
+          <a:chOff x="0" y="0"/>
+          <a:chExt cx="0" cy="0"/>
+        </a:xfrm>
+      </p:grpSpPr>
+      <p:sp>
+        <p:nvSpPr>
+          <p:cNvPr id="2" name="Slide Image Placeholder 1"/>
+          <p:cNvSpPr>
+            <a:spLocks noGrp="1" noRot="1" noChangeAspect="1"/>
+          </p:cNvSpPr>
+          <p:nvPr>
+            <p:ph type="sldImg"/>
+          </p:nvPr>
+        </p:nvSpPr>
+        <p:spPr/>
+      </p:sp>
+      <p:sp>
+        <p:nvSpPr>
+          <p:cNvPr id="3" name="Notes Placeholder 2"/>
+          <p:cNvSpPr>
+            <a:spLocks noGrp="1"/>
+          </p:cNvSpPr>
+          <p:nvPr>
+            <p:ph type="body" idx="1"/>
+          </p:nvPr>
+        </p:nvSpPr>
+        <p:spPr/>
+        <p:txBody>
+          <a:bodyPr/>
+          <a:lstStyle/>
+          <a:p>
+            <a:r>
+              <a:rPr lang="cs-CZ" dirty="0"/>
+              <a:t>Lze také třeba ovládat žaluzie a klimatizaci, </a:t>
+            </a:r>
+            <a:r>
+              <a:rPr lang="cs-CZ" dirty="0" err="1"/>
+              <a:t>streamovat</a:t>
+            </a:r>
+            <a:r>
+              <a:rPr lang="cs-CZ" dirty="0"/>
+              <a:t> hudbu, udělat </a:t>
+            </a:r>
+            <a:r>
+              <a:rPr lang="cs-CZ" dirty="0" err="1"/>
+              <a:t>fotorámeček</a:t>
+            </a:r>
+            <a:r>
+              <a:rPr lang="cs-CZ" dirty="0"/>
+              <a:t> vlastně na všechno co si vzpomenete</a:t>
+            </a:r>
+          </a:p>
+        </p:txBody>
+      </p:sp>
+      <p:sp>
+        <p:nvSpPr>
+          <p:cNvPr id="4" name="Slide Number Placeholder 3"/>
+          <p:cNvSpPr>
+            <a:spLocks noGrp="1"/>
+          </p:cNvSpPr>
+          <p:nvPr>
+            <p:ph type="sldNum" sz="quarter" idx="5"/>
+          </p:nvPr>
+        </p:nvSpPr>
+        <p:spPr/>
+        <p:txBody>
+          <a:bodyPr/>
+          <a:lstStyle/>
+          <a:p>
+            <a:fld id="{D252E0EA-6D0E-4413-B5B0-00C1F5DDE783}" type="slidenum">
+              <a:rPr lang="cs-CZ" smtClean="0"/>
+              <a:t>10</a:t>
+            </a:fld>
+            <a:endParaRPr lang="cs-CZ"/>
+          </a:p>
+        </p:txBody>
+      </p:sp>
+    </p:spTree>
+    <p:extLst>
+      <p:ext uri="{BB962C8B-B14F-4D97-AF65-F5344CB8AC3E}">
+        <p14:creationId xmlns:p14="http://schemas.microsoft.com/office/powerpoint/2010/main" val="2554736740"/>
+      </p:ext>
+    </p:extLst>
+  </p:cSld>
+  <p:clrMapOvr>
+    <a:masterClrMapping/>
+  </p:clrMapOvr>
+</p:notes>
+</file>
+
+<file path=ppt/notesSlides/notesSlide5.xml><?xml version="1.0" encoding="utf-8"?>
+<p:notes xmlns:a="http://schemas.openxmlformats.org/drawingml/2006/main" xmlns:r="http://schemas.openxmlformats.org/officeDocument/2006/relationships" xmlns:p="http://schemas.openxmlformats.org/presentationml/2006/main">
+  <p:cSld>
+    <p:spTree>
+      <p:nvGrpSpPr>
+        <p:cNvPr id="1" name=""/>
+        <p:cNvGrpSpPr/>
+        <p:nvPr/>
+      </p:nvGrpSpPr>
+      <p:grpSpPr>
+        <a:xfrm>
+          <a:off x="0" y="0"/>
+          <a:ext cx="0" cy="0"/>
+          <a:chOff x="0" y="0"/>
+          <a:chExt cx="0" cy="0"/>
+        </a:xfrm>
+      </p:grpSpPr>
+      <p:sp>
+        <p:nvSpPr>
+          <p:cNvPr id="2" name="Slide Image Placeholder 1"/>
+          <p:cNvSpPr>
+            <a:spLocks noGrp="1" noRot="1" noChangeAspect="1"/>
+          </p:cNvSpPr>
+          <p:nvPr>
+            <p:ph type="sldImg"/>
+          </p:nvPr>
+        </p:nvSpPr>
+        <p:spPr/>
+      </p:sp>
+      <p:sp>
+        <p:nvSpPr>
+          <p:cNvPr id="3" name="Notes Placeholder 2"/>
+          <p:cNvSpPr>
+            <a:spLocks noGrp="1"/>
+          </p:cNvSpPr>
+          <p:nvPr>
+            <p:ph type="body" idx="1"/>
+          </p:nvPr>
+        </p:nvSpPr>
+        <p:spPr/>
+        <p:txBody>
+          <a:bodyPr/>
+          <a:lstStyle/>
+          <a:p>
+            <a:r>
+              <a:rPr lang="cs-CZ" dirty="0"/>
+              <a:t>O </a:t>
+            </a:r>
+            <a:r>
+              <a:rPr lang="cs-CZ" dirty="0" err="1"/>
+              <a:t>Kali</a:t>
+            </a:r>
+            <a:r>
+              <a:rPr lang="cs-CZ" dirty="0"/>
+              <a:t> Linuxu a možná i </a:t>
+            </a:r>
+            <a:r>
+              <a:rPr lang="cs-CZ" dirty="0" err="1"/>
+              <a:t>BlackTracku</a:t>
+            </a:r>
+            <a:r>
+              <a:rPr lang="cs-CZ" dirty="0"/>
+              <a:t> něco později.</a:t>
+            </a:r>
+          </a:p>
+        </p:txBody>
+      </p:sp>
+      <p:sp>
+        <p:nvSpPr>
+          <p:cNvPr id="4" name="Slide Number Placeholder 3"/>
+          <p:cNvSpPr>
+            <a:spLocks noGrp="1"/>
+          </p:cNvSpPr>
+          <p:nvPr>
+            <p:ph type="sldNum" sz="quarter" idx="5"/>
+          </p:nvPr>
+        </p:nvSpPr>
+        <p:spPr/>
+        <p:txBody>
+          <a:bodyPr/>
+          <a:lstStyle/>
+          <a:p>
+            <a:fld id="{D252E0EA-6D0E-4413-B5B0-00C1F5DDE783}" type="slidenum">
+              <a:rPr lang="cs-CZ" smtClean="0"/>
+              <a:t>11</a:t>
+            </a:fld>
+            <a:endParaRPr lang="cs-CZ"/>
+          </a:p>
+        </p:txBody>
+      </p:sp>
+    </p:spTree>
+    <p:extLst>
+      <p:ext uri="{BB962C8B-B14F-4D97-AF65-F5344CB8AC3E}">
+        <p14:creationId xmlns:p14="http://schemas.microsoft.com/office/powerpoint/2010/main" val="2780433366"/>
       </p:ext>
     </p:extLst>
   </p:cSld>
@@ -8826,7 +9124,7 @@
             <a:fld id="{1449AA12-8195-4182-A7AC-2E7E59DFBDAF}" type="datetimeFigureOut">
               <a:rPr lang="en-US" smtClean="0"/>
               <a:pPr algn="r"/>
-              <a:t>1/1/2023</a:t>
+              <a:t>1/3/2023</a:t>
             </a:fld>
             <a:endParaRPr lang="en-US"/>
           </a:p>
@@ -9042,7 +9340,7 @@
           <a:p>
             <a:fld id="{1449AA12-8195-4182-A7AC-2E7E59DFBDAF}" type="datetimeFigureOut">
               <a:rPr lang="en-US" smtClean="0"/>
-              <a:t>1/1/2023</a:t>
+              <a:t>1/3/2023</a:t>
             </a:fld>
             <a:endParaRPr lang="en-US"/>
           </a:p>
@@ -9414,7 +9712,7 @@
           <a:p>
             <a:fld id="{1449AA12-8195-4182-A7AC-2E7E59DFBDAF}" type="datetimeFigureOut">
               <a:rPr lang="en-US" smtClean="0"/>
-              <a:t>1/1/2023</a:t>
+              <a:t>1/3/2023</a:t>
             </a:fld>
             <a:endParaRPr lang="en-US"/>
           </a:p>
@@ -9776,7 +10074,7 @@
           <a:p>
             <a:fld id="{1449AA12-8195-4182-A7AC-2E7E59DFBDAF}" type="datetimeFigureOut">
               <a:rPr lang="en-US" smtClean="0"/>
-              <a:t>1/1/2023</a:t>
+              <a:t>1/3/2023</a:t>
             </a:fld>
             <a:endParaRPr lang="en-US"/>
           </a:p>
@@ -10216,7 +10514,7 @@
           <a:p>
             <a:fld id="{1449AA12-8195-4182-A7AC-2E7E59DFBDAF}" type="datetimeFigureOut">
               <a:rPr lang="en-US" smtClean="0"/>
-              <a:t>1/1/2023</a:t>
+              <a:t>1/3/2023</a:t>
             </a:fld>
             <a:endParaRPr lang="en-US"/>
           </a:p>
@@ -10656,7 +10954,7 @@
           <a:p>
             <a:fld id="{1449AA12-8195-4182-A7AC-2E7E59DFBDAF}" type="datetimeFigureOut">
               <a:rPr lang="en-US" smtClean="0"/>
-              <a:t>1/1/2023</a:t>
+              <a:t>1/3/2023</a:t>
             </a:fld>
             <a:endParaRPr lang="en-US"/>
           </a:p>
@@ -11264,7 +11562,7 @@
           <a:p>
             <a:fld id="{1449AA12-8195-4182-A7AC-2E7E59DFBDAF}" type="datetimeFigureOut">
               <a:rPr lang="en-US" smtClean="0"/>
-              <a:t>1/1/2023</a:t>
+              <a:t>1/3/2023</a:t>
             </a:fld>
             <a:endParaRPr lang="en-US"/>
           </a:p>
@@ -11569,7 +11867,7 @@
           <a:p>
             <a:fld id="{1449AA12-8195-4182-A7AC-2E7E59DFBDAF}" type="datetimeFigureOut">
               <a:rPr lang="en-US" smtClean="0"/>
-              <a:t>1/1/2023</a:t>
+              <a:t>1/3/2023</a:t>
             </a:fld>
             <a:endParaRPr lang="en-US"/>
           </a:p>
@@ -11846,7 +12144,7 @@
           <a:p>
             <a:fld id="{1449AA12-8195-4182-A7AC-2E7E59DFBDAF}" type="datetimeFigureOut">
               <a:rPr lang="en-US" smtClean="0"/>
-              <a:t>1/1/2023</a:t>
+              <a:t>1/3/2023</a:t>
             </a:fld>
             <a:endParaRPr lang="en-US"/>
           </a:p>
@@ -12323,7 +12621,7 @@
           <a:p>
             <a:fld id="{1449AA12-8195-4182-A7AC-2E7E59DFBDAF}" type="datetimeFigureOut">
               <a:rPr lang="en-US" smtClean="0"/>
-              <a:t>1/1/2023</a:t>
+              <a:t>1/3/2023</a:t>
             </a:fld>
             <a:endParaRPr lang="en-US"/>
           </a:p>
@@ -12778,7 +13076,7 @@
           <a:p>
             <a:fld id="{1449AA12-8195-4182-A7AC-2E7E59DFBDAF}" type="datetimeFigureOut">
               <a:rPr lang="en-US" smtClean="0"/>
-              <a:t>1/1/2023</a:t>
+              <a:t>1/3/2023</a:t>
             </a:fld>
             <a:endParaRPr lang="en-US"/>
           </a:p>
@@ -13184,7 +13482,7 @@
             <a:fld id="{1449AA12-8195-4182-A7AC-2E7E59DFBDAF}" type="datetimeFigureOut">
               <a:rPr lang="en-US" smtClean="0"/>
               <a:pPr/>
-              <a:t>1/1/2023</a:t>
+              <a:t>1/3/2023</a:t>
             </a:fld>
             <a:endParaRPr lang="en-US"/>
           </a:p>
@@ -14177,6 +14475,427 @@
 </p:sld>
 </file>
 
+<file path=ppt/slides/slide10.xml><?xml version="1.0" encoding="utf-8"?>
+<p:sld xmlns:a="http://schemas.openxmlformats.org/drawingml/2006/main" xmlns:r="http://schemas.openxmlformats.org/officeDocument/2006/relationships" xmlns:p="http://schemas.openxmlformats.org/presentationml/2006/main">
+  <p:cSld>
+    <p:spTree>
+      <p:nvGrpSpPr>
+        <p:cNvPr id="1" name=""/>
+        <p:cNvGrpSpPr/>
+        <p:nvPr/>
+      </p:nvGrpSpPr>
+      <p:grpSpPr>
+        <a:xfrm>
+          <a:off x="0" y="0"/>
+          <a:ext cx="0" cy="0"/>
+          <a:chOff x="0" y="0"/>
+          <a:chExt cx="0" cy="0"/>
+        </a:xfrm>
+      </p:grpSpPr>
+      <p:sp>
+        <p:nvSpPr>
+          <p:cNvPr id="2" name="Title 1">
+            <a:extLst>
+              <a:ext uri="{FF2B5EF4-FFF2-40B4-BE49-F238E27FC236}">
+                <a16:creationId xmlns:a16="http://schemas.microsoft.com/office/drawing/2014/main" id="{360E6C21-BED5-C2DB-9C8C-AA1582F81A2D}"/>
+              </a:ext>
+            </a:extLst>
+          </p:cNvPr>
+          <p:cNvSpPr>
+            <a:spLocks noGrp="1"/>
+          </p:cNvSpPr>
+          <p:nvPr>
+            <p:ph type="title"/>
+          </p:nvPr>
+        </p:nvSpPr>
+        <p:spPr>
+          <a:xfrm>
+            <a:off x="1587710" y="455363"/>
+            <a:ext cx="9486690" cy="763838"/>
+          </a:xfrm>
+        </p:spPr>
+        <p:txBody>
+          <a:bodyPr>
+            <a:normAutofit/>
+          </a:bodyPr>
+          <a:lstStyle/>
+          <a:p>
+            <a:r>
+              <a:rPr lang="cs-CZ" sz="2400" dirty="0"/>
+              <a:t>Automatizace domácnosti:</a:t>
+            </a:r>
+          </a:p>
+        </p:txBody>
+      </p:sp>
+      <p:sp>
+        <p:nvSpPr>
+          <p:cNvPr id="3" name="Content Placeholder 2">
+            <a:extLst>
+              <a:ext uri="{FF2B5EF4-FFF2-40B4-BE49-F238E27FC236}">
+                <a16:creationId xmlns:a16="http://schemas.microsoft.com/office/drawing/2014/main" id="{45DCA7BC-2EED-0833-068E-844131BD7B1D}"/>
+              </a:ext>
+            </a:extLst>
+          </p:cNvPr>
+          <p:cNvSpPr>
+            <a:spLocks noGrp="1"/>
+          </p:cNvSpPr>
+          <p:nvPr>
+            <p:ph idx="1"/>
+          </p:nvPr>
+        </p:nvSpPr>
+        <p:spPr>
+          <a:xfrm>
+            <a:off x="1587710" y="1400175"/>
+            <a:ext cx="9486690" cy="4685993"/>
+          </a:xfrm>
+        </p:spPr>
+        <p:txBody>
+          <a:bodyPr/>
+          <a:lstStyle/>
+          <a:p>
+            <a:r>
+              <a:rPr lang="cs-CZ" dirty="0"/>
+              <a:t>S pomocí </a:t>
+            </a:r>
+            <a:r>
+              <a:rPr lang="cs-CZ" dirty="0" err="1"/>
+              <a:t>Raspberry</a:t>
+            </a:r>
+            <a:r>
+              <a:rPr lang="cs-CZ" dirty="0"/>
+              <a:t> </a:t>
+            </a:r>
+            <a:r>
+              <a:rPr lang="cs-CZ" dirty="0" err="1"/>
+              <a:t>Pi</a:t>
+            </a:r>
+            <a:r>
+              <a:rPr lang="cs-CZ" dirty="0"/>
+              <a:t> a trochou znalostí Linuxu si můžeme trochu zautomatizovat domácnost</a:t>
+            </a:r>
+          </a:p>
+          <a:p>
+            <a:endParaRPr lang="cs-CZ" dirty="0"/>
+          </a:p>
+          <a:p>
+            <a:r>
+              <a:rPr lang="cs-CZ" dirty="0"/>
+              <a:t>Třeba dát si na zeď tablet pro kalendář nebo nastavit monitorovací systém</a:t>
+            </a:r>
+          </a:p>
+          <a:p>
+            <a:endParaRPr lang="cs-CZ" dirty="0"/>
+          </a:p>
+          <a:p>
+            <a:r>
+              <a:rPr lang="cs-CZ" dirty="0"/>
+              <a:t>Je to trochu omezené kvůli, Linuxu protože není na něj tolik softwaru jako na Windows</a:t>
+            </a:r>
+          </a:p>
+        </p:txBody>
+      </p:sp>
+    </p:spTree>
+    <p:extLst>
+      <p:ext uri="{BB962C8B-B14F-4D97-AF65-F5344CB8AC3E}">
+        <p14:creationId xmlns:p14="http://schemas.microsoft.com/office/powerpoint/2010/main" val="273480669"/>
+      </p:ext>
+    </p:extLst>
+  </p:cSld>
+  <p:clrMapOvr>
+    <a:masterClrMapping/>
+  </p:clrMapOvr>
+</p:sld>
+</file>
+
+<file path=ppt/slides/slide11.xml><?xml version="1.0" encoding="utf-8"?>
+<p:sld xmlns:a="http://schemas.openxmlformats.org/drawingml/2006/main" xmlns:r="http://schemas.openxmlformats.org/officeDocument/2006/relationships" xmlns:p="http://schemas.openxmlformats.org/presentationml/2006/main">
+  <p:cSld>
+    <p:spTree>
+      <p:nvGrpSpPr>
+        <p:cNvPr id="1" name=""/>
+        <p:cNvGrpSpPr/>
+        <p:nvPr/>
+      </p:nvGrpSpPr>
+      <p:grpSpPr>
+        <a:xfrm>
+          <a:off x="0" y="0"/>
+          <a:ext cx="0" cy="0"/>
+          <a:chOff x="0" y="0"/>
+          <a:chExt cx="0" cy="0"/>
+        </a:xfrm>
+      </p:grpSpPr>
+      <p:sp>
+        <p:nvSpPr>
+          <p:cNvPr id="2" name="Title 1">
+            <a:extLst>
+              <a:ext uri="{FF2B5EF4-FFF2-40B4-BE49-F238E27FC236}">
+                <a16:creationId xmlns:a16="http://schemas.microsoft.com/office/drawing/2014/main" id="{236C1F72-F1F0-70D9-C89F-F9F65EBB5630}"/>
+              </a:ext>
+            </a:extLst>
+          </p:cNvPr>
+          <p:cNvSpPr>
+            <a:spLocks noGrp="1"/>
+          </p:cNvSpPr>
+          <p:nvPr>
+            <p:ph type="title"/>
+          </p:nvPr>
+        </p:nvSpPr>
+        <p:spPr>
+          <a:xfrm>
+            <a:off x="1587710" y="455362"/>
+            <a:ext cx="9486690" cy="544763"/>
+          </a:xfrm>
+        </p:spPr>
+        <p:txBody>
+          <a:bodyPr>
+            <a:noAutofit/>
+          </a:bodyPr>
+          <a:lstStyle/>
+          <a:p>
+            <a:r>
+              <a:rPr lang="cs-CZ" sz="2400" dirty="0"/>
+              <a:t>Oprašování </a:t>
+            </a:r>
+            <a:r>
+              <a:rPr lang="cs-CZ" sz="2400" dirty="0" err="1"/>
+              <a:t>hackování</a:t>
+            </a:r>
+            <a:r>
+              <a:rPr lang="cs-CZ" sz="2400" dirty="0"/>
+              <a:t> a zabezpečení</a:t>
+            </a:r>
+          </a:p>
+        </p:txBody>
+      </p:sp>
+      <p:sp>
+        <p:nvSpPr>
+          <p:cNvPr id="3" name="Content Placeholder 2">
+            <a:extLst>
+              <a:ext uri="{FF2B5EF4-FFF2-40B4-BE49-F238E27FC236}">
+                <a16:creationId xmlns:a16="http://schemas.microsoft.com/office/drawing/2014/main" id="{DC1DFC1A-5567-EAA8-1116-74B04A7B85EA}"/>
+              </a:ext>
+            </a:extLst>
+          </p:cNvPr>
+          <p:cNvSpPr>
+            <a:spLocks noGrp="1"/>
+          </p:cNvSpPr>
+          <p:nvPr>
+            <p:ph idx="1"/>
+          </p:nvPr>
+        </p:nvSpPr>
+        <p:spPr>
+          <a:xfrm>
+            <a:off x="1587710" y="1314450"/>
+            <a:ext cx="9486690" cy="4771718"/>
+          </a:xfrm>
+        </p:spPr>
+        <p:txBody>
+          <a:bodyPr/>
+          <a:lstStyle/>
+          <a:p>
+            <a:r>
+              <a:rPr lang="cs-CZ" dirty="0"/>
+              <a:t>Pomocí linuxových distribucí jako je </a:t>
+            </a:r>
+            <a:r>
+              <a:rPr lang="cs-CZ" dirty="0" err="1"/>
+              <a:t>Kali</a:t>
+            </a:r>
+            <a:r>
+              <a:rPr lang="cs-CZ" dirty="0"/>
+              <a:t> Linux, nebo </a:t>
+            </a:r>
+            <a:r>
+              <a:rPr lang="cs-CZ" dirty="0" err="1"/>
+              <a:t>BlackTrack</a:t>
+            </a:r>
+            <a:r>
+              <a:rPr lang="cs-CZ" dirty="0"/>
+              <a:t> se můžete naučit více o své síti doma</a:t>
+            </a:r>
+          </a:p>
+          <a:p>
+            <a:endParaRPr lang="cs-CZ" dirty="0"/>
+          </a:p>
+          <a:p>
+            <a:r>
+              <a:rPr lang="cs-CZ" dirty="0"/>
+              <a:t>Tyto distribuce můžete použít jako učení </a:t>
+            </a:r>
+            <a:r>
+              <a:rPr lang="cs-CZ" dirty="0" err="1"/>
+              <a:t>hackování</a:t>
+            </a:r>
+            <a:r>
+              <a:rPr lang="cs-CZ" dirty="0"/>
+              <a:t> protokolů WEP a WPA Wi-Fi</a:t>
+            </a:r>
+          </a:p>
+          <a:p>
+            <a:endParaRPr lang="cs-CZ" dirty="0"/>
+          </a:p>
+          <a:p>
+            <a:r>
+              <a:rPr lang="cs-CZ" dirty="0"/>
+              <a:t>Nepoužívejte k dělání nějakých trestných činů!</a:t>
+            </a:r>
+          </a:p>
+          <a:p>
+            <a:endParaRPr lang="cs-CZ" dirty="0"/>
+          </a:p>
+          <a:p>
+            <a:r>
+              <a:rPr lang="cs-CZ" dirty="0"/>
+              <a:t>Ale jejich naučení může pomoct bránění případných útokům</a:t>
+            </a:r>
+          </a:p>
+        </p:txBody>
+      </p:sp>
+    </p:spTree>
+    <p:extLst>
+      <p:ext uri="{BB962C8B-B14F-4D97-AF65-F5344CB8AC3E}">
+        <p14:creationId xmlns:p14="http://schemas.microsoft.com/office/powerpoint/2010/main" val="903245563"/>
+      </p:ext>
+    </p:extLst>
+  </p:cSld>
+  <p:clrMapOvr>
+    <a:masterClrMapping/>
+  </p:clrMapOvr>
+</p:sld>
+</file>
+
+<file path=ppt/slides/slide12.xml><?xml version="1.0" encoding="utf-8"?>
+<p:sld xmlns:a="http://schemas.openxmlformats.org/drawingml/2006/main" xmlns:r="http://schemas.openxmlformats.org/officeDocument/2006/relationships" xmlns:p="http://schemas.openxmlformats.org/presentationml/2006/main">
+  <p:cSld>
+    <p:spTree>
+      <p:nvGrpSpPr>
+        <p:cNvPr id="1" name=""/>
+        <p:cNvGrpSpPr/>
+        <p:nvPr/>
+      </p:nvGrpSpPr>
+      <p:grpSpPr>
+        <a:xfrm>
+          <a:off x="0" y="0"/>
+          <a:ext cx="0" cy="0"/>
+          <a:chOff x="0" y="0"/>
+          <a:chExt cx="0" cy="0"/>
+        </a:xfrm>
+      </p:grpSpPr>
+      <p:sp>
+        <p:nvSpPr>
+          <p:cNvPr id="2" name="Title 1">
+            <a:extLst>
+              <a:ext uri="{FF2B5EF4-FFF2-40B4-BE49-F238E27FC236}">
+                <a16:creationId xmlns:a16="http://schemas.microsoft.com/office/drawing/2014/main" id="{B2272CFA-44A0-840F-96A4-FFFE43A8BE43}"/>
+              </a:ext>
+            </a:extLst>
+          </p:cNvPr>
+          <p:cNvSpPr>
+            <a:spLocks noGrp="1"/>
+          </p:cNvSpPr>
+          <p:nvPr>
+            <p:ph type="title"/>
+          </p:nvPr>
+        </p:nvSpPr>
+        <p:spPr>
+          <a:xfrm>
+            <a:off x="1587710" y="455362"/>
+            <a:ext cx="9486690" cy="563813"/>
+          </a:xfrm>
+        </p:spPr>
+        <p:txBody>
+          <a:bodyPr>
+            <a:noAutofit/>
+          </a:bodyPr>
+          <a:lstStyle/>
+          <a:p>
+            <a:r>
+              <a:rPr lang="cs-CZ" sz="2400" dirty="0"/>
+              <a:t>Práce s pevnými disky a oddíly:</a:t>
+            </a:r>
+          </a:p>
+        </p:txBody>
+      </p:sp>
+      <p:sp>
+        <p:nvSpPr>
+          <p:cNvPr id="3" name="Content Placeholder 2">
+            <a:extLst>
+              <a:ext uri="{FF2B5EF4-FFF2-40B4-BE49-F238E27FC236}">
+                <a16:creationId xmlns:a16="http://schemas.microsoft.com/office/drawing/2014/main" id="{8C785B5A-F4A0-E9E5-3AC5-008F32794C35}"/>
+              </a:ext>
+            </a:extLst>
+          </p:cNvPr>
+          <p:cNvSpPr>
+            <a:spLocks noGrp="1"/>
+          </p:cNvSpPr>
+          <p:nvPr>
+            <p:ph idx="1"/>
+          </p:nvPr>
+        </p:nvSpPr>
+        <p:spPr>
+          <a:xfrm>
+            <a:off x="1587710" y="1743075"/>
+            <a:ext cx="9486690" cy="4343093"/>
+          </a:xfrm>
+        </p:spPr>
+        <p:txBody>
+          <a:bodyPr/>
+          <a:lstStyle/>
+          <a:p>
+            <a:r>
+              <a:rPr lang="cs-CZ" dirty="0"/>
+              <a:t>Pomocí </a:t>
+            </a:r>
+            <a:r>
+              <a:rPr lang="cs-CZ" dirty="0" err="1"/>
+              <a:t>LiveCD</a:t>
+            </a:r>
+            <a:r>
+              <a:rPr lang="cs-CZ" dirty="0"/>
+              <a:t> můžete a s pomocí </a:t>
+            </a:r>
+            <a:r>
+              <a:rPr lang="cs-CZ" dirty="0" err="1"/>
+              <a:t>Gparted</a:t>
+            </a:r>
+            <a:r>
+              <a:rPr lang="cs-CZ" dirty="0"/>
+              <a:t>, který je jeho součástí můžete formátovat disky</a:t>
+            </a:r>
+          </a:p>
+          <a:p>
+            <a:endParaRPr lang="cs-CZ" dirty="0"/>
+          </a:p>
+          <a:p>
+            <a:r>
+              <a:rPr lang="cs-CZ" dirty="0"/>
+              <a:t>Hlavní výhodou je že kdyby po prodání onoho disku chtěl někdo získat vaše data bude to mnohem těžší</a:t>
+            </a:r>
+          </a:p>
+          <a:p>
+            <a:endParaRPr lang="cs-CZ" dirty="0"/>
+          </a:p>
+          <a:p>
+            <a:r>
+              <a:rPr lang="cs-CZ" dirty="0"/>
+              <a:t>Také se dá samozřejmě použít jako pomůcka při klonování disků</a:t>
+            </a:r>
+          </a:p>
+        </p:txBody>
+      </p:sp>
+    </p:spTree>
+    <p:extLst>
+      <p:ext uri="{BB962C8B-B14F-4D97-AF65-F5344CB8AC3E}">
+        <p14:creationId xmlns:p14="http://schemas.microsoft.com/office/powerpoint/2010/main" val="4092896608"/>
+      </p:ext>
+    </p:extLst>
+  </p:cSld>
+  <p:clrMapOvr>
+    <a:masterClrMapping/>
+  </p:clrMapOvr>
+</p:sld>
+</file>
+
 <file path=ppt/slides/slide2.xml><?xml version="1.0" encoding="utf-8"?>
 <p:sld xmlns:a="http://schemas.openxmlformats.org/drawingml/2006/main" xmlns:r="http://schemas.openxmlformats.org/officeDocument/2006/relationships" xmlns:p="http://schemas.openxmlformats.org/presentationml/2006/main">
   <p:cSld>
@@ -15936,7 +16655,7 @@
           <a:lstStyle/>
           <a:p>
             <a:r>
-              <a:rPr lang="cs-CZ" sz="2400" dirty="0"/>
+              <a:rPr lang="cs-CZ" sz="2400" b="1" dirty="0"/>
               <a:t>Superpočítače:</a:t>
             </a:r>
           </a:p>
@@ -19407,6 +20126,246 @@
     <p:extLst>
       <p:ext uri="{BB962C8B-B14F-4D97-AF65-F5344CB8AC3E}">
         <p14:creationId xmlns:p14="http://schemas.microsoft.com/office/powerpoint/2010/main" val="3192794726"/>
+      </p:ext>
+    </p:extLst>
+  </p:cSld>
+  <p:clrMapOvr>
+    <a:masterClrMapping/>
+  </p:clrMapOvr>
+</p:sld>
+</file>
+
+<file path=ppt/slides/slide8.xml><?xml version="1.0" encoding="utf-8"?>
+<p:sld xmlns:a="http://schemas.openxmlformats.org/drawingml/2006/main" xmlns:r="http://schemas.openxmlformats.org/officeDocument/2006/relationships" xmlns:p="http://schemas.openxmlformats.org/presentationml/2006/main">
+  <p:cSld>
+    <p:spTree>
+      <p:nvGrpSpPr>
+        <p:cNvPr id="1" name=""/>
+        <p:cNvGrpSpPr/>
+        <p:nvPr/>
+      </p:nvGrpSpPr>
+      <p:grpSpPr>
+        <a:xfrm>
+          <a:off x="0" y="0"/>
+          <a:ext cx="0" cy="0"/>
+          <a:chOff x="0" y="0"/>
+          <a:chExt cx="0" cy="0"/>
+        </a:xfrm>
+      </p:grpSpPr>
+      <p:sp>
+        <p:nvSpPr>
+          <p:cNvPr id="2" name="Title 1">
+            <a:extLst>
+              <a:ext uri="{FF2B5EF4-FFF2-40B4-BE49-F238E27FC236}">
+                <a16:creationId xmlns:a16="http://schemas.microsoft.com/office/drawing/2014/main" id="{4FE74F71-527B-421D-99DA-ED9D74ADF063}"/>
+              </a:ext>
+            </a:extLst>
+          </p:cNvPr>
+          <p:cNvSpPr>
+            <a:spLocks noGrp="1"/>
+          </p:cNvSpPr>
+          <p:nvPr>
+            <p:ph type="title"/>
+          </p:nvPr>
+        </p:nvSpPr>
+        <p:spPr/>
+        <p:txBody>
+          <a:bodyPr>
+            <a:normAutofit/>
+          </a:bodyPr>
+          <a:lstStyle/>
+          <a:p>
+            <a:r>
+              <a:rPr lang="cs-CZ" sz="2400" dirty="0"/>
+              <a:t>Oživení starých počítačů:</a:t>
+            </a:r>
+          </a:p>
+        </p:txBody>
+      </p:sp>
+      <p:sp>
+        <p:nvSpPr>
+          <p:cNvPr id="3" name="Content Placeholder 2">
+            <a:extLst>
+              <a:ext uri="{FF2B5EF4-FFF2-40B4-BE49-F238E27FC236}">
+                <a16:creationId xmlns:a16="http://schemas.microsoft.com/office/drawing/2014/main" id="{0457F338-C881-5E1D-0F5B-ABC84FBC0794}"/>
+              </a:ext>
+            </a:extLst>
+          </p:cNvPr>
+          <p:cNvSpPr>
+            <a:spLocks noGrp="1"/>
+          </p:cNvSpPr>
+          <p:nvPr>
+            <p:ph idx="1"/>
+          </p:nvPr>
+        </p:nvSpPr>
+        <p:spPr>
+          <a:xfrm>
+            <a:off x="1587710" y="1476375"/>
+            <a:ext cx="9486690" cy="4609793"/>
+          </a:xfrm>
+        </p:spPr>
+        <p:txBody>
+          <a:bodyPr/>
+          <a:lstStyle/>
+          <a:p>
+            <a:r>
+              <a:rPr lang="cs-CZ" dirty="0"/>
+              <a:t>Hlavní využití Linuxu je hlavně oživení starých počítačů</a:t>
+            </a:r>
+          </a:p>
+          <a:p>
+            <a:endParaRPr lang="cs-CZ" dirty="0"/>
+          </a:p>
+          <a:p>
+            <a:r>
+              <a:rPr lang="cs-CZ" dirty="0"/>
+              <a:t>K tomu slouží hlavně </a:t>
+            </a:r>
+            <a:r>
+              <a:rPr lang="cs-CZ" dirty="0" err="1"/>
+              <a:t>Lubuntu</a:t>
+            </a:r>
+            <a:r>
+              <a:rPr lang="cs-CZ" dirty="0"/>
+              <a:t> a Linux Lite</a:t>
+            </a:r>
+          </a:p>
+          <a:p>
+            <a:endParaRPr lang="cs-CZ" dirty="0"/>
+          </a:p>
+          <a:p>
+            <a:r>
+              <a:rPr lang="cs-CZ" dirty="0"/>
+              <a:t>Operační systémy založené na Linuxu jsou mnohdy velmi </a:t>
+            </a:r>
+            <a:r>
+              <a:rPr lang="cs-CZ" dirty="0" err="1"/>
+              <a:t>light-weight</a:t>
+            </a:r>
+            <a:r>
+              <a:rPr lang="cs-CZ" dirty="0"/>
+              <a:t>, tedy málo náročné na hardware</a:t>
+            </a:r>
+          </a:p>
+          <a:p>
+            <a:endParaRPr lang="cs-CZ" dirty="0"/>
+          </a:p>
+          <a:p>
+            <a:endParaRPr lang="cs-CZ" dirty="0"/>
+          </a:p>
+        </p:txBody>
+      </p:sp>
+    </p:spTree>
+    <p:extLst>
+      <p:ext uri="{BB962C8B-B14F-4D97-AF65-F5344CB8AC3E}">
+        <p14:creationId xmlns:p14="http://schemas.microsoft.com/office/powerpoint/2010/main" val="2930986419"/>
+      </p:ext>
+    </p:extLst>
+  </p:cSld>
+  <p:clrMapOvr>
+    <a:masterClrMapping/>
+  </p:clrMapOvr>
+</p:sld>
+</file>
+
+<file path=ppt/slides/slide9.xml><?xml version="1.0" encoding="utf-8"?>
+<p:sld xmlns:a="http://schemas.openxmlformats.org/drawingml/2006/main" xmlns:r="http://schemas.openxmlformats.org/officeDocument/2006/relationships" xmlns:p="http://schemas.openxmlformats.org/presentationml/2006/main">
+  <p:cSld>
+    <p:spTree>
+      <p:nvGrpSpPr>
+        <p:cNvPr id="1" name=""/>
+        <p:cNvGrpSpPr/>
+        <p:nvPr/>
+      </p:nvGrpSpPr>
+      <p:grpSpPr>
+        <a:xfrm>
+          <a:off x="0" y="0"/>
+          <a:ext cx="0" cy="0"/>
+          <a:chOff x="0" y="0"/>
+          <a:chExt cx="0" cy="0"/>
+        </a:xfrm>
+      </p:grpSpPr>
+      <p:sp>
+        <p:nvSpPr>
+          <p:cNvPr id="3" name="Content Placeholder 2">
+            <a:extLst>
+              <a:ext uri="{FF2B5EF4-FFF2-40B4-BE49-F238E27FC236}">
+                <a16:creationId xmlns:a16="http://schemas.microsoft.com/office/drawing/2014/main" id="{59FED67B-14E0-B844-C9B4-2A0FE5A90941}"/>
+              </a:ext>
+            </a:extLst>
+          </p:cNvPr>
+          <p:cNvSpPr>
+            <a:spLocks noGrp="1"/>
+          </p:cNvSpPr>
+          <p:nvPr>
+            <p:ph idx="1"/>
+          </p:nvPr>
+        </p:nvSpPr>
+        <p:spPr>
+          <a:xfrm>
+            <a:off x="1559135" y="1495424"/>
+            <a:ext cx="9486690" cy="3896651"/>
+          </a:xfrm>
+        </p:spPr>
+        <p:txBody>
+          <a:bodyPr/>
+          <a:lstStyle/>
+          <a:p>
+            <a:endParaRPr lang="cs-CZ" dirty="0"/>
+          </a:p>
+        </p:txBody>
+      </p:sp>
+      <p:sp>
+        <p:nvSpPr>
+          <p:cNvPr id="4" name="TextBox 3">
+            <a:extLst>
+              <a:ext uri="{FF2B5EF4-FFF2-40B4-BE49-F238E27FC236}">
+                <a16:creationId xmlns:a16="http://schemas.microsoft.com/office/drawing/2014/main" id="{6433F5EB-7D82-82DE-237F-8E83708D4EBC}"/>
+              </a:ext>
+            </a:extLst>
+          </p:cNvPr>
+          <p:cNvSpPr txBox="1"/>
+          <p:nvPr/>
+        </p:nvSpPr>
+        <p:spPr>
+          <a:xfrm>
+            <a:off x="1559135" y="723900"/>
+            <a:ext cx="6924675" cy="461665"/>
+          </a:xfrm>
+          <a:prstGeom prst="rect">
+            <a:avLst/>
+          </a:prstGeom>
+          <a:noFill/>
+        </p:spPr>
+        <p:txBody>
+          <a:bodyPr wrap="square" rtlCol="0">
+            <a:spAutoFit/>
+          </a:bodyPr>
+          <a:lstStyle/>
+          <a:p>
+            <a:r>
+              <a:rPr lang="cs-CZ" sz="2400" b="1" dirty="0" err="1"/>
+              <a:t>Backup</a:t>
+            </a:r>
+            <a:r>
+              <a:rPr lang="cs-CZ" sz="2400" b="1" dirty="0"/>
+              <a:t> a </a:t>
+            </a:r>
+            <a:r>
+              <a:rPr lang="cs-CZ" sz="2400" b="1" dirty="0" err="1"/>
+              <a:t>torrenty</a:t>
+            </a:r>
+            <a:r>
+              <a:rPr lang="cs-CZ" sz="2400" b="1" dirty="0"/>
+              <a:t>:</a:t>
+            </a:r>
+          </a:p>
+        </p:txBody>
+      </p:sp>
+    </p:spTree>
+    <p:extLst>
+      <p:ext uri="{BB962C8B-B14F-4D97-AF65-F5344CB8AC3E}">
+        <p14:creationId xmlns:p14="http://schemas.microsoft.com/office/powerpoint/2010/main" val="3555367997"/>
       </p:ext>
     </p:extLst>
   </p:cSld>

</xml_diff>

<commit_message>
Po přidání pár slidů, ale stále ve vývoji.
</commit_message>
<xml_diff>
--- a/Linux.pptx
+++ b/Linux.pptx
@@ -5,7 +5,7 @@
     <p:sldMasterId id="2147483673" r:id="rId1"/>
   </p:sldMasterIdLst>
   <p:notesMasterIdLst>
-    <p:notesMasterId r:id="rId17"/>
+    <p:notesMasterId r:id="rId25"/>
   </p:notesMasterIdLst>
   <p:sldIdLst>
     <p:sldId id="256" r:id="rId2"/>
@@ -23,6 +23,14 @@
     <p:sldId id="265" r:id="rId14"/>
     <p:sldId id="266" r:id="rId15"/>
     <p:sldId id="269" r:id="rId16"/>
+    <p:sldId id="271" r:id="rId17"/>
+    <p:sldId id="276" r:id="rId18"/>
+    <p:sldId id="272" r:id="rId19"/>
+    <p:sldId id="277" r:id="rId20"/>
+    <p:sldId id="273" r:id="rId21"/>
+    <p:sldId id="278" r:id="rId22"/>
+    <p:sldId id="275" r:id="rId23"/>
+    <p:sldId id="274" r:id="rId24"/>
   </p:sldIdLst>
   <p:sldSz cx="12192000" cy="6858000"/>
   <p:notesSz cx="6858000" cy="9144000"/>
@@ -8069,7 +8077,7 @@
           <a:p>
             <a:fld id="{B3EDDFD5-A815-42F4-BC94-04648630B084}" type="datetimeFigureOut">
               <a:rPr lang="cs-CZ" smtClean="0"/>
-              <a:t>14.01.2023</a:t>
+              <a:t>16.01.2023</a:t>
             </a:fld>
             <a:endParaRPr lang="cs-CZ"/>
           </a:p>
@@ -8412,6 +8420,267 @@
     <p:extLst>
       <p:ext uri="{BB962C8B-B14F-4D97-AF65-F5344CB8AC3E}">
         <p14:creationId xmlns:p14="http://schemas.microsoft.com/office/powerpoint/2010/main" val="2130402404"/>
+      </p:ext>
+    </p:extLst>
+  </p:cSld>
+  <p:clrMapOvr>
+    <a:masterClrMapping/>
+  </p:clrMapOvr>
+</p:notes>
+</file>
+
+<file path=ppt/notesSlides/notesSlide10.xml><?xml version="1.0" encoding="utf-8"?>
+<p:notes xmlns:a="http://schemas.openxmlformats.org/drawingml/2006/main" xmlns:r="http://schemas.openxmlformats.org/officeDocument/2006/relationships" xmlns:p="http://schemas.openxmlformats.org/presentationml/2006/main">
+  <p:cSld>
+    <p:spTree>
+      <p:nvGrpSpPr>
+        <p:cNvPr id="1" name=""/>
+        <p:cNvGrpSpPr/>
+        <p:nvPr/>
+      </p:nvGrpSpPr>
+      <p:grpSpPr>
+        <a:xfrm>
+          <a:off x="0" y="0"/>
+          <a:ext cx="0" cy="0"/>
+          <a:chOff x="0" y="0"/>
+          <a:chExt cx="0" cy="0"/>
+        </a:xfrm>
+      </p:grpSpPr>
+      <p:sp>
+        <p:nvSpPr>
+          <p:cNvPr id="2" name="Zástupný symbol pro obrázek snímku 1"/>
+          <p:cNvSpPr>
+            <a:spLocks noGrp="1" noRot="1" noChangeAspect="1"/>
+          </p:cNvSpPr>
+          <p:nvPr>
+            <p:ph type="sldImg"/>
+          </p:nvPr>
+        </p:nvSpPr>
+        <p:spPr/>
+      </p:sp>
+      <p:sp>
+        <p:nvSpPr>
+          <p:cNvPr id="3" name="Zástupný symbol pro poznámky 2"/>
+          <p:cNvSpPr>
+            <a:spLocks noGrp="1"/>
+          </p:cNvSpPr>
+          <p:nvPr>
+            <p:ph type="body" idx="1"/>
+          </p:nvPr>
+        </p:nvSpPr>
+        <p:spPr/>
+        <p:txBody>
+          <a:bodyPr/>
+          <a:lstStyle/>
+          <a:p>
+            <a:r>
+              <a:rPr lang="cs-CZ" dirty="0"/>
+              <a:t>Tím, že skrývá soubory, je hodně bezpečný, protože v případě útoku malwarem jsou soubory izolovány a není možné k nim přistoupit</a:t>
+            </a:r>
+          </a:p>
+        </p:txBody>
+      </p:sp>
+      <p:sp>
+        <p:nvSpPr>
+          <p:cNvPr id="4" name="Zástupný symbol pro číslo snímku 3"/>
+          <p:cNvSpPr>
+            <a:spLocks noGrp="1"/>
+          </p:cNvSpPr>
+          <p:nvPr>
+            <p:ph type="sldNum" sz="quarter" idx="5"/>
+          </p:nvPr>
+        </p:nvSpPr>
+        <p:spPr/>
+        <p:txBody>
+          <a:bodyPr/>
+          <a:lstStyle/>
+          <a:p>
+            <a:fld id="{D252E0EA-6D0E-4413-B5B0-00C1F5DDE783}" type="slidenum">
+              <a:rPr lang="cs-CZ" smtClean="0"/>
+              <a:t>16</a:t>
+            </a:fld>
+            <a:endParaRPr lang="cs-CZ"/>
+          </a:p>
+        </p:txBody>
+      </p:sp>
+    </p:spTree>
+    <p:extLst>
+      <p:ext uri="{BB962C8B-B14F-4D97-AF65-F5344CB8AC3E}">
+        <p14:creationId xmlns:p14="http://schemas.microsoft.com/office/powerpoint/2010/main" val="1560081789"/>
+      </p:ext>
+    </p:extLst>
+  </p:cSld>
+  <p:clrMapOvr>
+    <a:masterClrMapping/>
+  </p:clrMapOvr>
+</p:notes>
+</file>
+
+<file path=ppt/notesSlides/notesSlide11.xml><?xml version="1.0" encoding="utf-8"?>
+<p:notes xmlns:a="http://schemas.openxmlformats.org/drawingml/2006/main" xmlns:r="http://schemas.openxmlformats.org/officeDocument/2006/relationships" xmlns:p="http://schemas.openxmlformats.org/presentationml/2006/main">
+  <p:cSld>
+    <p:spTree>
+      <p:nvGrpSpPr>
+        <p:cNvPr id="1" name=""/>
+        <p:cNvGrpSpPr/>
+        <p:nvPr/>
+      </p:nvGrpSpPr>
+      <p:grpSpPr>
+        <a:xfrm>
+          <a:off x="0" y="0"/>
+          <a:ext cx="0" cy="0"/>
+          <a:chOff x="0" y="0"/>
+          <a:chExt cx="0" cy="0"/>
+        </a:xfrm>
+      </p:grpSpPr>
+      <p:sp>
+        <p:nvSpPr>
+          <p:cNvPr id="2" name="Zástupný symbol pro obrázek snímku 1"/>
+          <p:cNvSpPr>
+            <a:spLocks noGrp="1" noRot="1" noChangeAspect="1"/>
+          </p:cNvSpPr>
+          <p:nvPr>
+            <p:ph type="sldImg"/>
+          </p:nvPr>
+        </p:nvSpPr>
+        <p:spPr/>
+      </p:sp>
+      <p:sp>
+        <p:nvSpPr>
+          <p:cNvPr id="3" name="Zástupný symbol pro poznámky 2"/>
+          <p:cNvSpPr>
+            <a:spLocks noGrp="1"/>
+          </p:cNvSpPr>
+          <p:nvPr>
+            <p:ph type="body" idx="1"/>
+          </p:nvPr>
+        </p:nvSpPr>
+        <p:spPr/>
+        <p:txBody>
+          <a:bodyPr/>
+          <a:lstStyle/>
+          <a:p>
+            <a:r>
+              <a:rPr lang="cs-CZ" dirty="0"/>
+              <a:t>Přestože se jedná o stejný operační systém, každé grafické prostředí nabízí jiné funkce.</a:t>
+            </a:r>
+          </a:p>
+        </p:txBody>
+      </p:sp>
+      <p:sp>
+        <p:nvSpPr>
+          <p:cNvPr id="4" name="Zástupný symbol pro číslo snímku 3"/>
+          <p:cNvSpPr>
+            <a:spLocks noGrp="1"/>
+          </p:cNvSpPr>
+          <p:nvPr>
+            <p:ph type="sldNum" sz="quarter" idx="5"/>
+          </p:nvPr>
+        </p:nvSpPr>
+        <p:spPr/>
+        <p:txBody>
+          <a:bodyPr/>
+          <a:lstStyle/>
+          <a:p>
+            <a:fld id="{D252E0EA-6D0E-4413-B5B0-00C1F5DDE783}" type="slidenum">
+              <a:rPr lang="cs-CZ" smtClean="0"/>
+              <a:t>19</a:t>
+            </a:fld>
+            <a:endParaRPr lang="cs-CZ"/>
+          </a:p>
+        </p:txBody>
+      </p:sp>
+    </p:spTree>
+    <p:extLst>
+      <p:ext uri="{BB962C8B-B14F-4D97-AF65-F5344CB8AC3E}">
+        <p14:creationId xmlns:p14="http://schemas.microsoft.com/office/powerpoint/2010/main" val="2938028122"/>
+      </p:ext>
+    </p:extLst>
+  </p:cSld>
+  <p:clrMapOvr>
+    <a:masterClrMapping/>
+  </p:clrMapOvr>
+</p:notes>
+</file>
+
+<file path=ppt/notesSlides/notesSlide12.xml><?xml version="1.0" encoding="utf-8"?>
+<p:notes xmlns:a="http://schemas.openxmlformats.org/drawingml/2006/main" xmlns:r="http://schemas.openxmlformats.org/officeDocument/2006/relationships" xmlns:p="http://schemas.openxmlformats.org/presentationml/2006/main">
+  <p:cSld>
+    <p:spTree>
+      <p:nvGrpSpPr>
+        <p:cNvPr id="1" name=""/>
+        <p:cNvGrpSpPr/>
+        <p:nvPr/>
+      </p:nvGrpSpPr>
+      <p:grpSpPr>
+        <a:xfrm>
+          <a:off x="0" y="0"/>
+          <a:ext cx="0" cy="0"/>
+          <a:chOff x="0" y="0"/>
+          <a:chExt cx="0" cy="0"/>
+        </a:xfrm>
+      </p:grpSpPr>
+      <p:sp>
+        <p:nvSpPr>
+          <p:cNvPr id="2" name="Zástupný symbol pro obrázek snímku 1"/>
+          <p:cNvSpPr>
+            <a:spLocks noGrp="1" noRot="1" noChangeAspect="1"/>
+          </p:cNvSpPr>
+          <p:nvPr>
+            <p:ph type="sldImg"/>
+          </p:nvPr>
+        </p:nvSpPr>
+        <p:spPr/>
+      </p:sp>
+      <p:sp>
+        <p:nvSpPr>
+          <p:cNvPr id="3" name="Zástupný symbol pro poznámky 2"/>
+          <p:cNvSpPr>
+            <a:spLocks noGrp="1"/>
+          </p:cNvSpPr>
+          <p:nvPr>
+            <p:ph type="body" idx="1"/>
+          </p:nvPr>
+        </p:nvSpPr>
+        <p:spPr/>
+        <p:txBody>
+          <a:bodyPr/>
+          <a:lstStyle/>
+          <a:p>
+            <a:r>
+              <a:rPr lang="cs-CZ" dirty="0"/>
+              <a:t>Zajímavost: První co mi vyskočilo při hledání obrázku k tomuto Linuxu, nebyla sama Hannah, ale tento operační systém</a:t>
+            </a:r>
+          </a:p>
+        </p:txBody>
+      </p:sp>
+      <p:sp>
+        <p:nvSpPr>
+          <p:cNvPr id="4" name="Zástupný symbol pro číslo snímku 3"/>
+          <p:cNvSpPr>
+            <a:spLocks noGrp="1"/>
+          </p:cNvSpPr>
+          <p:nvPr>
+            <p:ph type="sldNum" sz="quarter" idx="5"/>
+          </p:nvPr>
+        </p:nvSpPr>
+        <p:spPr/>
+        <p:txBody>
+          <a:bodyPr/>
+          <a:lstStyle/>
+          <a:p>
+            <a:fld id="{D252E0EA-6D0E-4413-B5B0-00C1F5DDE783}" type="slidenum">
+              <a:rPr lang="cs-CZ" smtClean="0"/>
+              <a:t>21</a:t>
+            </a:fld>
+            <a:endParaRPr lang="cs-CZ"/>
+          </a:p>
+        </p:txBody>
+      </p:sp>
+    </p:spTree>
+    <p:extLst>
+      <p:ext uri="{BB962C8B-B14F-4D97-AF65-F5344CB8AC3E}">
+        <p14:creationId xmlns:p14="http://schemas.microsoft.com/office/powerpoint/2010/main" val="1654212064"/>
       </p:ext>
     </p:extLst>
   </p:cSld>
@@ -9486,7 +9755,7 @@
             <a:fld id="{1449AA12-8195-4182-A7AC-2E7E59DFBDAF}" type="datetimeFigureOut">
               <a:rPr lang="en-US" smtClean="0"/>
               <a:pPr algn="r"/>
-              <a:t>1/14/2023</a:t>
+              <a:t>1/16/2023</a:t>
             </a:fld>
             <a:endParaRPr lang="en-US"/>
           </a:p>
@@ -9562,13 +9831,13 @@
   <p:clrMapOvr>
     <a:masterClrMapping/>
   </p:clrMapOvr>
-  <mc:AlternateContent xmlns:mc="http://schemas.openxmlformats.org/markup-compatibility/2006">
-    <mc:Choice xmlns:p159="http://schemas.microsoft.com/office/powerpoint/2015/09/main" Requires="p159">
+  <mc:AlternateContent xmlns:mc="http://schemas.openxmlformats.org/markup-compatibility/2006" xmlns:p159="http://schemas.microsoft.com/office/powerpoint/2015/09/main">
+    <mc:Choice Requires="p159">
       <p:transition xmlns:p14="http://schemas.microsoft.com/office/powerpoint/2010/main" spd="slow" p14:dur="2000">
         <p159:morph option="byObject"/>
       </p:transition>
     </mc:Choice>
-    <mc:Fallback>
+    <mc:Fallback xmlns="">
       <p:transition spd="slow">
         <p:fade/>
       </p:transition>
@@ -9714,7 +9983,7 @@
           <a:p>
             <a:fld id="{1449AA12-8195-4182-A7AC-2E7E59DFBDAF}" type="datetimeFigureOut">
               <a:rPr lang="en-US" smtClean="0"/>
-              <a:t>1/14/2023</a:t>
+              <a:t>1/16/2023</a:t>
             </a:fld>
             <a:endParaRPr lang="en-US"/>
           </a:p>
@@ -9948,13 +10217,13 @@
   <p:clrMapOvr>
     <a:masterClrMapping/>
   </p:clrMapOvr>
-  <mc:AlternateContent xmlns:mc="http://schemas.openxmlformats.org/markup-compatibility/2006">
-    <mc:Choice xmlns:p159="http://schemas.microsoft.com/office/powerpoint/2015/09/main" Requires="p159">
+  <mc:AlternateContent xmlns:mc="http://schemas.openxmlformats.org/markup-compatibility/2006" xmlns:p159="http://schemas.microsoft.com/office/powerpoint/2015/09/main">
+    <mc:Choice Requires="p159">
       <p:transition xmlns:p14="http://schemas.microsoft.com/office/powerpoint/2010/main" spd="slow" p14:dur="2000">
         <p159:morph option="byObject"/>
       </p:transition>
     </mc:Choice>
-    <mc:Fallback>
+    <mc:Fallback xmlns="">
       <p:transition spd="slow">
         <p:fade/>
       </p:transition>
@@ -10098,7 +10367,7 @@
           <a:p>
             <a:fld id="{1449AA12-8195-4182-A7AC-2E7E59DFBDAF}" type="datetimeFigureOut">
               <a:rPr lang="en-US" smtClean="0"/>
-              <a:t>1/14/2023</a:t>
+              <a:t>1/16/2023</a:t>
             </a:fld>
             <a:endParaRPr lang="en-US"/>
           </a:p>
@@ -10332,13 +10601,13 @@
   <p:clrMapOvr>
     <a:masterClrMapping/>
   </p:clrMapOvr>
-  <mc:AlternateContent xmlns:mc="http://schemas.openxmlformats.org/markup-compatibility/2006">
-    <mc:Choice xmlns:p159="http://schemas.microsoft.com/office/powerpoint/2015/09/main" Requires="p159">
+  <mc:AlternateContent xmlns:mc="http://schemas.openxmlformats.org/markup-compatibility/2006" xmlns:p159="http://schemas.microsoft.com/office/powerpoint/2015/09/main">
+    <mc:Choice Requires="p159">
       <p:transition xmlns:p14="http://schemas.microsoft.com/office/powerpoint/2010/main" spd="slow" p14:dur="2000">
         <p159:morph option="byObject"/>
       </p:transition>
     </mc:Choice>
-    <mc:Fallback>
+    <mc:Fallback xmlns="">
       <p:transition spd="slow">
         <p:fade/>
       </p:transition>
@@ -10472,7 +10741,7 @@
           <a:p>
             <a:fld id="{1449AA12-8195-4182-A7AC-2E7E59DFBDAF}" type="datetimeFigureOut">
               <a:rPr lang="en-US" smtClean="0"/>
-              <a:t>1/14/2023</a:t>
+              <a:t>1/16/2023</a:t>
             </a:fld>
             <a:endParaRPr lang="en-US"/>
           </a:p>
@@ -10706,13 +10975,13 @@
   <p:clrMapOvr>
     <a:masterClrMapping/>
   </p:clrMapOvr>
-  <mc:AlternateContent xmlns:mc="http://schemas.openxmlformats.org/markup-compatibility/2006">
-    <mc:Choice xmlns:p159="http://schemas.microsoft.com/office/powerpoint/2015/09/main" Requires="p159">
+  <mc:AlternateContent xmlns:mc="http://schemas.openxmlformats.org/markup-compatibility/2006" xmlns:p159="http://schemas.microsoft.com/office/powerpoint/2015/09/main">
+    <mc:Choice Requires="p159">
       <p:transition xmlns:p14="http://schemas.microsoft.com/office/powerpoint/2010/main" spd="slow" p14:dur="2000">
         <p159:morph option="byObject"/>
       </p:transition>
     </mc:Choice>
-    <mc:Fallback>
+    <mc:Fallback xmlns="">
       <p:transition spd="slow">
         <p:fade/>
       </p:transition>
@@ -10924,7 +11193,7 @@
           <a:p>
             <a:fld id="{1449AA12-8195-4182-A7AC-2E7E59DFBDAF}" type="datetimeFigureOut">
               <a:rPr lang="en-US" smtClean="0"/>
-              <a:t>1/14/2023</a:t>
+              <a:t>1/16/2023</a:t>
             </a:fld>
             <a:endParaRPr lang="en-US"/>
           </a:p>
@@ -11163,13 +11432,13 @@
   <p:clrMapOvr>
     <a:masterClrMapping/>
   </p:clrMapOvr>
-  <mc:AlternateContent xmlns:mc="http://schemas.openxmlformats.org/markup-compatibility/2006">
-    <mc:Choice xmlns:p159="http://schemas.microsoft.com/office/powerpoint/2015/09/main" Requires="p159">
+  <mc:AlternateContent xmlns:mc="http://schemas.openxmlformats.org/markup-compatibility/2006" xmlns:p159="http://schemas.microsoft.com/office/powerpoint/2015/09/main">
+    <mc:Choice Requires="p159">
       <p:transition xmlns:p14="http://schemas.microsoft.com/office/powerpoint/2010/main" spd="slow" p14:dur="2000">
         <p159:morph option="byObject"/>
       </p:transition>
     </mc:Choice>
-    <mc:Fallback>
+    <mc:Fallback xmlns="">
       <p:transition spd="slow">
         <p:fade/>
       </p:transition>
@@ -11376,7 +11645,7 @@
           <a:p>
             <a:fld id="{1449AA12-8195-4182-A7AC-2E7E59DFBDAF}" type="datetimeFigureOut">
               <a:rPr lang="en-US" smtClean="0"/>
-              <a:t>1/14/2023</a:t>
+              <a:t>1/16/2023</a:t>
             </a:fld>
             <a:endParaRPr lang="en-US"/>
           </a:p>
@@ -11610,13 +11879,13 @@
   <p:clrMapOvr>
     <a:masterClrMapping/>
   </p:clrMapOvr>
-  <mc:AlternateContent xmlns:mc="http://schemas.openxmlformats.org/markup-compatibility/2006">
-    <mc:Choice xmlns:p159="http://schemas.microsoft.com/office/powerpoint/2015/09/main" Requires="p159">
+  <mc:AlternateContent xmlns:mc="http://schemas.openxmlformats.org/markup-compatibility/2006" xmlns:p159="http://schemas.microsoft.com/office/powerpoint/2015/09/main">
+    <mc:Choice Requires="p159">
       <p:transition xmlns:p14="http://schemas.microsoft.com/office/powerpoint/2010/main" spd="slow" p14:dur="2000">
         <p159:morph option="byObject"/>
       </p:transition>
     </mc:Choice>
-    <mc:Fallback>
+    <mc:Fallback xmlns="">
       <p:transition spd="slow">
         <p:fade/>
       </p:transition>
@@ -11996,7 +12265,7 @@
           <a:p>
             <a:fld id="{1449AA12-8195-4182-A7AC-2E7E59DFBDAF}" type="datetimeFigureOut">
               <a:rPr lang="en-US" smtClean="0"/>
-              <a:t>1/14/2023</a:t>
+              <a:t>1/16/2023</a:t>
             </a:fld>
             <a:endParaRPr lang="en-US"/>
           </a:p>
@@ -12230,13 +12499,13 @@
   <p:clrMapOvr>
     <a:masterClrMapping/>
   </p:clrMapOvr>
-  <mc:AlternateContent xmlns:mc="http://schemas.openxmlformats.org/markup-compatibility/2006">
-    <mc:Choice xmlns:p159="http://schemas.microsoft.com/office/powerpoint/2015/09/main" Requires="p159">
+  <mc:AlternateContent xmlns:mc="http://schemas.openxmlformats.org/markup-compatibility/2006" xmlns:p159="http://schemas.microsoft.com/office/powerpoint/2015/09/main">
+    <mc:Choice Requires="p159">
       <p:transition xmlns:p14="http://schemas.microsoft.com/office/powerpoint/2010/main" spd="slow" p14:dur="2000">
         <p159:morph option="byObject"/>
       </p:transition>
     </mc:Choice>
-    <mc:Fallback>
+    <mc:Fallback xmlns="">
       <p:transition spd="slow">
         <p:fade/>
       </p:transition>
@@ -12313,7 +12582,7 @@
           <a:p>
             <a:fld id="{1449AA12-8195-4182-A7AC-2E7E59DFBDAF}" type="datetimeFigureOut">
               <a:rPr lang="en-US" smtClean="0"/>
-              <a:t>1/14/2023</a:t>
+              <a:t>1/16/2023</a:t>
             </a:fld>
             <a:endParaRPr lang="en-US"/>
           </a:p>
@@ -12547,13 +12816,13 @@
   <p:clrMapOvr>
     <a:masterClrMapping/>
   </p:clrMapOvr>
-  <mc:AlternateContent xmlns:mc="http://schemas.openxmlformats.org/markup-compatibility/2006">
-    <mc:Choice xmlns:p159="http://schemas.microsoft.com/office/powerpoint/2015/09/main" Requires="p159">
+  <mc:AlternateContent xmlns:mc="http://schemas.openxmlformats.org/markup-compatibility/2006" xmlns:p159="http://schemas.microsoft.com/office/powerpoint/2015/09/main">
+    <mc:Choice Requires="p159">
       <p:transition xmlns:p14="http://schemas.microsoft.com/office/powerpoint/2010/main" spd="slow" p14:dur="2000">
         <p159:morph option="byObject"/>
       </p:transition>
     </mc:Choice>
-    <mc:Fallback>
+    <mc:Fallback xmlns="">
       <p:transition spd="slow">
         <p:fade/>
       </p:transition>
@@ -12602,7 +12871,7 @@
           <a:p>
             <a:fld id="{1449AA12-8195-4182-A7AC-2E7E59DFBDAF}" type="datetimeFigureOut">
               <a:rPr lang="en-US" smtClean="0"/>
-              <a:t>1/14/2023</a:t>
+              <a:t>1/16/2023</a:t>
             </a:fld>
             <a:endParaRPr lang="en-US"/>
           </a:p>
@@ -12836,13 +13105,13 @@
   <p:clrMapOvr>
     <a:masterClrMapping/>
   </p:clrMapOvr>
-  <mc:AlternateContent xmlns:mc="http://schemas.openxmlformats.org/markup-compatibility/2006">
-    <mc:Choice xmlns:p159="http://schemas.microsoft.com/office/powerpoint/2015/09/main" Requires="p159">
+  <mc:AlternateContent xmlns:mc="http://schemas.openxmlformats.org/markup-compatibility/2006" xmlns:p159="http://schemas.microsoft.com/office/powerpoint/2015/09/main">
+    <mc:Choice Requires="p159">
       <p:transition xmlns:p14="http://schemas.microsoft.com/office/powerpoint/2010/main" spd="slow" p14:dur="2000">
         <p159:morph option="byObject"/>
       </p:transition>
     </mc:Choice>
-    <mc:Fallback>
+    <mc:Fallback xmlns="">
       <p:transition spd="slow">
         <p:fade/>
       </p:transition>
@@ -13091,7 +13360,7 @@
           <a:p>
             <a:fld id="{1449AA12-8195-4182-A7AC-2E7E59DFBDAF}" type="datetimeFigureOut">
               <a:rPr lang="en-US" smtClean="0"/>
-              <a:t>1/14/2023</a:t>
+              <a:t>1/16/2023</a:t>
             </a:fld>
             <a:endParaRPr lang="en-US"/>
           </a:p>
@@ -13325,13 +13594,13 @@
   <p:clrMapOvr>
     <a:masterClrMapping/>
   </p:clrMapOvr>
-  <mc:AlternateContent xmlns:mc="http://schemas.openxmlformats.org/markup-compatibility/2006">
-    <mc:Choice xmlns:p159="http://schemas.microsoft.com/office/powerpoint/2015/09/main" Requires="p159">
+  <mc:AlternateContent xmlns:mc="http://schemas.openxmlformats.org/markup-compatibility/2006" xmlns:p159="http://schemas.microsoft.com/office/powerpoint/2015/09/main">
+    <mc:Choice Requires="p159">
       <p:transition xmlns:p14="http://schemas.microsoft.com/office/powerpoint/2010/main" spd="slow" p14:dur="2000">
         <p159:morph option="byObject"/>
       </p:transition>
     </mc:Choice>
-    <mc:Fallback>
+    <mc:Fallback xmlns="">
       <p:transition spd="slow">
         <p:fade/>
       </p:transition>
@@ -13558,7 +13827,7 @@
           <a:p>
             <a:fld id="{1449AA12-8195-4182-A7AC-2E7E59DFBDAF}" type="datetimeFigureOut">
               <a:rPr lang="en-US" smtClean="0"/>
-              <a:t>1/14/2023</a:t>
+              <a:t>1/16/2023</a:t>
             </a:fld>
             <a:endParaRPr lang="en-US"/>
           </a:p>
@@ -13792,13 +14061,13 @@
   <p:clrMapOvr>
     <a:masterClrMapping/>
   </p:clrMapOvr>
-  <mc:AlternateContent xmlns:mc="http://schemas.openxmlformats.org/markup-compatibility/2006">
-    <mc:Choice xmlns:p159="http://schemas.microsoft.com/office/powerpoint/2015/09/main" Requires="p159">
+  <mc:AlternateContent xmlns:mc="http://schemas.openxmlformats.org/markup-compatibility/2006" xmlns:p159="http://schemas.microsoft.com/office/powerpoint/2015/09/main">
+    <mc:Choice Requires="p159">
       <p:transition xmlns:p14="http://schemas.microsoft.com/office/powerpoint/2010/main" spd="slow" p14:dur="2000">
         <p159:morph option="byObject"/>
       </p:transition>
     </mc:Choice>
-    <mc:Fallback>
+    <mc:Fallback xmlns="">
       <p:transition spd="slow">
         <p:fade/>
       </p:transition>
@@ -13976,7 +14245,7 @@
             <a:fld id="{1449AA12-8195-4182-A7AC-2E7E59DFBDAF}" type="datetimeFigureOut">
               <a:rPr lang="en-US" smtClean="0"/>
               <a:pPr/>
-              <a:t>1/14/2023</a:t>
+              <a:t>1/16/2023</a:t>
             </a:fld>
             <a:endParaRPr lang="en-US"/>
           </a:p>
@@ -14094,13 +14363,13 @@
     <p:sldLayoutId id="2147483665" r:id="rId10"/>
     <p:sldLayoutId id="2147483667" r:id="rId11"/>
   </p:sldLayoutIdLst>
-  <mc:AlternateContent xmlns:mc="http://schemas.openxmlformats.org/markup-compatibility/2006">
-    <mc:Choice xmlns:p159="http://schemas.microsoft.com/office/powerpoint/2015/09/main" Requires="p159">
+  <mc:AlternateContent xmlns:mc="http://schemas.openxmlformats.org/markup-compatibility/2006" xmlns:p159="http://schemas.microsoft.com/office/powerpoint/2015/09/main">
+    <mc:Choice Requires="p159">
       <p:transition xmlns:p14="http://schemas.microsoft.com/office/powerpoint/2010/main" spd="slow" p14:dur="2000">
         <p159:morph option="byObject"/>
       </p:transition>
     </mc:Choice>
-    <mc:Fallback>
+    <mc:Fallback xmlns="">
       <p:transition spd="slow">
         <p:fade/>
       </p:transition>
@@ -14895,13 +15164,13 @@
   <p:clrMapOvr>
     <a:masterClrMapping/>
   </p:clrMapOvr>
-  <mc:AlternateContent xmlns:mc="http://schemas.openxmlformats.org/markup-compatibility/2006">
-    <mc:Choice xmlns:p159="http://schemas.microsoft.com/office/powerpoint/2015/09/main" Requires="p159">
+  <mc:AlternateContent xmlns:mc="http://schemas.openxmlformats.org/markup-compatibility/2006" xmlns:p159="http://schemas.microsoft.com/office/powerpoint/2015/09/main">
+    <mc:Choice Requires="p159">
       <p:transition xmlns:p14="http://schemas.microsoft.com/office/powerpoint/2010/main" spd="slow" p14:dur="2000" advTm="35000">
         <p159:morph option="byObject"/>
       </p:transition>
     </mc:Choice>
-    <mc:Fallback>
+    <mc:Fallback xmlns="">
       <p:transition spd="slow" advTm="35000">
         <p:fade/>
       </p:transition>
@@ -15388,13 +15657,13 @@
   <p:clrMapOvr>
     <a:masterClrMapping/>
   </p:clrMapOvr>
-  <mc:AlternateContent xmlns:mc="http://schemas.openxmlformats.org/markup-compatibility/2006">
-    <mc:Choice xmlns:p159="http://schemas.microsoft.com/office/powerpoint/2015/09/main" Requires="p159">
+  <mc:AlternateContent xmlns:mc="http://schemas.openxmlformats.org/markup-compatibility/2006" xmlns:p159="http://schemas.microsoft.com/office/powerpoint/2015/09/main">
+    <mc:Choice Requires="p159">
       <p:transition xmlns:p14="http://schemas.microsoft.com/office/powerpoint/2010/main" spd="slow" p14:dur="2000">
         <p159:morph option="byObject"/>
       </p:transition>
     </mc:Choice>
-    <mc:Fallback>
+    <mc:Fallback xmlns="">
       <p:transition spd="slow">
         <p:fade/>
       </p:transition>
@@ -16203,13 +16472,13 @@
   <p:clrMapOvr>
     <a:masterClrMapping/>
   </p:clrMapOvr>
-  <mc:AlternateContent xmlns:mc="http://schemas.openxmlformats.org/markup-compatibility/2006">
-    <mc:Choice xmlns:p159="http://schemas.microsoft.com/office/powerpoint/2015/09/main" Requires="p159">
+  <mc:AlternateContent xmlns:mc="http://schemas.openxmlformats.org/markup-compatibility/2006" xmlns:p159="http://schemas.microsoft.com/office/powerpoint/2015/09/main">
+    <mc:Choice Requires="p159">
       <p:transition xmlns:p14="http://schemas.microsoft.com/office/powerpoint/2010/main" spd="slow" p14:dur="2000">
         <p159:morph option="byObject"/>
       </p:transition>
     </mc:Choice>
-    <mc:Fallback>
+    <mc:Fallback xmlns="">
       <p:transition spd="slow">
         <p:fade/>
       </p:transition>
@@ -16455,13 +16724,13 @@
   <p:clrMapOvr>
     <a:masterClrMapping/>
   </p:clrMapOvr>
-  <mc:AlternateContent xmlns:mc="http://schemas.openxmlformats.org/markup-compatibility/2006">
-    <mc:Choice xmlns:p159="http://schemas.microsoft.com/office/powerpoint/2015/09/main" Requires="p159">
+  <mc:AlternateContent xmlns:mc="http://schemas.openxmlformats.org/markup-compatibility/2006" xmlns:p159="http://schemas.microsoft.com/office/powerpoint/2015/09/main">
+    <mc:Choice Requires="p159">
       <p:transition xmlns:p14="http://schemas.microsoft.com/office/powerpoint/2010/main" spd="slow" p14:dur="2000">
         <p159:morph option="byObject"/>
       </p:transition>
     </mc:Choice>
-    <mc:Fallback>
+    <mc:Fallback xmlns="">
       <p:transition spd="slow">
         <p:fade/>
       </p:transition>
@@ -16950,13 +17219,13 @@
   <p:clrMapOvr>
     <a:masterClrMapping/>
   </p:clrMapOvr>
-  <mc:AlternateContent xmlns:mc="http://schemas.openxmlformats.org/markup-compatibility/2006">
-    <mc:Choice xmlns:p159="http://schemas.microsoft.com/office/powerpoint/2015/09/main" Requires="p159">
+  <mc:AlternateContent xmlns:mc="http://schemas.openxmlformats.org/markup-compatibility/2006" xmlns:p159="http://schemas.microsoft.com/office/powerpoint/2015/09/main">
+    <mc:Choice Requires="p159">
       <p:transition xmlns:p14="http://schemas.microsoft.com/office/powerpoint/2010/main" spd="slow" p14:dur="2000">
         <p159:morph option="byObject"/>
       </p:transition>
     </mc:Choice>
-    <mc:Fallback>
+    <mc:Fallback xmlns="">
       <p:transition spd="slow">
         <p:fade/>
       </p:transition>
@@ -17420,13 +17689,13 @@
   <p:clrMapOvr>
     <a:masterClrMapping/>
   </p:clrMapOvr>
-  <mc:AlternateContent xmlns:mc="http://schemas.openxmlformats.org/markup-compatibility/2006">
-    <mc:Choice xmlns:p159="http://schemas.microsoft.com/office/powerpoint/2015/09/main" Requires="p159">
+  <mc:AlternateContent xmlns:mc="http://schemas.openxmlformats.org/markup-compatibility/2006" xmlns:p159="http://schemas.microsoft.com/office/powerpoint/2015/09/main">
+    <mc:Choice Requires="p159">
       <p:transition xmlns:p14="http://schemas.microsoft.com/office/powerpoint/2010/main" spd="slow" p14:dur="2000">
         <p159:morph option="byObject"/>
       </p:transition>
     </mc:Choice>
-    <mc:Fallback>
+    <mc:Fallback xmlns="">
       <p:transition spd="slow">
         <p:fade/>
       </p:transition>
@@ -17694,45 +17963,49 @@
           </a:p>
         </p:txBody>
       </p:sp>
-      <p:sp>
-        <p:nvSpPr>
-          <p:cNvPr id="3" name="Content Placeholder 2">
+      <p:pic>
+        <p:nvPicPr>
+          <p:cNvPr id="7" name="Zástupný obsah 6" descr="Domov">
+            <a:hlinkClick r:id="rId3" action="ppaction://hlinksldjump"/>
             <a:extLst>
               <a:ext uri="{FF2B5EF4-FFF2-40B4-BE49-F238E27FC236}">
-                <a16:creationId xmlns:a16="http://schemas.microsoft.com/office/drawing/2014/main" id="{B5513E54-8C7B-E8F2-6BBE-9403D0DC09CB}"/>
+                <a16:creationId xmlns:a16="http://schemas.microsoft.com/office/drawing/2014/main" id="{DEC0BFC0-2C67-48EB-9E5F-F7754B6BB9DC}"/>
               </a:ext>
             </a:extLst>
           </p:cNvPr>
-          <p:cNvSpPr>
-            <a:spLocks noGrp="1"/>
-          </p:cNvSpPr>
+          <p:cNvPicPr>
+            <a:picLocks noGrp="1" noChangeAspect="1"/>
+          </p:cNvPicPr>
           <p:nvPr>
             <p:ph idx="1"/>
           </p:nvPr>
-        </p:nvSpPr>
-        <p:spPr/>
-        <p:txBody>
-          <a:bodyPr/>
-          <a:lstStyle/>
-          <a:p>
-            <a:r>
-              <a:rPr lang="cs-CZ" dirty="0"/>
-              <a:t>Zde </a:t>
-            </a:r>
-            <a:r>
-              <a:rPr lang="cs-CZ"/>
-              <a:t>budou ikony</a:t>
-            </a:r>
-          </a:p>
-          <a:p>
-            <a:endParaRPr lang="cs-CZ"/>
-          </a:p>
-        </p:txBody>
-      </p:sp>
+        </p:nvPicPr>
+        <p:blipFill>
+          <a:blip r:embed="rId4">
+            <a:extLst>
+              <a:ext uri="{28A0092B-C50C-407E-A947-70E740481C1C}">
+                <a14:useLocalDpi xmlns:a14="http://schemas.microsoft.com/office/drawing/2010/main" val="0"/>
+              </a:ext>
+              <a:ext uri="{96DAC541-7B7A-43D3-8B79-37D633B846F1}">
+                <asvg:svgBlip xmlns:asvg="http://schemas.microsoft.com/office/drawing/2016/SVG/main" r:embed="rId5"/>
+              </a:ext>
+            </a:extLst>
+          </a:blip>
+          <a:stretch>
+            <a:fillRect/>
+          </a:stretch>
+        </p:blipFill>
+        <p:spPr>
+          <a:xfrm>
+            <a:off x="2908482" y="3102428"/>
+            <a:ext cx="914400" cy="914400"/>
+          </a:xfrm>
+        </p:spPr>
+      </p:pic>
       <p:sp>
         <p:nvSpPr>
           <p:cNvPr id="4" name="Action Button: Go Home 3">
-            <a:hlinkClick r:id="rId3" action="ppaction://hlinksldjump" highlightClick="1"/>
+            <a:hlinkClick r:id="rId6" action="ppaction://hlinksldjump" highlightClick="1"/>
             <a:extLst>
               <a:ext uri="{FF2B5EF4-FFF2-40B4-BE49-F238E27FC236}">
                 <a16:creationId xmlns:a16="http://schemas.microsoft.com/office/drawing/2014/main" id="{BD544D2A-D781-58F2-AA26-30640C560837}"/>
@@ -17841,6 +18114,194 @@
           </a:p>
         </p:txBody>
       </p:sp>
+      <p:pic>
+        <p:nvPicPr>
+          <p:cNvPr id="9" name="Grafický objekt 8" descr="Webová kamera">
+            <a:hlinkClick r:id="rId7" action="ppaction://hlinksldjump"/>
+            <a:extLst>
+              <a:ext uri="{FF2B5EF4-FFF2-40B4-BE49-F238E27FC236}">
+                <a16:creationId xmlns:a16="http://schemas.microsoft.com/office/drawing/2014/main" id="{54530430-29D4-4BBF-B981-56A5565AE964}"/>
+              </a:ext>
+            </a:extLst>
+          </p:cNvPr>
+          <p:cNvPicPr>
+            <a:picLocks noChangeAspect="1"/>
+          </p:cNvPicPr>
+          <p:nvPr/>
+        </p:nvPicPr>
+        <p:blipFill>
+          <a:blip r:embed="rId8">
+            <a:extLst>
+              <a:ext uri="{28A0092B-C50C-407E-A947-70E740481C1C}">
+                <a14:useLocalDpi xmlns:a14="http://schemas.microsoft.com/office/drawing/2010/main" val="0"/>
+              </a:ext>
+              <a:ext uri="{96DAC541-7B7A-43D3-8B79-37D633B846F1}">
+                <asvg:svgBlip xmlns:asvg="http://schemas.microsoft.com/office/drawing/2016/SVG/main" r:embed="rId9"/>
+              </a:ext>
+            </a:extLst>
+          </a:blip>
+          <a:stretch>
+            <a:fillRect/>
+          </a:stretch>
+        </p:blipFill>
+        <p:spPr>
+          <a:xfrm>
+            <a:off x="5576750" y="3004458"/>
+            <a:ext cx="1219201" cy="1175656"/>
+          </a:xfrm>
+          <a:prstGeom prst="rect">
+            <a:avLst/>
+          </a:prstGeom>
+        </p:spPr>
+      </p:pic>
+      <p:pic>
+        <p:nvPicPr>
+          <p:cNvPr id="11" name="Grafický objekt 10" descr="Střed terče">
+            <a:hlinkClick r:id="rId10" action="ppaction://hlinksldjump"/>
+            <a:extLst>
+              <a:ext uri="{FF2B5EF4-FFF2-40B4-BE49-F238E27FC236}">
+                <a16:creationId xmlns:a16="http://schemas.microsoft.com/office/drawing/2014/main" id="{7AEC728A-129C-4352-B505-27B0AA5A01D2}"/>
+              </a:ext>
+            </a:extLst>
+          </p:cNvPr>
+          <p:cNvPicPr>
+            <a:picLocks noChangeAspect="1"/>
+          </p:cNvPicPr>
+          <p:nvPr/>
+        </p:nvPicPr>
+        <p:blipFill>
+          <a:blip r:embed="rId11">
+            <a:extLst>
+              <a:ext uri="{28A0092B-C50C-407E-A947-70E740481C1C}">
+                <a14:useLocalDpi xmlns:a14="http://schemas.microsoft.com/office/drawing/2010/main" val="0"/>
+              </a:ext>
+              <a:ext uri="{96DAC541-7B7A-43D3-8B79-37D633B846F1}">
+                <asvg:svgBlip xmlns:asvg="http://schemas.microsoft.com/office/drawing/2016/SVG/main" r:embed="rId12"/>
+              </a:ext>
+            </a:extLst>
+          </a:blip>
+          <a:stretch>
+            <a:fillRect/>
+          </a:stretch>
+        </p:blipFill>
+        <p:spPr>
+          <a:xfrm>
+            <a:off x="8369118" y="3102428"/>
+            <a:ext cx="914400" cy="914400"/>
+          </a:xfrm>
+          <a:prstGeom prst="rect">
+            <a:avLst/>
+          </a:prstGeom>
+        </p:spPr>
+      </p:pic>
+      <p:sp>
+        <p:nvSpPr>
+          <p:cNvPr id="12" name="TextovéPole 11">
+            <a:extLst>
+              <a:ext uri="{FF2B5EF4-FFF2-40B4-BE49-F238E27FC236}">
+                <a16:creationId xmlns:a16="http://schemas.microsoft.com/office/drawing/2014/main" id="{8024EBD6-5A3F-4B0D-A084-6904316297F9}"/>
+              </a:ext>
+            </a:extLst>
+          </p:cNvPr>
+          <p:cNvSpPr txBox="1"/>
+          <p:nvPr/>
+        </p:nvSpPr>
+        <p:spPr>
+          <a:xfrm>
+            <a:off x="2392499" y="4167051"/>
+            <a:ext cx="1946365" cy="369332"/>
+          </a:xfrm>
+          <a:prstGeom prst="rect">
+            <a:avLst/>
+          </a:prstGeom>
+          <a:noFill/>
+        </p:spPr>
+        <p:txBody>
+          <a:bodyPr wrap="square" rtlCol="0">
+            <a:spAutoFit/>
+          </a:bodyPr>
+          <a:lstStyle/>
+          <a:p>
+            <a:pPr algn="ctr"/>
+            <a:r>
+              <a:rPr lang="cs-CZ" dirty="0"/>
+              <a:t>Pro uživatele</a:t>
+            </a:r>
+          </a:p>
+        </p:txBody>
+      </p:sp>
+      <p:sp>
+        <p:nvSpPr>
+          <p:cNvPr id="13" name="TextovéPole 12">
+            <a:extLst>
+              <a:ext uri="{FF2B5EF4-FFF2-40B4-BE49-F238E27FC236}">
+                <a16:creationId xmlns:a16="http://schemas.microsoft.com/office/drawing/2014/main" id="{0113DCF4-3A25-4255-B340-F0A17C1B84E5}"/>
+              </a:ext>
+            </a:extLst>
+          </p:cNvPr>
+          <p:cNvSpPr txBox="1"/>
+          <p:nvPr/>
+        </p:nvSpPr>
+        <p:spPr>
+          <a:xfrm>
+            <a:off x="5122816" y="4180113"/>
+            <a:ext cx="1946365" cy="369332"/>
+          </a:xfrm>
+          <a:prstGeom prst="rect">
+            <a:avLst/>
+          </a:prstGeom>
+          <a:noFill/>
+        </p:spPr>
+        <p:txBody>
+          <a:bodyPr wrap="square" rtlCol="0">
+            <a:spAutoFit/>
+          </a:bodyPr>
+          <a:lstStyle/>
+          <a:p>
+            <a:pPr algn="ctr"/>
+            <a:r>
+              <a:rPr lang="cs-CZ" dirty="0"/>
+              <a:t>Pro bezpečnost</a:t>
+            </a:r>
+          </a:p>
+        </p:txBody>
+      </p:sp>
+      <p:sp>
+        <p:nvSpPr>
+          <p:cNvPr id="14" name="TextovéPole 13">
+            <a:extLst>
+              <a:ext uri="{FF2B5EF4-FFF2-40B4-BE49-F238E27FC236}">
+                <a16:creationId xmlns:a16="http://schemas.microsoft.com/office/drawing/2014/main" id="{BF873E87-FE2E-4C82-B63C-00B9AB165105}"/>
+              </a:ext>
+            </a:extLst>
+          </p:cNvPr>
+          <p:cNvSpPr txBox="1"/>
+          <p:nvPr/>
+        </p:nvSpPr>
+        <p:spPr>
+          <a:xfrm>
+            <a:off x="8033838" y="4180113"/>
+            <a:ext cx="1584960" cy="369332"/>
+          </a:xfrm>
+          <a:prstGeom prst="rect">
+            <a:avLst/>
+          </a:prstGeom>
+          <a:noFill/>
+        </p:spPr>
+        <p:txBody>
+          <a:bodyPr wrap="square" rtlCol="0">
+            <a:spAutoFit/>
+          </a:bodyPr>
+          <a:lstStyle/>
+          <a:p>
+            <a:pPr algn="ctr"/>
+            <a:r>
+              <a:rPr lang="cs-CZ" dirty="0"/>
+              <a:t>Unikáty</a:t>
+            </a:r>
+          </a:p>
+        </p:txBody>
+      </p:sp>
     </p:spTree>
     <p:extLst>
       <p:ext uri="{BB962C8B-B14F-4D97-AF65-F5344CB8AC3E}">
@@ -17851,13 +18312,13 @@
   <p:clrMapOvr>
     <a:masterClrMapping/>
   </p:clrMapOvr>
-  <mc:AlternateContent xmlns:mc="http://schemas.openxmlformats.org/markup-compatibility/2006">
-    <mc:Choice xmlns:p159="http://schemas.microsoft.com/office/powerpoint/2015/09/main" Requires="p159">
+  <mc:AlternateContent xmlns:mc="http://schemas.openxmlformats.org/markup-compatibility/2006" xmlns:p159="http://schemas.microsoft.com/office/powerpoint/2015/09/main">
+    <mc:Choice Requires="p159">
       <p:transition xmlns:p14="http://schemas.microsoft.com/office/powerpoint/2010/main" spd="slow" p14:dur="2000">
         <p159:morph option="byObject"/>
       </p:transition>
     </mc:Choice>
-    <mc:Fallback>
+    <mc:Fallback xmlns="">
       <p:transition spd="slow">
         <p:fade/>
       </p:transition>
@@ -18077,6 +18538,1518 @@
       <p:bldP spid="5" grpId="0" animBg="1"/>
     </p:bldLst>
   </p:timing>
+</p:sld>
+</file>
+
+<file path=ppt/slides/slide16.xml><?xml version="1.0" encoding="utf-8"?>
+<p:sld xmlns:a="http://schemas.openxmlformats.org/drawingml/2006/main" xmlns:r="http://schemas.openxmlformats.org/officeDocument/2006/relationships" xmlns:p="http://schemas.openxmlformats.org/presentationml/2006/main">
+  <p:cSld>
+    <p:bg>
+      <p:bgPr>
+        <a:solidFill>
+          <a:schemeClr val="bg1"/>
+        </a:solidFill>
+        <a:effectLst/>
+      </p:bgPr>
+    </p:bg>
+    <p:spTree>
+      <p:nvGrpSpPr>
+        <p:cNvPr id="1" name=""/>
+        <p:cNvGrpSpPr/>
+        <p:nvPr/>
+      </p:nvGrpSpPr>
+      <p:grpSpPr>
+        <a:xfrm>
+          <a:off x="0" y="0"/>
+          <a:ext cx="0" cy="0"/>
+          <a:chOff x="0" y="0"/>
+          <a:chExt cx="0" cy="0"/>
+        </a:xfrm>
+      </p:grpSpPr>
+      <p:sp useBgFill="1">
+        <p:nvSpPr>
+          <p:cNvPr id="9" name="Rectangle 8">
+            <a:extLst>
+              <a:ext uri="{FF2B5EF4-FFF2-40B4-BE49-F238E27FC236}">
+                <a16:creationId xmlns:a16="http://schemas.microsoft.com/office/drawing/2014/main" id="{C868C70C-E5C4-CD47-888C-FCB3373B6D38}"/>
+              </a:ext>
+              <a:ext uri="{C183D7F6-B498-43B3-948B-1728B52AA6E4}">
+                <adec:decorative xmlns:adec="http://schemas.microsoft.com/office/drawing/2017/decorative" val="1"/>
+              </a:ext>
+            </a:extLst>
+          </p:cNvPr>
+          <p:cNvSpPr>
+            <a:spLocks noGrp="1" noRot="1" noChangeAspect="1" noMove="1" noResize="1" noEditPoints="1" noAdjustHandles="1" noChangeArrowheads="1" noChangeShapeType="1" noTextEdit="1"/>
+          </p:cNvSpPr>
+          <p:nvPr>
+            <p:extLst>
+              <p:ext uri="{386F3935-93C4-4BCD-93E2-E3B085C9AB24}">
+                <p16:designElem xmlns:p16="http://schemas.microsoft.com/office/powerpoint/2015/main" val="1"/>
+              </p:ext>
+            </p:extLst>
+          </p:nvPr>
+        </p:nvSpPr>
+        <p:spPr>
+          <a:xfrm>
+            <a:off x="0" y="0"/>
+            <a:ext cx="12188952" cy="6858000"/>
+          </a:xfrm>
+          <a:prstGeom prst="rect">
+            <a:avLst/>
+          </a:prstGeom>
+          <a:ln>
+            <a:noFill/>
+          </a:ln>
+        </p:spPr>
+        <p:style>
+          <a:lnRef idx="2">
+            <a:schemeClr val="accent1">
+              <a:shade val="50000"/>
+            </a:schemeClr>
+          </a:lnRef>
+          <a:fillRef idx="1">
+            <a:schemeClr val="accent1"/>
+          </a:fillRef>
+          <a:effectRef idx="0">
+            <a:schemeClr val="accent1"/>
+          </a:effectRef>
+          <a:fontRef idx="minor">
+            <a:schemeClr val="lt1"/>
+          </a:fontRef>
+        </p:style>
+        <p:txBody>
+          <a:bodyPr rtlCol="0" anchor="ctr"/>
+          <a:lstStyle/>
+          <a:p>
+            <a:pPr algn="ctr"/>
+            <a:endParaRPr lang="en-US"/>
+          </a:p>
+        </p:txBody>
+      </p:sp>
+      <p:sp>
+        <p:nvSpPr>
+          <p:cNvPr id="11" name="Rectangle 10">
+            <a:extLst>
+              <a:ext uri="{FF2B5EF4-FFF2-40B4-BE49-F238E27FC236}">
+                <a16:creationId xmlns:a16="http://schemas.microsoft.com/office/drawing/2014/main" id="{D8C68F39-5E8A-844C-A8FD-394F253C1E5F}"/>
+              </a:ext>
+              <a:ext uri="{C183D7F6-B498-43B3-948B-1728B52AA6E4}">
+                <adec:decorative xmlns:adec="http://schemas.microsoft.com/office/drawing/2017/decorative" val="1"/>
+              </a:ext>
+            </a:extLst>
+          </p:cNvPr>
+          <p:cNvSpPr>
+            <a:spLocks noGrp="1" noRot="1" noChangeAspect="1" noMove="1" noResize="1" noEditPoints="1" noAdjustHandles="1" noChangeArrowheads="1" noChangeShapeType="1" noTextEdit="1"/>
+          </p:cNvSpPr>
+          <p:nvPr>
+            <p:extLst>
+              <p:ext uri="{386F3935-93C4-4BCD-93E2-E3B085C9AB24}">
+                <p16:designElem xmlns:p16="http://schemas.microsoft.com/office/powerpoint/2015/main" val="1"/>
+              </p:ext>
+            </p:extLst>
+          </p:nvPr>
+        </p:nvSpPr>
+        <p:spPr>
+          <a:xfrm>
+            <a:off x="0" y="565153"/>
+            <a:ext cx="1133856" cy="6292847"/>
+          </a:xfrm>
+          <a:prstGeom prst="rect">
+            <a:avLst/>
+          </a:prstGeom>
+          <a:gradFill flip="none" rotWithShape="1">
+            <a:gsLst>
+              <a:gs pos="0">
+                <a:schemeClr val="accent1">
+                  <a:alpha val="50000"/>
+                </a:schemeClr>
+              </a:gs>
+              <a:gs pos="81000">
+                <a:schemeClr val="accent4">
+                  <a:alpha val="50000"/>
+                </a:schemeClr>
+              </a:gs>
+              <a:gs pos="25000">
+                <a:schemeClr val="accent2">
+                  <a:alpha val="60000"/>
+                </a:schemeClr>
+              </a:gs>
+              <a:gs pos="50000">
+                <a:schemeClr val="accent3">
+                  <a:alpha val="55000"/>
+                </a:schemeClr>
+              </a:gs>
+              <a:gs pos="99000">
+                <a:schemeClr val="accent5">
+                  <a:alpha val="50000"/>
+                </a:schemeClr>
+              </a:gs>
+            </a:gsLst>
+            <a:path path="circle">
+              <a:fillToRect r="100000" b="100000"/>
+            </a:path>
+            <a:tileRect l="-100000" t="-100000"/>
+          </a:gradFill>
+          <a:ln>
+            <a:noFill/>
+          </a:ln>
+        </p:spPr>
+        <p:style>
+          <a:lnRef idx="2">
+            <a:schemeClr val="accent1">
+              <a:shade val="50000"/>
+            </a:schemeClr>
+          </a:lnRef>
+          <a:fillRef idx="1">
+            <a:schemeClr val="accent1"/>
+          </a:fillRef>
+          <a:effectRef idx="0">
+            <a:schemeClr val="accent1"/>
+          </a:effectRef>
+          <a:fontRef idx="minor">
+            <a:schemeClr val="lt1"/>
+          </a:fontRef>
+        </p:style>
+        <p:txBody>
+          <a:bodyPr rtlCol="0" anchor="ctr"/>
+          <a:lstStyle/>
+          <a:p>
+            <a:pPr algn="ctr"/>
+            <a:endParaRPr lang="en-US"/>
+          </a:p>
+        </p:txBody>
+      </p:sp>
+      <p:sp>
+        <p:nvSpPr>
+          <p:cNvPr id="13" name="Rectangle 12">
+            <a:extLst>
+              <a:ext uri="{FF2B5EF4-FFF2-40B4-BE49-F238E27FC236}">
+                <a16:creationId xmlns:a16="http://schemas.microsoft.com/office/drawing/2014/main" id="{BC583CEB-AC2B-2640-94F6-5958E6BC5BAB}"/>
+              </a:ext>
+              <a:ext uri="{C183D7F6-B498-43B3-948B-1728B52AA6E4}">
+                <adec:decorative xmlns:adec="http://schemas.microsoft.com/office/drawing/2017/decorative" val="1"/>
+              </a:ext>
+            </a:extLst>
+          </p:cNvPr>
+          <p:cNvSpPr>
+            <a:spLocks noGrp="1" noRot="1" noChangeAspect="1" noMove="1" noResize="1" noEditPoints="1" noAdjustHandles="1" noChangeArrowheads="1" noChangeShapeType="1" noTextEdit="1"/>
+          </p:cNvSpPr>
+          <p:nvPr>
+            <p:extLst>
+              <p:ext uri="{386F3935-93C4-4BCD-93E2-E3B085C9AB24}">
+                <p16:designElem xmlns:p16="http://schemas.microsoft.com/office/powerpoint/2015/main" val="1"/>
+              </p:ext>
+            </p:extLst>
+          </p:nvPr>
+        </p:nvSpPr>
+        <p:spPr>
+          <a:xfrm>
+            <a:off x="0" y="-3"/>
+            <a:ext cx="565150" cy="6857999"/>
+          </a:xfrm>
+          <a:prstGeom prst="rect">
+            <a:avLst/>
+          </a:prstGeom>
+          <a:gradFill flip="none" rotWithShape="1">
+            <a:gsLst>
+              <a:gs pos="0">
+                <a:schemeClr val="accent1">
+                  <a:alpha val="50000"/>
+                </a:schemeClr>
+              </a:gs>
+              <a:gs pos="81000">
+                <a:schemeClr val="accent4">
+                  <a:alpha val="50000"/>
+                </a:schemeClr>
+              </a:gs>
+              <a:gs pos="25000">
+                <a:schemeClr val="accent2">
+                  <a:alpha val="60000"/>
+                </a:schemeClr>
+              </a:gs>
+              <a:gs pos="49000">
+                <a:schemeClr val="accent3">
+                  <a:alpha val="55000"/>
+                </a:schemeClr>
+              </a:gs>
+              <a:gs pos="99000">
+                <a:schemeClr val="accent5">
+                  <a:alpha val="50000"/>
+                </a:schemeClr>
+              </a:gs>
+            </a:gsLst>
+            <a:path path="circle">
+              <a:fillToRect r="100000" b="100000"/>
+            </a:path>
+            <a:tileRect l="-100000" t="-100000"/>
+          </a:gradFill>
+          <a:ln>
+            <a:noFill/>
+          </a:ln>
+        </p:spPr>
+        <p:style>
+          <a:lnRef idx="2">
+            <a:schemeClr val="accent1">
+              <a:shade val="50000"/>
+            </a:schemeClr>
+          </a:lnRef>
+          <a:fillRef idx="1">
+            <a:schemeClr val="accent1"/>
+          </a:fillRef>
+          <a:effectRef idx="0">
+            <a:schemeClr val="accent1"/>
+          </a:effectRef>
+          <a:fontRef idx="minor">
+            <a:schemeClr val="lt1"/>
+          </a:fontRef>
+        </p:style>
+        <p:txBody>
+          <a:bodyPr rtlCol="0" anchor="ctr"/>
+          <a:lstStyle/>
+          <a:p>
+            <a:pPr algn="ctr"/>
+            <a:endParaRPr lang="en-US"/>
+          </a:p>
+        </p:txBody>
+      </p:sp>
+      <p:sp>
+        <p:nvSpPr>
+          <p:cNvPr id="2" name="Nadpis 1">
+            <a:extLst>
+              <a:ext uri="{FF2B5EF4-FFF2-40B4-BE49-F238E27FC236}">
+                <a16:creationId xmlns:a16="http://schemas.microsoft.com/office/drawing/2014/main" id="{30F47834-8C60-4CB7-A161-CEAEE9D26026}"/>
+              </a:ext>
+            </a:extLst>
+          </p:cNvPr>
+          <p:cNvSpPr>
+            <a:spLocks noGrp="1"/>
+          </p:cNvSpPr>
+          <p:nvPr>
+            <p:ph type="title"/>
+          </p:nvPr>
+        </p:nvSpPr>
+        <p:spPr>
+          <a:xfrm>
+            <a:off x="1587710" y="529415"/>
+            <a:ext cx="9836190" cy="1550419"/>
+          </a:xfrm>
+        </p:spPr>
+        <p:txBody>
+          <a:bodyPr>
+            <a:normAutofit/>
+          </a:bodyPr>
+          <a:lstStyle/>
+          <a:p>
+            <a:pPr>
+              <a:lnSpc>
+                <a:spcPct val="90000"/>
+              </a:lnSpc>
+            </a:pPr>
+            <a:r>
+              <a:rPr lang="cs-CZ" sz="3400" dirty="0"/>
+              <a:t>Zaměřené na bezpečnost:</a:t>
+            </a:r>
+            <a:br>
+              <a:rPr lang="cs-CZ" sz="3400" dirty="0"/>
+            </a:br>
+            <a:r>
+              <a:rPr lang="cs-CZ" sz="3400" dirty="0" err="1"/>
+              <a:t>Qubes</a:t>
+            </a:r>
+            <a:r>
+              <a:rPr lang="cs-CZ" sz="3400" dirty="0"/>
+              <a:t> OS</a:t>
+            </a:r>
+          </a:p>
+        </p:txBody>
+      </p:sp>
+      <p:sp>
+        <p:nvSpPr>
+          <p:cNvPr id="3" name="Zástupný obsah 2">
+            <a:extLst>
+              <a:ext uri="{FF2B5EF4-FFF2-40B4-BE49-F238E27FC236}">
+                <a16:creationId xmlns:a16="http://schemas.microsoft.com/office/drawing/2014/main" id="{0519D7D1-1511-4D44-9E20-F17389C45738}"/>
+              </a:ext>
+            </a:extLst>
+          </p:cNvPr>
+          <p:cNvSpPr>
+            <a:spLocks noGrp="1"/>
+          </p:cNvSpPr>
+          <p:nvPr>
+            <p:ph idx="1"/>
+          </p:nvPr>
+        </p:nvSpPr>
+        <p:spPr>
+          <a:xfrm>
+            <a:off x="1587710" y="2160016"/>
+            <a:ext cx="4067909" cy="3926152"/>
+          </a:xfrm>
+        </p:spPr>
+        <p:txBody>
+          <a:bodyPr>
+            <a:normAutofit/>
+          </a:bodyPr>
+          <a:lstStyle/>
+          <a:p>
+            <a:pPr>
+              <a:lnSpc>
+                <a:spcPct val="100000"/>
+              </a:lnSpc>
+            </a:pPr>
+            <a:r>
+              <a:rPr lang="cs-CZ" dirty="0"/>
+              <a:t>Operační systém </a:t>
+            </a:r>
+            <a:r>
+              <a:rPr lang="cs-CZ" dirty="0" err="1"/>
+              <a:t>Qubes</a:t>
+            </a:r>
+            <a:r>
+              <a:rPr lang="cs-CZ" dirty="0"/>
+              <a:t> se hodí pro firmy s velkými nároky na bezpečnost</a:t>
+            </a:r>
+          </a:p>
+          <a:p>
+            <a:pPr>
+              <a:lnSpc>
+                <a:spcPct val="100000"/>
+              </a:lnSpc>
+            </a:pPr>
+            <a:r>
+              <a:rPr lang="cs-CZ" dirty="0"/>
+              <a:t>Jeho bezpečnostní kouzlo spočívá v tom že izoluje (skrývá) soubory a virtuální počítače</a:t>
+            </a:r>
+          </a:p>
+          <a:p>
+            <a:pPr>
+              <a:lnSpc>
+                <a:spcPct val="100000"/>
+              </a:lnSpc>
+            </a:pPr>
+            <a:r>
+              <a:rPr lang="cs-CZ" dirty="0"/>
+              <a:t>Tato distribuce není vhodná pro začátečníky ani pro pokročilé uživatele</a:t>
+            </a:r>
+          </a:p>
+        </p:txBody>
+      </p:sp>
+      <p:pic>
+        <p:nvPicPr>
+          <p:cNvPr id="4" name="Obrázek 3" descr="Obsah obrázku text, snímek obrazovky, elektronika&#10;&#10;Popis byl vytvořen automaticky">
+            <a:extLst>
+              <a:ext uri="{FF2B5EF4-FFF2-40B4-BE49-F238E27FC236}">
+                <a16:creationId xmlns:a16="http://schemas.microsoft.com/office/drawing/2014/main" id="{366C78BF-E72E-4F9A-94C9-896A689823BF}"/>
+              </a:ext>
+            </a:extLst>
+          </p:cNvPr>
+          <p:cNvPicPr>
+            <a:picLocks noChangeAspect="1"/>
+          </p:cNvPicPr>
+          <p:nvPr/>
+        </p:nvPicPr>
+        <p:blipFill>
+          <a:blip r:embed="rId3"/>
+          <a:stretch>
+            <a:fillRect/>
+          </a:stretch>
+        </p:blipFill>
+        <p:spPr>
+          <a:xfrm>
+            <a:off x="6224325" y="1887778"/>
+            <a:ext cx="5199575" cy="2924760"/>
+          </a:xfrm>
+          <a:prstGeom prst="rect">
+            <a:avLst/>
+          </a:prstGeom>
+        </p:spPr>
+      </p:pic>
+      <p:sp>
+        <p:nvSpPr>
+          <p:cNvPr id="6" name="TextovéPole 5">
+            <a:extLst>
+              <a:ext uri="{FF2B5EF4-FFF2-40B4-BE49-F238E27FC236}">
+                <a16:creationId xmlns:a16="http://schemas.microsoft.com/office/drawing/2014/main" id="{D3EBB768-F735-4069-B006-E432FF7FF510}"/>
+              </a:ext>
+            </a:extLst>
+          </p:cNvPr>
+          <p:cNvSpPr txBox="1"/>
+          <p:nvPr/>
+        </p:nvSpPr>
+        <p:spPr>
+          <a:xfrm>
+            <a:off x="6296297" y="4858453"/>
+            <a:ext cx="5127603" cy="369332"/>
+          </a:xfrm>
+          <a:prstGeom prst="rect">
+            <a:avLst/>
+          </a:prstGeom>
+          <a:noFill/>
+        </p:spPr>
+        <p:txBody>
+          <a:bodyPr wrap="square" rtlCol="0">
+            <a:spAutoFit/>
+          </a:bodyPr>
+          <a:lstStyle/>
+          <a:p>
+            <a:pPr algn="ctr"/>
+            <a:r>
+              <a:rPr lang="cs-CZ" b="1" dirty="0"/>
+              <a:t>Ukázka z </a:t>
+            </a:r>
+            <a:r>
+              <a:rPr lang="cs-CZ" b="1" dirty="0" err="1"/>
+              <a:t>Qubes</a:t>
+            </a:r>
+            <a:r>
+              <a:rPr lang="cs-CZ" b="1" dirty="0"/>
+              <a:t> OS</a:t>
+            </a:r>
+          </a:p>
+        </p:txBody>
+      </p:sp>
+    </p:spTree>
+    <p:extLst>
+      <p:ext uri="{BB962C8B-B14F-4D97-AF65-F5344CB8AC3E}">
+        <p14:creationId xmlns:p14="http://schemas.microsoft.com/office/powerpoint/2010/main" val="1168017472"/>
+      </p:ext>
+    </p:extLst>
+  </p:cSld>
+  <p:clrMapOvr>
+    <a:masterClrMapping/>
+  </p:clrMapOvr>
+  <mc:AlternateContent xmlns:mc="http://schemas.openxmlformats.org/markup-compatibility/2006" xmlns:p159="http://schemas.microsoft.com/office/powerpoint/2015/09/main">
+    <mc:Choice Requires="p159">
+      <p:transition xmlns:p14="http://schemas.microsoft.com/office/powerpoint/2010/main" spd="slow" p14:dur="2000">
+        <p159:morph option="byObject"/>
+      </p:transition>
+    </mc:Choice>
+    <mc:Fallback xmlns="">
+      <p:transition spd="slow">
+        <p:fade/>
+      </p:transition>
+    </mc:Fallback>
+  </mc:AlternateContent>
+</p:sld>
+</file>
+
+<file path=ppt/slides/slide17.xml><?xml version="1.0" encoding="utf-8"?>
+<p:sld xmlns:a="http://schemas.openxmlformats.org/drawingml/2006/main" xmlns:r="http://schemas.openxmlformats.org/officeDocument/2006/relationships" xmlns:p="http://schemas.openxmlformats.org/presentationml/2006/main">
+  <p:cSld>
+    <p:bg>
+      <p:bgPr>
+        <a:solidFill>
+          <a:schemeClr val="bg1"/>
+        </a:solidFill>
+        <a:effectLst/>
+      </p:bgPr>
+    </p:bg>
+    <p:spTree>
+      <p:nvGrpSpPr>
+        <p:cNvPr id="1" name=""/>
+        <p:cNvGrpSpPr/>
+        <p:nvPr/>
+      </p:nvGrpSpPr>
+      <p:grpSpPr>
+        <a:xfrm>
+          <a:off x="0" y="0"/>
+          <a:ext cx="0" cy="0"/>
+          <a:chOff x="0" y="0"/>
+          <a:chExt cx="0" cy="0"/>
+        </a:xfrm>
+      </p:grpSpPr>
+      <p:sp useBgFill="1">
+        <p:nvSpPr>
+          <p:cNvPr id="9" name="Rectangle 8">
+            <a:extLst>
+              <a:ext uri="{FF2B5EF4-FFF2-40B4-BE49-F238E27FC236}">
+                <a16:creationId xmlns:a16="http://schemas.microsoft.com/office/drawing/2014/main" id="{C868C70C-E5C4-CD47-888C-FCB3373B6D38}"/>
+              </a:ext>
+              <a:ext uri="{C183D7F6-B498-43B3-948B-1728B52AA6E4}">
+                <adec:decorative xmlns:adec="http://schemas.microsoft.com/office/drawing/2017/decorative" val="1"/>
+              </a:ext>
+            </a:extLst>
+          </p:cNvPr>
+          <p:cNvSpPr>
+            <a:spLocks noGrp="1" noRot="1" noChangeAspect="1" noMove="1" noResize="1" noEditPoints="1" noAdjustHandles="1" noChangeArrowheads="1" noChangeShapeType="1" noTextEdit="1"/>
+          </p:cNvSpPr>
+          <p:nvPr>
+            <p:extLst>
+              <p:ext uri="{386F3935-93C4-4BCD-93E2-E3B085C9AB24}">
+                <p16:designElem xmlns:p16="http://schemas.microsoft.com/office/powerpoint/2015/main" val="1"/>
+              </p:ext>
+            </p:extLst>
+          </p:nvPr>
+        </p:nvSpPr>
+        <p:spPr>
+          <a:xfrm>
+            <a:off x="0" y="0"/>
+            <a:ext cx="12188952" cy="6858000"/>
+          </a:xfrm>
+          <a:prstGeom prst="rect">
+            <a:avLst/>
+          </a:prstGeom>
+          <a:ln>
+            <a:noFill/>
+          </a:ln>
+        </p:spPr>
+        <p:style>
+          <a:lnRef idx="2">
+            <a:schemeClr val="accent1">
+              <a:shade val="50000"/>
+            </a:schemeClr>
+          </a:lnRef>
+          <a:fillRef idx="1">
+            <a:schemeClr val="accent1"/>
+          </a:fillRef>
+          <a:effectRef idx="0">
+            <a:schemeClr val="accent1"/>
+          </a:effectRef>
+          <a:fontRef idx="minor">
+            <a:schemeClr val="lt1"/>
+          </a:fontRef>
+        </p:style>
+        <p:txBody>
+          <a:bodyPr rtlCol="0" anchor="ctr"/>
+          <a:lstStyle/>
+          <a:p>
+            <a:pPr algn="ctr"/>
+            <a:endParaRPr lang="en-US"/>
+          </a:p>
+        </p:txBody>
+      </p:sp>
+      <p:sp>
+        <p:nvSpPr>
+          <p:cNvPr id="2" name="Nadpis 1">
+            <a:extLst>
+              <a:ext uri="{FF2B5EF4-FFF2-40B4-BE49-F238E27FC236}">
+                <a16:creationId xmlns:a16="http://schemas.microsoft.com/office/drawing/2014/main" id="{7531CB4F-80ED-422E-9F59-586786779F2D}"/>
+              </a:ext>
+            </a:extLst>
+          </p:cNvPr>
+          <p:cNvSpPr>
+            <a:spLocks noGrp="1"/>
+          </p:cNvSpPr>
+          <p:nvPr>
+            <p:ph type="title"/>
+          </p:nvPr>
+        </p:nvSpPr>
+        <p:spPr>
+          <a:xfrm>
+            <a:off x="572389" y="272020"/>
+            <a:ext cx="3603625" cy="903637"/>
+          </a:xfrm>
+        </p:spPr>
+        <p:txBody>
+          <a:bodyPr>
+            <a:normAutofit/>
+          </a:bodyPr>
+          <a:lstStyle/>
+          <a:p>
+            <a:r>
+              <a:rPr lang="cs-CZ" dirty="0" err="1"/>
+              <a:t>Kali</a:t>
+            </a:r>
+            <a:r>
+              <a:rPr lang="cs-CZ" dirty="0"/>
+              <a:t> Linux</a:t>
+            </a:r>
+          </a:p>
+        </p:txBody>
+      </p:sp>
+      <p:sp>
+        <p:nvSpPr>
+          <p:cNvPr id="3" name="Zástupný obsah 2">
+            <a:extLst>
+              <a:ext uri="{FF2B5EF4-FFF2-40B4-BE49-F238E27FC236}">
+                <a16:creationId xmlns:a16="http://schemas.microsoft.com/office/drawing/2014/main" id="{0616B97C-3554-4687-A472-2A5EAC895F75}"/>
+              </a:ext>
+            </a:extLst>
+          </p:cNvPr>
+          <p:cNvSpPr>
+            <a:spLocks noGrp="1"/>
+          </p:cNvSpPr>
+          <p:nvPr>
+            <p:ph idx="1"/>
+          </p:nvPr>
+        </p:nvSpPr>
+        <p:spPr>
+          <a:xfrm>
+            <a:off x="289560" y="1583742"/>
+            <a:ext cx="4169283" cy="4442262"/>
+          </a:xfrm>
+        </p:spPr>
+        <p:txBody>
+          <a:bodyPr>
+            <a:normAutofit fontScale="92500"/>
+          </a:bodyPr>
+          <a:lstStyle/>
+          <a:p>
+            <a:pPr>
+              <a:lnSpc>
+                <a:spcPct val="100000"/>
+              </a:lnSpc>
+            </a:pPr>
+            <a:r>
+              <a:rPr lang="cs-CZ" sz="2400" dirty="0"/>
+              <a:t>Využívaný pro penetrační testy různých druhů zabezpečení</a:t>
+            </a:r>
+          </a:p>
+          <a:p>
+            <a:pPr>
+              <a:lnSpc>
+                <a:spcPct val="100000"/>
+              </a:lnSpc>
+            </a:pPr>
+            <a:r>
+              <a:rPr lang="cs-CZ" sz="2400" dirty="0"/>
+              <a:t>Je dodáván s nástroji: </a:t>
+            </a:r>
+            <a:r>
+              <a:rPr lang="cs-CZ" sz="2400" dirty="0" err="1"/>
+              <a:t>Ettercap</a:t>
+            </a:r>
+            <a:r>
+              <a:rPr lang="cs-CZ" sz="2400" dirty="0"/>
+              <a:t>, </a:t>
+            </a:r>
+            <a:r>
+              <a:rPr lang="cs-CZ" sz="2400" dirty="0" err="1"/>
+              <a:t>Foremost</a:t>
+            </a:r>
+            <a:r>
+              <a:rPr lang="cs-CZ" sz="2400" dirty="0"/>
+              <a:t>, </a:t>
+            </a:r>
+            <a:r>
+              <a:rPr lang="cs-CZ" sz="2400" dirty="0" err="1"/>
+              <a:t>Aircrack</a:t>
+            </a:r>
+            <a:endParaRPr lang="cs-CZ" sz="2400" dirty="0"/>
+          </a:p>
+          <a:p>
+            <a:pPr>
+              <a:lnSpc>
+                <a:spcPct val="100000"/>
+              </a:lnSpc>
+            </a:pPr>
+            <a:r>
+              <a:rPr lang="cs-CZ" sz="2400" dirty="0"/>
+              <a:t>Obsahuje také nástroj pro správu kybernetických útoků </a:t>
+            </a:r>
+            <a:r>
+              <a:rPr lang="cs-CZ" sz="2400" dirty="0" err="1"/>
+              <a:t>Armitage</a:t>
+            </a:r>
+          </a:p>
+          <a:p>
+            <a:pPr>
+              <a:lnSpc>
+                <a:spcPct val="100000"/>
+              </a:lnSpc>
+            </a:pPr>
+            <a:r>
+              <a:rPr lang="cs-CZ" sz="2400" dirty="0"/>
+              <a:t>Vhodný pro středně pokročilé ve srovnání s </a:t>
+            </a:r>
+            <a:r>
+              <a:rPr lang="cs-CZ" sz="2400" dirty="0" err="1"/>
+              <a:t>Qubes</a:t>
+            </a:r>
+            <a:endParaRPr lang="cs-CZ" sz="2400" dirty="0"/>
+          </a:p>
+        </p:txBody>
+      </p:sp>
+      <p:pic>
+        <p:nvPicPr>
+          <p:cNvPr id="4" name="Obrázek 3">
+            <a:extLst>
+              <a:ext uri="{FF2B5EF4-FFF2-40B4-BE49-F238E27FC236}">
+                <a16:creationId xmlns:a16="http://schemas.microsoft.com/office/drawing/2014/main" id="{764581BE-A532-469C-A55E-80F7D4ABB570}"/>
+              </a:ext>
+            </a:extLst>
+          </p:cNvPr>
+          <p:cNvPicPr>
+            <a:picLocks noChangeAspect="1"/>
+          </p:cNvPicPr>
+          <p:nvPr/>
+        </p:nvPicPr>
+        <p:blipFill rotWithShape="1">
+          <a:blip r:embed="rId2"/>
+          <a:srcRect l="18596"/>
+          <a:stretch/>
+        </p:blipFill>
+        <p:spPr>
+          <a:xfrm>
+            <a:off x="4748403" y="10"/>
+            <a:ext cx="7443597" cy="6857990"/>
+          </a:xfrm>
+          <a:prstGeom prst="rect">
+            <a:avLst/>
+          </a:prstGeom>
+        </p:spPr>
+      </p:pic>
+      <p:sp>
+        <p:nvSpPr>
+          <p:cNvPr id="11" name="Rectangle 10">
+            <a:extLst>
+              <a:ext uri="{FF2B5EF4-FFF2-40B4-BE49-F238E27FC236}">
+                <a16:creationId xmlns:a16="http://schemas.microsoft.com/office/drawing/2014/main" id="{D8C68F39-5E8A-844C-A8FD-394F253C1E5F}"/>
+              </a:ext>
+              <a:ext uri="{C183D7F6-B498-43B3-948B-1728B52AA6E4}">
+                <adec:decorative xmlns:adec="http://schemas.microsoft.com/office/drawing/2017/decorative" val="1"/>
+              </a:ext>
+            </a:extLst>
+          </p:cNvPr>
+          <p:cNvSpPr>
+            <a:spLocks noGrp="1" noRot="1" noChangeAspect="1" noMove="1" noResize="1" noEditPoints="1" noAdjustHandles="1" noChangeArrowheads="1" noChangeShapeType="1" noTextEdit="1"/>
+          </p:cNvSpPr>
+          <p:nvPr>
+            <p:extLst>
+              <p:ext uri="{386F3935-93C4-4BCD-93E2-E3B085C9AB24}">
+                <p16:designElem xmlns:p16="http://schemas.microsoft.com/office/powerpoint/2015/main" val="1"/>
+              </p:ext>
+            </p:extLst>
+          </p:nvPr>
+        </p:nvSpPr>
+        <p:spPr>
+          <a:xfrm>
+            <a:off x="4748403" y="565153"/>
+            <a:ext cx="1133856" cy="6292847"/>
+          </a:xfrm>
+          <a:prstGeom prst="rect">
+            <a:avLst/>
+          </a:prstGeom>
+          <a:gradFill flip="none" rotWithShape="1">
+            <a:gsLst>
+              <a:gs pos="0">
+                <a:schemeClr val="accent1">
+                  <a:alpha val="50000"/>
+                </a:schemeClr>
+              </a:gs>
+              <a:gs pos="81000">
+                <a:schemeClr val="accent4">
+                  <a:alpha val="50000"/>
+                </a:schemeClr>
+              </a:gs>
+              <a:gs pos="25000">
+                <a:schemeClr val="accent2">
+                  <a:alpha val="60000"/>
+                </a:schemeClr>
+              </a:gs>
+              <a:gs pos="50000">
+                <a:schemeClr val="accent3">
+                  <a:alpha val="55000"/>
+                </a:schemeClr>
+              </a:gs>
+              <a:gs pos="99000">
+                <a:schemeClr val="accent5">
+                  <a:alpha val="50000"/>
+                </a:schemeClr>
+              </a:gs>
+            </a:gsLst>
+            <a:path path="circle">
+              <a:fillToRect r="100000" b="100000"/>
+            </a:path>
+            <a:tileRect l="-100000" t="-100000"/>
+          </a:gradFill>
+          <a:ln>
+            <a:noFill/>
+          </a:ln>
+        </p:spPr>
+        <p:style>
+          <a:lnRef idx="2">
+            <a:schemeClr val="accent1">
+              <a:shade val="50000"/>
+            </a:schemeClr>
+          </a:lnRef>
+          <a:fillRef idx="1">
+            <a:schemeClr val="accent1"/>
+          </a:fillRef>
+          <a:effectRef idx="0">
+            <a:schemeClr val="accent1"/>
+          </a:effectRef>
+          <a:fontRef idx="minor">
+            <a:schemeClr val="lt1"/>
+          </a:fontRef>
+        </p:style>
+        <p:txBody>
+          <a:bodyPr rtlCol="0" anchor="ctr"/>
+          <a:lstStyle/>
+          <a:p>
+            <a:pPr algn="ctr"/>
+            <a:endParaRPr lang="en-US"/>
+          </a:p>
+        </p:txBody>
+      </p:sp>
+      <p:sp>
+        <p:nvSpPr>
+          <p:cNvPr id="13" name="Rectangle 12">
+            <a:extLst>
+              <a:ext uri="{FF2B5EF4-FFF2-40B4-BE49-F238E27FC236}">
+                <a16:creationId xmlns:a16="http://schemas.microsoft.com/office/drawing/2014/main" id="{BC583CEB-AC2B-2640-94F6-5958E6BC5BAB}"/>
+              </a:ext>
+              <a:ext uri="{C183D7F6-B498-43B3-948B-1728B52AA6E4}">
+                <adec:decorative xmlns:adec="http://schemas.microsoft.com/office/drawing/2017/decorative" val="1"/>
+              </a:ext>
+            </a:extLst>
+          </p:cNvPr>
+          <p:cNvSpPr>
+            <a:spLocks noGrp="1" noRot="1" noChangeAspect="1" noMove="1" noResize="1" noEditPoints="1" noAdjustHandles="1" noChangeArrowheads="1" noChangeShapeType="1" noTextEdit="1"/>
+          </p:cNvSpPr>
+          <p:nvPr>
+            <p:extLst>
+              <p:ext uri="{386F3935-93C4-4BCD-93E2-E3B085C9AB24}">
+                <p16:designElem xmlns:p16="http://schemas.microsoft.com/office/powerpoint/2015/main" val="1"/>
+              </p:ext>
+            </p:extLst>
+          </p:nvPr>
+        </p:nvSpPr>
+        <p:spPr>
+          <a:xfrm>
+            <a:off x="4748403" y="-3"/>
+            <a:ext cx="565150" cy="6857999"/>
+          </a:xfrm>
+          <a:prstGeom prst="rect">
+            <a:avLst/>
+          </a:prstGeom>
+          <a:gradFill flip="none" rotWithShape="1">
+            <a:gsLst>
+              <a:gs pos="0">
+                <a:schemeClr val="accent1">
+                  <a:alpha val="50000"/>
+                </a:schemeClr>
+              </a:gs>
+              <a:gs pos="81000">
+                <a:schemeClr val="accent4">
+                  <a:alpha val="50000"/>
+                </a:schemeClr>
+              </a:gs>
+              <a:gs pos="25000">
+                <a:schemeClr val="accent2">
+                  <a:alpha val="60000"/>
+                </a:schemeClr>
+              </a:gs>
+              <a:gs pos="49000">
+                <a:schemeClr val="accent3">
+                  <a:alpha val="55000"/>
+                </a:schemeClr>
+              </a:gs>
+              <a:gs pos="99000">
+                <a:schemeClr val="accent5">
+                  <a:alpha val="50000"/>
+                </a:schemeClr>
+              </a:gs>
+            </a:gsLst>
+            <a:path path="circle">
+              <a:fillToRect r="100000" b="100000"/>
+            </a:path>
+            <a:tileRect l="-100000" t="-100000"/>
+          </a:gradFill>
+          <a:ln>
+            <a:noFill/>
+          </a:ln>
+        </p:spPr>
+        <p:style>
+          <a:lnRef idx="2">
+            <a:schemeClr val="accent1">
+              <a:shade val="50000"/>
+            </a:schemeClr>
+          </a:lnRef>
+          <a:fillRef idx="1">
+            <a:schemeClr val="accent1"/>
+          </a:fillRef>
+          <a:effectRef idx="0">
+            <a:schemeClr val="accent1"/>
+          </a:effectRef>
+          <a:fontRef idx="minor">
+            <a:schemeClr val="lt1"/>
+          </a:fontRef>
+        </p:style>
+        <p:txBody>
+          <a:bodyPr rtlCol="0" anchor="ctr"/>
+          <a:lstStyle/>
+          <a:p>
+            <a:pPr algn="ctr"/>
+            <a:endParaRPr lang="en-US"/>
+          </a:p>
+        </p:txBody>
+      </p:sp>
+    </p:spTree>
+    <p:extLst>
+      <p:ext uri="{BB962C8B-B14F-4D97-AF65-F5344CB8AC3E}">
+        <p14:creationId xmlns:p14="http://schemas.microsoft.com/office/powerpoint/2010/main" val="165784762"/>
+      </p:ext>
+    </p:extLst>
+  </p:cSld>
+  <p:clrMapOvr>
+    <a:masterClrMapping/>
+  </p:clrMapOvr>
+  <mc:AlternateContent xmlns:mc="http://schemas.openxmlformats.org/markup-compatibility/2006" xmlns:p159="http://schemas.microsoft.com/office/powerpoint/2015/09/main">
+    <mc:Choice Requires="p159">
+      <p:transition xmlns:p14="http://schemas.microsoft.com/office/powerpoint/2010/main" spd="slow" p14:dur="2000">
+        <p159:morph option="byObject"/>
+      </p:transition>
+    </mc:Choice>
+    <mc:Fallback xmlns="">
+      <p:transition spd="slow">
+        <p:fade/>
+      </p:transition>
+    </mc:Fallback>
+  </mc:AlternateContent>
+</p:sld>
+</file>
+
+<file path=ppt/slides/slide18.xml><?xml version="1.0" encoding="utf-8"?>
+<p:sld xmlns:a="http://schemas.openxmlformats.org/drawingml/2006/main" xmlns:r="http://schemas.openxmlformats.org/officeDocument/2006/relationships" xmlns:p="http://schemas.openxmlformats.org/presentationml/2006/main">
+  <p:cSld>
+    <p:spTree>
+      <p:nvGrpSpPr>
+        <p:cNvPr id="1" name=""/>
+        <p:cNvGrpSpPr/>
+        <p:nvPr/>
+      </p:nvGrpSpPr>
+      <p:grpSpPr>
+        <a:xfrm>
+          <a:off x="0" y="0"/>
+          <a:ext cx="0" cy="0"/>
+          <a:chOff x="0" y="0"/>
+          <a:chExt cx="0" cy="0"/>
+        </a:xfrm>
+      </p:grpSpPr>
+      <p:sp>
+        <p:nvSpPr>
+          <p:cNvPr id="2" name="Nadpis 1">
+            <a:extLst>
+              <a:ext uri="{FF2B5EF4-FFF2-40B4-BE49-F238E27FC236}">
+                <a16:creationId xmlns:a16="http://schemas.microsoft.com/office/drawing/2014/main" id="{264A502A-DB27-4797-AB9A-A39C3352083E}"/>
+              </a:ext>
+            </a:extLst>
+          </p:cNvPr>
+          <p:cNvSpPr>
+            <a:spLocks noGrp="1"/>
+          </p:cNvSpPr>
+          <p:nvPr>
+            <p:ph type="title"/>
+          </p:nvPr>
+        </p:nvSpPr>
+        <p:spPr/>
+        <p:txBody>
+          <a:bodyPr/>
+          <a:lstStyle/>
+          <a:p>
+            <a:r>
+              <a:rPr lang="cs-CZ"/>
+              <a:t>Zaměřené na uživatele:</a:t>
+            </a:r>
+            <a:br>
+              <a:rPr lang="cs-CZ"/>
+            </a:br>
+            <a:r>
+              <a:rPr lang="cs-CZ"/>
+              <a:t>Ubuntu</a:t>
+            </a:r>
+            <a:endParaRPr lang="cs-CZ" dirty="0"/>
+          </a:p>
+        </p:txBody>
+      </p:sp>
+      <p:sp>
+        <p:nvSpPr>
+          <p:cNvPr id="3" name="Zástupný obsah 2">
+            <a:extLst>
+              <a:ext uri="{FF2B5EF4-FFF2-40B4-BE49-F238E27FC236}">
+                <a16:creationId xmlns:a16="http://schemas.microsoft.com/office/drawing/2014/main" id="{1C77A85F-C6F7-4E9B-8E25-F4EE50A78DFA}"/>
+              </a:ext>
+            </a:extLst>
+          </p:cNvPr>
+          <p:cNvSpPr>
+            <a:spLocks noGrp="1"/>
+          </p:cNvSpPr>
+          <p:nvPr>
+            <p:ph idx="1"/>
+          </p:nvPr>
+        </p:nvSpPr>
+        <p:spPr/>
+        <p:txBody>
+          <a:bodyPr/>
+          <a:lstStyle/>
+          <a:p>
+            <a:endParaRPr lang="cs-CZ"/>
+          </a:p>
+        </p:txBody>
+      </p:sp>
+    </p:spTree>
+    <p:extLst>
+      <p:ext uri="{BB962C8B-B14F-4D97-AF65-F5344CB8AC3E}">
+        <p14:creationId xmlns:p14="http://schemas.microsoft.com/office/powerpoint/2010/main" val="1783875855"/>
+      </p:ext>
+    </p:extLst>
+  </p:cSld>
+  <p:clrMapOvr>
+    <a:masterClrMapping/>
+  </p:clrMapOvr>
+  <mc:AlternateContent xmlns:mc="http://schemas.openxmlformats.org/markup-compatibility/2006" xmlns:p159="http://schemas.microsoft.com/office/powerpoint/2015/09/main">
+    <mc:Choice Requires="p159">
+      <p:transition xmlns:p14="http://schemas.microsoft.com/office/powerpoint/2010/main" spd="slow" p14:dur="2000">
+        <p159:morph option="byObject"/>
+      </p:transition>
+    </mc:Choice>
+    <mc:Fallback xmlns="">
+      <p:transition spd="slow">
+        <p:fade/>
+      </p:transition>
+    </mc:Fallback>
+  </mc:AlternateContent>
+</p:sld>
+</file>
+
+<file path=ppt/slides/slide19.xml><?xml version="1.0" encoding="utf-8"?>
+<p:sld xmlns:a="http://schemas.openxmlformats.org/drawingml/2006/main" xmlns:r="http://schemas.openxmlformats.org/officeDocument/2006/relationships" xmlns:p="http://schemas.openxmlformats.org/presentationml/2006/main">
+  <p:cSld>
+    <p:bg>
+      <p:bgPr>
+        <a:solidFill>
+          <a:schemeClr val="bg1"/>
+        </a:solidFill>
+        <a:effectLst/>
+      </p:bgPr>
+    </p:bg>
+    <p:spTree>
+      <p:nvGrpSpPr>
+        <p:cNvPr id="1" name=""/>
+        <p:cNvGrpSpPr/>
+        <p:nvPr/>
+      </p:nvGrpSpPr>
+      <p:grpSpPr>
+        <a:xfrm>
+          <a:off x="0" y="0"/>
+          <a:ext cx="0" cy="0"/>
+          <a:chOff x="0" y="0"/>
+          <a:chExt cx="0" cy="0"/>
+        </a:xfrm>
+      </p:grpSpPr>
+      <p:sp useBgFill="1">
+        <p:nvSpPr>
+          <p:cNvPr id="19" name="Rectangle 18">
+            <a:extLst>
+              <a:ext uri="{FF2B5EF4-FFF2-40B4-BE49-F238E27FC236}">
+                <a16:creationId xmlns:a16="http://schemas.microsoft.com/office/drawing/2014/main" id="{C868C70C-E5C4-CD47-888C-FCB3373B6D38}"/>
+              </a:ext>
+              <a:ext uri="{C183D7F6-B498-43B3-948B-1728B52AA6E4}">
+                <adec:decorative xmlns:adec="http://schemas.microsoft.com/office/drawing/2017/decorative" val="1"/>
+              </a:ext>
+            </a:extLst>
+          </p:cNvPr>
+          <p:cNvSpPr>
+            <a:spLocks noGrp="1" noRot="1" noChangeAspect="1" noMove="1" noResize="1" noEditPoints="1" noAdjustHandles="1" noChangeArrowheads="1" noChangeShapeType="1" noTextEdit="1"/>
+          </p:cNvSpPr>
+          <p:nvPr>
+            <p:extLst>
+              <p:ext uri="{386F3935-93C4-4BCD-93E2-E3B085C9AB24}">
+                <p16:designElem xmlns:p16="http://schemas.microsoft.com/office/powerpoint/2015/main" val="1"/>
+              </p:ext>
+            </p:extLst>
+          </p:nvPr>
+        </p:nvSpPr>
+        <p:spPr>
+          <a:xfrm>
+            <a:off x="0" y="0"/>
+            <a:ext cx="12188952" cy="6858000"/>
+          </a:xfrm>
+          <a:prstGeom prst="rect">
+            <a:avLst/>
+          </a:prstGeom>
+          <a:ln>
+            <a:noFill/>
+          </a:ln>
+        </p:spPr>
+        <p:style>
+          <a:lnRef idx="2">
+            <a:schemeClr val="accent1">
+              <a:shade val="50000"/>
+            </a:schemeClr>
+          </a:lnRef>
+          <a:fillRef idx="1">
+            <a:schemeClr val="accent1"/>
+          </a:fillRef>
+          <a:effectRef idx="0">
+            <a:schemeClr val="accent1"/>
+          </a:effectRef>
+          <a:fontRef idx="minor">
+            <a:schemeClr val="lt1"/>
+          </a:fontRef>
+        </p:style>
+        <p:txBody>
+          <a:bodyPr rtlCol="0" anchor="ctr"/>
+          <a:lstStyle/>
+          <a:p>
+            <a:pPr algn="ctr"/>
+            <a:endParaRPr lang="en-US"/>
+          </a:p>
+        </p:txBody>
+      </p:sp>
+      <p:sp>
+        <p:nvSpPr>
+          <p:cNvPr id="7" name="Nadpis 6">
+            <a:extLst>
+              <a:ext uri="{FF2B5EF4-FFF2-40B4-BE49-F238E27FC236}">
+                <a16:creationId xmlns:a16="http://schemas.microsoft.com/office/drawing/2014/main" id="{844A6577-5D78-482D-9B5B-DAD738857861}"/>
+              </a:ext>
+            </a:extLst>
+          </p:cNvPr>
+          <p:cNvSpPr>
+            <a:spLocks noGrp="1"/>
+          </p:cNvSpPr>
+          <p:nvPr>
+            <p:ph type="title"/>
+          </p:nvPr>
+        </p:nvSpPr>
+        <p:spPr>
+          <a:xfrm>
+            <a:off x="576072" y="455362"/>
+            <a:ext cx="3603625" cy="1550419"/>
+          </a:xfrm>
+        </p:spPr>
+        <p:txBody>
+          <a:bodyPr>
+            <a:normAutofit/>
+          </a:bodyPr>
+          <a:lstStyle/>
+          <a:p>
+            <a:r>
+              <a:rPr lang="cs-CZ" dirty="0"/>
+              <a:t>Linux </a:t>
+            </a:r>
+            <a:r>
+              <a:rPr lang="cs-CZ" dirty="0" err="1"/>
+              <a:t>Mint</a:t>
+            </a:r>
+            <a:endParaRPr lang="cs-CZ" dirty="0"/>
+          </a:p>
+        </p:txBody>
+      </p:sp>
+      <p:sp>
+        <p:nvSpPr>
+          <p:cNvPr id="10" name="Zástupný obsah 9">
+            <a:extLst>
+              <a:ext uri="{FF2B5EF4-FFF2-40B4-BE49-F238E27FC236}">
+                <a16:creationId xmlns:a16="http://schemas.microsoft.com/office/drawing/2014/main" id="{8BC7216D-4B14-44F1-92EF-9EDE003EBB96}"/>
+              </a:ext>
+            </a:extLst>
+          </p:cNvPr>
+          <p:cNvSpPr>
+            <a:spLocks noGrp="1"/>
+          </p:cNvSpPr>
+          <p:nvPr>
+            <p:ph idx="1"/>
+          </p:nvPr>
+        </p:nvSpPr>
+        <p:spPr>
+          <a:xfrm>
+            <a:off x="576072" y="2160016"/>
+            <a:ext cx="3603625" cy="3926152"/>
+          </a:xfrm>
+        </p:spPr>
+        <p:txBody>
+          <a:bodyPr>
+            <a:normAutofit/>
+          </a:bodyPr>
+          <a:lstStyle/>
+          <a:p>
+            <a:r>
+              <a:rPr lang="cs-CZ" sz="2000"/>
+              <a:t>Vhodný pro začátečníky, kteří přestoupili z Windows</a:t>
+            </a:r>
+          </a:p>
+          <a:p>
+            <a:r>
+              <a:rPr lang="cs-CZ" sz="2000"/>
+              <a:t>Dodává se s ekvivalenty Windows aplikací (př.: Microsoft Office je zde zastoupen s </a:t>
+            </a:r>
+            <a:r>
+              <a:rPr lang="cs-CZ" sz="2000" err="1"/>
+              <a:t>Libreoffice</a:t>
+            </a:r>
+            <a:r>
+              <a:rPr lang="cs-CZ" sz="2000"/>
+              <a:t>)</a:t>
+            </a:r>
+          </a:p>
+          <a:p>
+            <a:r>
+              <a:rPr lang="cs-CZ" sz="2000"/>
+              <a:t>V tomto operačním systému jsou tři grafická prostředí – </a:t>
+            </a:r>
+            <a:r>
+              <a:rPr lang="cs-CZ" sz="2000" err="1"/>
+              <a:t>Cinnamon</a:t>
+            </a:r>
+            <a:r>
+              <a:rPr lang="cs-CZ" sz="2000"/>
+              <a:t>, </a:t>
+            </a:r>
+            <a:r>
+              <a:rPr lang="cs-CZ" sz="2000" err="1"/>
+              <a:t>Xfce</a:t>
+            </a:r>
+            <a:r>
+              <a:rPr lang="cs-CZ" sz="2000"/>
+              <a:t>, Mate</a:t>
+            </a:r>
+          </a:p>
+          <a:p>
+            <a:endParaRPr lang="cs-CZ" sz="2000"/>
+          </a:p>
+        </p:txBody>
+      </p:sp>
+      <p:pic>
+        <p:nvPicPr>
+          <p:cNvPr id="14" name="Obrázek 13">
+            <a:extLst>
+              <a:ext uri="{FF2B5EF4-FFF2-40B4-BE49-F238E27FC236}">
+                <a16:creationId xmlns:a16="http://schemas.microsoft.com/office/drawing/2014/main" id="{B3DEAF35-3FF5-4CEE-A984-A5481683C6D4}"/>
+              </a:ext>
+              <a:ext uri="{C183D7F6-B498-43B3-948B-1728B52AA6E4}">
+                <adec:decorative xmlns:adec="http://schemas.microsoft.com/office/drawing/2017/decorative" val="1"/>
+              </a:ext>
+            </a:extLst>
+          </p:cNvPr>
+          <p:cNvPicPr>
+            <a:picLocks noChangeAspect="1"/>
+          </p:cNvPicPr>
+          <p:nvPr/>
+        </p:nvPicPr>
+        <p:blipFill rotWithShape="1">
+          <a:blip r:embed="rId3">
+            <a:extLst>
+              <a:ext uri="{28A0092B-C50C-407E-A947-70E740481C1C}">
+                <a14:useLocalDpi xmlns:a14="http://schemas.microsoft.com/office/drawing/2010/main" val="0"/>
+              </a:ext>
+              <a:ext uri="{837473B0-CC2E-450A-ABE3-18F120FF3D39}">
+                <a1611:picAttrSrcUrl xmlns:a1611="http://schemas.microsoft.com/office/drawing/2016/11/main" r:id="rId4"/>
+              </a:ext>
+            </a:extLst>
+          </a:blip>
+          <a:srcRect l="18596"/>
+          <a:stretch/>
+        </p:blipFill>
+        <p:spPr>
+          <a:xfrm>
+            <a:off x="4748403" y="10"/>
+            <a:ext cx="7443597" cy="6857990"/>
+          </a:xfrm>
+          <a:prstGeom prst="rect">
+            <a:avLst/>
+          </a:prstGeom>
+        </p:spPr>
+      </p:pic>
+      <p:sp>
+        <p:nvSpPr>
+          <p:cNvPr id="21" name="Rectangle 20">
+            <a:extLst>
+              <a:ext uri="{FF2B5EF4-FFF2-40B4-BE49-F238E27FC236}">
+                <a16:creationId xmlns:a16="http://schemas.microsoft.com/office/drawing/2014/main" id="{D8C68F39-5E8A-844C-A8FD-394F253C1E5F}"/>
+              </a:ext>
+              <a:ext uri="{C183D7F6-B498-43B3-948B-1728B52AA6E4}">
+                <adec:decorative xmlns:adec="http://schemas.microsoft.com/office/drawing/2017/decorative" val="1"/>
+              </a:ext>
+            </a:extLst>
+          </p:cNvPr>
+          <p:cNvSpPr>
+            <a:spLocks noGrp="1" noRot="1" noChangeAspect="1" noMove="1" noResize="1" noEditPoints="1" noAdjustHandles="1" noChangeArrowheads="1" noChangeShapeType="1" noTextEdit="1"/>
+          </p:cNvSpPr>
+          <p:nvPr>
+            <p:extLst>
+              <p:ext uri="{386F3935-93C4-4BCD-93E2-E3B085C9AB24}">
+                <p16:designElem xmlns:p16="http://schemas.microsoft.com/office/powerpoint/2015/main" val="1"/>
+              </p:ext>
+            </p:extLst>
+          </p:nvPr>
+        </p:nvSpPr>
+        <p:spPr>
+          <a:xfrm>
+            <a:off x="4748403" y="565153"/>
+            <a:ext cx="1133856" cy="6292847"/>
+          </a:xfrm>
+          <a:prstGeom prst="rect">
+            <a:avLst/>
+          </a:prstGeom>
+          <a:gradFill flip="none" rotWithShape="1">
+            <a:gsLst>
+              <a:gs pos="0">
+                <a:schemeClr val="accent1">
+                  <a:alpha val="50000"/>
+                </a:schemeClr>
+              </a:gs>
+              <a:gs pos="81000">
+                <a:schemeClr val="accent4">
+                  <a:alpha val="50000"/>
+                </a:schemeClr>
+              </a:gs>
+              <a:gs pos="25000">
+                <a:schemeClr val="accent2">
+                  <a:alpha val="60000"/>
+                </a:schemeClr>
+              </a:gs>
+              <a:gs pos="50000">
+                <a:schemeClr val="accent3">
+                  <a:alpha val="55000"/>
+                </a:schemeClr>
+              </a:gs>
+              <a:gs pos="99000">
+                <a:schemeClr val="accent5">
+                  <a:alpha val="50000"/>
+                </a:schemeClr>
+              </a:gs>
+            </a:gsLst>
+            <a:path path="circle">
+              <a:fillToRect r="100000" b="100000"/>
+            </a:path>
+            <a:tileRect l="-100000" t="-100000"/>
+          </a:gradFill>
+          <a:ln>
+            <a:noFill/>
+          </a:ln>
+        </p:spPr>
+        <p:style>
+          <a:lnRef idx="2">
+            <a:schemeClr val="accent1">
+              <a:shade val="50000"/>
+            </a:schemeClr>
+          </a:lnRef>
+          <a:fillRef idx="1">
+            <a:schemeClr val="accent1"/>
+          </a:fillRef>
+          <a:effectRef idx="0">
+            <a:schemeClr val="accent1"/>
+          </a:effectRef>
+          <a:fontRef idx="minor">
+            <a:schemeClr val="lt1"/>
+          </a:fontRef>
+        </p:style>
+        <p:txBody>
+          <a:bodyPr rtlCol="0" anchor="ctr"/>
+          <a:lstStyle/>
+          <a:p>
+            <a:pPr algn="ctr"/>
+            <a:endParaRPr lang="en-US"/>
+          </a:p>
+        </p:txBody>
+      </p:sp>
+      <p:sp>
+        <p:nvSpPr>
+          <p:cNvPr id="23" name="Rectangle 22">
+            <a:extLst>
+              <a:ext uri="{FF2B5EF4-FFF2-40B4-BE49-F238E27FC236}">
+                <a16:creationId xmlns:a16="http://schemas.microsoft.com/office/drawing/2014/main" id="{BC583CEB-AC2B-2640-94F6-5958E6BC5BAB}"/>
+              </a:ext>
+              <a:ext uri="{C183D7F6-B498-43B3-948B-1728B52AA6E4}">
+                <adec:decorative xmlns:adec="http://schemas.microsoft.com/office/drawing/2017/decorative" val="1"/>
+              </a:ext>
+            </a:extLst>
+          </p:cNvPr>
+          <p:cNvSpPr>
+            <a:spLocks noGrp="1" noRot="1" noChangeAspect="1" noMove="1" noResize="1" noEditPoints="1" noAdjustHandles="1" noChangeArrowheads="1" noChangeShapeType="1" noTextEdit="1"/>
+          </p:cNvSpPr>
+          <p:nvPr>
+            <p:extLst>
+              <p:ext uri="{386F3935-93C4-4BCD-93E2-E3B085C9AB24}">
+                <p16:designElem xmlns:p16="http://schemas.microsoft.com/office/powerpoint/2015/main" val="1"/>
+              </p:ext>
+            </p:extLst>
+          </p:nvPr>
+        </p:nvSpPr>
+        <p:spPr>
+          <a:xfrm>
+            <a:off x="4748403" y="-3"/>
+            <a:ext cx="565150" cy="6857999"/>
+          </a:xfrm>
+          <a:prstGeom prst="rect">
+            <a:avLst/>
+          </a:prstGeom>
+          <a:gradFill flip="none" rotWithShape="1">
+            <a:gsLst>
+              <a:gs pos="0">
+                <a:schemeClr val="accent1">
+                  <a:alpha val="50000"/>
+                </a:schemeClr>
+              </a:gs>
+              <a:gs pos="81000">
+                <a:schemeClr val="accent4">
+                  <a:alpha val="50000"/>
+                </a:schemeClr>
+              </a:gs>
+              <a:gs pos="25000">
+                <a:schemeClr val="accent2">
+                  <a:alpha val="60000"/>
+                </a:schemeClr>
+              </a:gs>
+              <a:gs pos="49000">
+                <a:schemeClr val="accent3">
+                  <a:alpha val="55000"/>
+                </a:schemeClr>
+              </a:gs>
+              <a:gs pos="99000">
+                <a:schemeClr val="accent5">
+                  <a:alpha val="50000"/>
+                </a:schemeClr>
+              </a:gs>
+            </a:gsLst>
+            <a:path path="circle">
+              <a:fillToRect r="100000" b="100000"/>
+            </a:path>
+            <a:tileRect l="-100000" t="-100000"/>
+          </a:gradFill>
+          <a:ln>
+            <a:noFill/>
+          </a:ln>
+        </p:spPr>
+        <p:style>
+          <a:lnRef idx="2">
+            <a:schemeClr val="accent1">
+              <a:shade val="50000"/>
+            </a:schemeClr>
+          </a:lnRef>
+          <a:fillRef idx="1">
+            <a:schemeClr val="accent1"/>
+          </a:fillRef>
+          <a:effectRef idx="0">
+            <a:schemeClr val="accent1"/>
+          </a:effectRef>
+          <a:fontRef idx="minor">
+            <a:schemeClr val="lt1"/>
+          </a:fontRef>
+        </p:style>
+        <p:txBody>
+          <a:bodyPr rtlCol="0" anchor="ctr"/>
+          <a:lstStyle/>
+          <a:p>
+            <a:pPr algn="ctr"/>
+            <a:endParaRPr lang="en-US"/>
+          </a:p>
+        </p:txBody>
+      </p:sp>
+    </p:spTree>
+    <p:extLst>
+      <p:ext uri="{BB962C8B-B14F-4D97-AF65-F5344CB8AC3E}">
+        <p14:creationId xmlns:p14="http://schemas.microsoft.com/office/powerpoint/2010/main" val="2129956801"/>
+      </p:ext>
+    </p:extLst>
+  </p:cSld>
+  <p:clrMapOvr>
+    <a:masterClrMapping/>
+  </p:clrMapOvr>
+  <mc:AlternateContent xmlns:mc="http://schemas.openxmlformats.org/markup-compatibility/2006" xmlns:p159="http://schemas.microsoft.com/office/powerpoint/2015/09/main">
+    <mc:Choice Requires="p159">
+      <p:transition xmlns:p14="http://schemas.microsoft.com/office/powerpoint/2010/main" spd="slow" p14:dur="2000">
+        <p159:morph option="byObject"/>
+      </p:transition>
+    </mc:Choice>
+    <mc:Fallback xmlns="">
+      <p:transition spd="slow">
+        <p:fade/>
+      </p:transition>
+    </mc:Fallback>
+  </mc:AlternateContent>
 </p:sld>
 </file>
 
@@ -18555,13 +20528,13 @@
   <p:clrMapOvr>
     <a:masterClrMapping/>
   </p:clrMapOvr>
-  <mc:AlternateContent xmlns:mc="http://schemas.openxmlformats.org/markup-compatibility/2006">
-    <mc:Choice xmlns:p159="http://schemas.microsoft.com/office/powerpoint/2015/09/main" Requires="p159">
+  <mc:AlternateContent xmlns:mc="http://schemas.openxmlformats.org/markup-compatibility/2006" xmlns:p159="http://schemas.microsoft.com/office/powerpoint/2015/09/main">
+    <mc:Choice Requires="p159">
       <p:transition xmlns:p14="http://schemas.microsoft.com/office/powerpoint/2010/main" spd="slow" p14:dur="2000">
         <p159:morph option="byObject"/>
       </p:transition>
     </mc:Choice>
-    <mc:Fallback>
+    <mc:Fallback xmlns="">
       <p:transition spd="slow">
         <p:fade/>
       </p:transition>
@@ -19490,6 +21463,1497 @@
 </p:sld>
 </file>
 
+<file path=ppt/slides/slide20.xml><?xml version="1.0" encoding="utf-8"?>
+<p:sld xmlns:a="http://schemas.openxmlformats.org/drawingml/2006/main" xmlns:r="http://schemas.openxmlformats.org/officeDocument/2006/relationships" xmlns:p="http://schemas.openxmlformats.org/presentationml/2006/main">
+  <p:cSld>
+    <p:bg>
+      <p:bgPr>
+        <a:solidFill>
+          <a:schemeClr val="bg1"/>
+        </a:solidFill>
+        <a:effectLst/>
+      </p:bgPr>
+    </p:bg>
+    <p:spTree>
+      <p:nvGrpSpPr>
+        <p:cNvPr id="1" name=""/>
+        <p:cNvGrpSpPr/>
+        <p:nvPr/>
+      </p:nvGrpSpPr>
+      <p:grpSpPr>
+        <a:xfrm>
+          <a:off x="0" y="0"/>
+          <a:ext cx="0" cy="0"/>
+          <a:chOff x="0" y="0"/>
+          <a:chExt cx="0" cy="0"/>
+        </a:xfrm>
+      </p:grpSpPr>
+      <p:sp useBgFill="1">
+        <p:nvSpPr>
+          <p:cNvPr id="9" name="Rectangle 8">
+            <a:extLst>
+              <a:ext uri="{FF2B5EF4-FFF2-40B4-BE49-F238E27FC236}">
+                <a16:creationId xmlns:a16="http://schemas.microsoft.com/office/drawing/2014/main" id="{C868C70C-E5C4-CD47-888C-FCB3373B6D38}"/>
+              </a:ext>
+              <a:ext uri="{C183D7F6-B498-43B3-948B-1728B52AA6E4}">
+                <adec:decorative xmlns:adec="http://schemas.microsoft.com/office/drawing/2017/decorative" val="1"/>
+              </a:ext>
+            </a:extLst>
+          </p:cNvPr>
+          <p:cNvSpPr>
+            <a:spLocks noGrp="1" noRot="1" noChangeAspect="1" noMove="1" noResize="1" noEditPoints="1" noAdjustHandles="1" noChangeArrowheads="1" noChangeShapeType="1" noTextEdit="1"/>
+          </p:cNvSpPr>
+          <p:nvPr>
+            <p:extLst>
+              <p:ext uri="{386F3935-93C4-4BCD-93E2-E3B085C9AB24}">
+                <p16:designElem xmlns:p16="http://schemas.microsoft.com/office/powerpoint/2015/main" val="1"/>
+              </p:ext>
+            </p:extLst>
+          </p:nvPr>
+        </p:nvSpPr>
+        <p:spPr>
+          <a:xfrm>
+            <a:off x="0" y="0"/>
+            <a:ext cx="12188952" cy="6858000"/>
+          </a:xfrm>
+          <a:prstGeom prst="rect">
+            <a:avLst/>
+          </a:prstGeom>
+          <a:ln>
+            <a:noFill/>
+          </a:ln>
+        </p:spPr>
+        <p:style>
+          <a:lnRef idx="2">
+            <a:schemeClr val="accent1">
+              <a:shade val="50000"/>
+            </a:schemeClr>
+          </a:lnRef>
+          <a:fillRef idx="1">
+            <a:schemeClr val="accent1"/>
+          </a:fillRef>
+          <a:effectRef idx="0">
+            <a:schemeClr val="accent1"/>
+          </a:effectRef>
+          <a:fontRef idx="minor">
+            <a:schemeClr val="lt1"/>
+          </a:fontRef>
+        </p:style>
+        <p:txBody>
+          <a:bodyPr rtlCol="0" anchor="ctr"/>
+          <a:lstStyle/>
+          <a:p>
+            <a:pPr algn="ctr"/>
+            <a:endParaRPr lang="en-US"/>
+          </a:p>
+        </p:txBody>
+      </p:sp>
+      <p:sp>
+        <p:nvSpPr>
+          <p:cNvPr id="2" name="Nadpis 1">
+            <a:extLst>
+              <a:ext uri="{FF2B5EF4-FFF2-40B4-BE49-F238E27FC236}">
+                <a16:creationId xmlns:a16="http://schemas.microsoft.com/office/drawing/2014/main" id="{DA46E1F4-1B90-4D56-8635-F37FA732B5A7}"/>
+              </a:ext>
+            </a:extLst>
+          </p:cNvPr>
+          <p:cNvSpPr>
+            <a:spLocks noGrp="1"/>
+          </p:cNvSpPr>
+          <p:nvPr>
+            <p:ph type="title"/>
+          </p:nvPr>
+        </p:nvSpPr>
+        <p:spPr>
+          <a:xfrm>
+            <a:off x="1587710" y="455362"/>
+            <a:ext cx="4018219" cy="1550419"/>
+          </a:xfrm>
+        </p:spPr>
+        <p:txBody>
+          <a:bodyPr>
+            <a:normAutofit/>
+          </a:bodyPr>
+          <a:lstStyle/>
+          <a:p>
+            <a:r>
+              <a:rPr lang="cs-CZ" dirty="0"/>
+              <a:t>Unikáty:</a:t>
+            </a:r>
+            <a:br>
+              <a:rPr lang="cs-CZ" dirty="0"/>
+            </a:br>
+            <a:r>
+              <a:rPr lang="cs-CZ" dirty="0" err="1"/>
+              <a:t>Suicide</a:t>
+            </a:r>
+            <a:r>
+              <a:rPr lang="cs-CZ" dirty="0"/>
+              <a:t> Linux</a:t>
+            </a:r>
+          </a:p>
+        </p:txBody>
+      </p:sp>
+      <p:sp>
+        <p:nvSpPr>
+          <p:cNvPr id="11" name="Rectangle 10">
+            <a:extLst>
+              <a:ext uri="{FF2B5EF4-FFF2-40B4-BE49-F238E27FC236}">
+                <a16:creationId xmlns:a16="http://schemas.microsoft.com/office/drawing/2014/main" id="{D8C68F39-5E8A-844C-A8FD-394F253C1E5F}"/>
+              </a:ext>
+              <a:ext uri="{C183D7F6-B498-43B3-948B-1728B52AA6E4}">
+                <adec:decorative xmlns:adec="http://schemas.microsoft.com/office/drawing/2017/decorative" val="1"/>
+              </a:ext>
+            </a:extLst>
+          </p:cNvPr>
+          <p:cNvSpPr>
+            <a:spLocks noGrp="1" noRot="1" noChangeAspect="1" noMove="1" noResize="1" noEditPoints="1" noAdjustHandles="1" noChangeArrowheads="1" noChangeShapeType="1" noTextEdit="1"/>
+          </p:cNvSpPr>
+          <p:nvPr>
+            <p:extLst>
+              <p:ext uri="{386F3935-93C4-4BCD-93E2-E3B085C9AB24}">
+                <p16:designElem xmlns:p16="http://schemas.microsoft.com/office/powerpoint/2015/main" val="1"/>
+              </p:ext>
+            </p:extLst>
+          </p:nvPr>
+        </p:nvSpPr>
+        <p:spPr>
+          <a:xfrm>
+            <a:off x="0" y="565153"/>
+            <a:ext cx="1133856" cy="6292847"/>
+          </a:xfrm>
+          <a:prstGeom prst="rect">
+            <a:avLst/>
+          </a:prstGeom>
+          <a:gradFill flip="none" rotWithShape="1">
+            <a:gsLst>
+              <a:gs pos="0">
+                <a:schemeClr val="accent1">
+                  <a:alpha val="50000"/>
+                </a:schemeClr>
+              </a:gs>
+              <a:gs pos="81000">
+                <a:schemeClr val="accent4">
+                  <a:alpha val="50000"/>
+                </a:schemeClr>
+              </a:gs>
+              <a:gs pos="25000">
+                <a:schemeClr val="accent2">
+                  <a:alpha val="60000"/>
+                </a:schemeClr>
+              </a:gs>
+              <a:gs pos="50000">
+                <a:schemeClr val="accent3">
+                  <a:alpha val="55000"/>
+                </a:schemeClr>
+              </a:gs>
+              <a:gs pos="99000">
+                <a:schemeClr val="accent5">
+                  <a:alpha val="50000"/>
+                </a:schemeClr>
+              </a:gs>
+            </a:gsLst>
+            <a:path path="circle">
+              <a:fillToRect r="100000" b="100000"/>
+            </a:path>
+            <a:tileRect l="-100000" t="-100000"/>
+          </a:gradFill>
+          <a:ln>
+            <a:noFill/>
+          </a:ln>
+        </p:spPr>
+        <p:style>
+          <a:lnRef idx="2">
+            <a:schemeClr val="accent1">
+              <a:shade val="50000"/>
+            </a:schemeClr>
+          </a:lnRef>
+          <a:fillRef idx="1">
+            <a:schemeClr val="accent1"/>
+          </a:fillRef>
+          <a:effectRef idx="0">
+            <a:schemeClr val="accent1"/>
+          </a:effectRef>
+          <a:fontRef idx="minor">
+            <a:schemeClr val="lt1"/>
+          </a:fontRef>
+        </p:style>
+        <p:txBody>
+          <a:bodyPr rtlCol="0" anchor="ctr"/>
+          <a:lstStyle/>
+          <a:p>
+            <a:pPr algn="ctr"/>
+            <a:endParaRPr lang="en-US"/>
+          </a:p>
+        </p:txBody>
+      </p:sp>
+      <p:sp>
+        <p:nvSpPr>
+          <p:cNvPr id="13" name="Rectangle 12">
+            <a:extLst>
+              <a:ext uri="{FF2B5EF4-FFF2-40B4-BE49-F238E27FC236}">
+                <a16:creationId xmlns:a16="http://schemas.microsoft.com/office/drawing/2014/main" id="{BC583CEB-AC2B-2640-94F6-5958E6BC5BAB}"/>
+              </a:ext>
+              <a:ext uri="{C183D7F6-B498-43B3-948B-1728B52AA6E4}">
+                <adec:decorative xmlns:adec="http://schemas.microsoft.com/office/drawing/2017/decorative" val="1"/>
+              </a:ext>
+            </a:extLst>
+          </p:cNvPr>
+          <p:cNvSpPr>
+            <a:spLocks noGrp="1" noRot="1" noChangeAspect="1" noMove="1" noResize="1" noEditPoints="1" noAdjustHandles="1" noChangeArrowheads="1" noChangeShapeType="1" noTextEdit="1"/>
+          </p:cNvSpPr>
+          <p:nvPr>
+            <p:extLst>
+              <p:ext uri="{386F3935-93C4-4BCD-93E2-E3B085C9AB24}">
+                <p16:designElem xmlns:p16="http://schemas.microsoft.com/office/powerpoint/2015/main" val="1"/>
+              </p:ext>
+            </p:extLst>
+          </p:nvPr>
+        </p:nvSpPr>
+        <p:spPr>
+          <a:xfrm>
+            <a:off x="0" y="-3"/>
+            <a:ext cx="565150" cy="6857999"/>
+          </a:xfrm>
+          <a:prstGeom prst="rect">
+            <a:avLst/>
+          </a:prstGeom>
+          <a:gradFill flip="none" rotWithShape="1">
+            <a:gsLst>
+              <a:gs pos="0">
+                <a:schemeClr val="accent1">
+                  <a:alpha val="50000"/>
+                </a:schemeClr>
+              </a:gs>
+              <a:gs pos="81000">
+                <a:schemeClr val="accent4">
+                  <a:alpha val="50000"/>
+                </a:schemeClr>
+              </a:gs>
+              <a:gs pos="25000">
+                <a:schemeClr val="accent2">
+                  <a:alpha val="60000"/>
+                </a:schemeClr>
+              </a:gs>
+              <a:gs pos="49000">
+                <a:schemeClr val="accent3">
+                  <a:alpha val="55000"/>
+                </a:schemeClr>
+              </a:gs>
+              <a:gs pos="99000">
+                <a:schemeClr val="accent5">
+                  <a:alpha val="50000"/>
+                </a:schemeClr>
+              </a:gs>
+            </a:gsLst>
+            <a:path path="circle">
+              <a:fillToRect r="100000" b="100000"/>
+            </a:path>
+            <a:tileRect l="-100000" t="-100000"/>
+          </a:gradFill>
+          <a:ln>
+            <a:noFill/>
+          </a:ln>
+        </p:spPr>
+        <p:style>
+          <a:lnRef idx="2">
+            <a:schemeClr val="accent1">
+              <a:shade val="50000"/>
+            </a:schemeClr>
+          </a:lnRef>
+          <a:fillRef idx="1">
+            <a:schemeClr val="accent1"/>
+          </a:fillRef>
+          <a:effectRef idx="0">
+            <a:schemeClr val="accent1"/>
+          </a:effectRef>
+          <a:fontRef idx="minor">
+            <a:schemeClr val="lt1"/>
+          </a:fontRef>
+        </p:style>
+        <p:txBody>
+          <a:bodyPr rtlCol="0" anchor="ctr"/>
+          <a:lstStyle/>
+          <a:p>
+            <a:pPr algn="ctr"/>
+            <a:endParaRPr lang="en-US"/>
+          </a:p>
+        </p:txBody>
+      </p:sp>
+      <p:sp>
+        <p:nvSpPr>
+          <p:cNvPr id="3" name="Zástupný obsah 2">
+            <a:extLst>
+              <a:ext uri="{FF2B5EF4-FFF2-40B4-BE49-F238E27FC236}">
+                <a16:creationId xmlns:a16="http://schemas.microsoft.com/office/drawing/2014/main" id="{5DD2B334-C90F-495C-94B2-6FAB82D46653}"/>
+              </a:ext>
+            </a:extLst>
+          </p:cNvPr>
+          <p:cNvSpPr>
+            <a:spLocks noGrp="1"/>
+          </p:cNvSpPr>
+          <p:nvPr>
+            <p:ph idx="1"/>
+          </p:nvPr>
+        </p:nvSpPr>
+        <p:spPr>
+          <a:xfrm>
+            <a:off x="1587710" y="2160016"/>
+            <a:ext cx="4018219" cy="3926152"/>
+          </a:xfrm>
+        </p:spPr>
+        <p:txBody>
+          <a:bodyPr>
+            <a:normAutofit/>
+          </a:bodyPr>
+          <a:lstStyle/>
+          <a:p>
+            <a:pPr>
+              <a:lnSpc>
+                <a:spcPct val="100000"/>
+              </a:lnSpc>
+            </a:pPr>
+            <a:r>
+              <a:rPr lang="cs-CZ" dirty="0"/>
+              <a:t>Tento Linux je derivát </a:t>
+            </a:r>
+            <a:r>
+              <a:rPr lang="cs-CZ" dirty="0" err="1"/>
+              <a:t>Ubuntu</a:t>
+            </a:r>
+            <a:endParaRPr lang="cs-CZ"/>
+          </a:p>
+          <a:p>
+            <a:pPr>
+              <a:lnSpc>
+                <a:spcPct val="100000"/>
+              </a:lnSpc>
+            </a:pPr>
+            <a:r>
+              <a:rPr lang="cs-CZ" dirty="0"/>
+              <a:t>Při špatném pojmenováni souboru si, místo toho, aby ho opravil systém název přečte jako </a:t>
+            </a:r>
+            <a:r>
+              <a:rPr lang="cs-CZ" dirty="0" err="1"/>
+              <a:t>rm</a:t>
+            </a:r>
+            <a:r>
+              <a:rPr lang="cs-CZ" dirty="0"/>
+              <a:t> –</a:t>
+            </a:r>
+            <a:r>
+              <a:rPr lang="cs-CZ" dirty="0" err="1"/>
+              <a:t>rf</a:t>
+            </a:r>
+            <a:r>
+              <a:rPr lang="cs-CZ" dirty="0"/>
+              <a:t>/, což znamená vymazat disk</a:t>
+            </a:r>
+            <a:endParaRPr lang="cs-CZ"/>
+          </a:p>
+          <a:p>
+            <a:pPr>
+              <a:lnSpc>
+                <a:spcPct val="100000"/>
+              </a:lnSpc>
+            </a:pPr>
+            <a:r>
+              <a:rPr lang="cs-CZ" dirty="0"/>
+              <a:t>Je to šílené, ale existuje to</a:t>
+            </a:r>
+            <a:endParaRPr lang="cs-CZ"/>
+          </a:p>
+          <a:p>
+            <a:pPr>
+              <a:lnSpc>
+                <a:spcPct val="100000"/>
+              </a:lnSpc>
+            </a:pPr>
+            <a:r>
+              <a:rPr lang="cs-CZ" dirty="0"/>
+              <a:t>Doporučuji tento systém nepoužívat</a:t>
+            </a:r>
+            <a:endParaRPr lang="cs-CZ"/>
+          </a:p>
+          <a:p>
+            <a:pPr>
+              <a:lnSpc>
+                <a:spcPct val="100000"/>
+              </a:lnSpc>
+            </a:pPr>
+            <a:endParaRPr lang="cs-CZ"/>
+          </a:p>
+        </p:txBody>
+      </p:sp>
+      <p:pic>
+        <p:nvPicPr>
+          <p:cNvPr id="1026" name="Picture 2">
+            <a:extLst>
+              <a:ext uri="{FF2B5EF4-FFF2-40B4-BE49-F238E27FC236}">
+                <a16:creationId xmlns:a16="http://schemas.microsoft.com/office/drawing/2014/main" id="{64572F44-9B1C-41F7-B716-690BA5735189}"/>
+              </a:ext>
+            </a:extLst>
+          </p:cNvPr>
+          <p:cNvPicPr>
+            <a:picLocks noChangeAspect="1" noChangeArrowheads="1"/>
+          </p:cNvPicPr>
+          <p:nvPr/>
+        </p:nvPicPr>
+        <p:blipFill rotWithShape="1">
+          <a:blip r:embed="rId2">
+            <a:extLst>
+              <a:ext uri="{28A0092B-C50C-407E-A947-70E740481C1C}">
+                <a14:useLocalDpi xmlns:a14="http://schemas.microsoft.com/office/drawing/2010/main" val="0"/>
+              </a:ext>
+            </a:extLst>
+          </a:blip>
+          <a:srcRect r="46335"/>
+          <a:stretch/>
+        </p:blipFill>
+        <p:spPr bwMode="auto">
+          <a:xfrm>
+            <a:off x="5666161" y="-4"/>
+            <a:ext cx="6542868" cy="6858000"/>
+          </a:xfrm>
+          <a:prstGeom prst="rect">
+            <a:avLst/>
+          </a:prstGeom>
+          <a:noFill/>
+          <a:extLst>
+            <a:ext uri="{909E8E84-426E-40DD-AFC4-6F175D3DCCD1}">
+              <a14:hiddenFill xmlns:a14="http://schemas.microsoft.com/office/drawing/2010/main">
+                <a:solidFill>
+                  <a:srgbClr val="FFFFFF"/>
+                </a:solidFill>
+              </a14:hiddenFill>
+            </a:ext>
+          </a:extLst>
+        </p:spPr>
+      </p:pic>
+      <p:sp>
+        <p:nvSpPr>
+          <p:cNvPr id="5" name="TextovéPole 4">
+            <a:extLst>
+              <a:ext uri="{FF2B5EF4-FFF2-40B4-BE49-F238E27FC236}">
+                <a16:creationId xmlns:a16="http://schemas.microsoft.com/office/drawing/2014/main" id="{BF1F4B75-A5AB-49C6-850A-876884054596}"/>
+              </a:ext>
+            </a:extLst>
+          </p:cNvPr>
+          <p:cNvSpPr txBox="1"/>
+          <p:nvPr/>
+        </p:nvSpPr>
+        <p:spPr>
+          <a:xfrm>
+            <a:off x="6235724" y="6195978"/>
+            <a:ext cx="5403742" cy="369332"/>
+          </a:xfrm>
+          <a:prstGeom prst="rect">
+            <a:avLst/>
+          </a:prstGeom>
+          <a:noFill/>
+        </p:spPr>
+        <p:txBody>
+          <a:bodyPr wrap="square" rtlCol="0">
+            <a:spAutoFit/>
+          </a:bodyPr>
+          <a:lstStyle/>
+          <a:p>
+            <a:pPr algn="ctr"/>
+            <a:r>
+              <a:rPr lang="cs-CZ" dirty="0"/>
+              <a:t>Ukázka ze </a:t>
+            </a:r>
+            <a:r>
+              <a:rPr lang="cs-CZ" dirty="0" err="1"/>
+              <a:t>Suicide</a:t>
+            </a:r>
+            <a:r>
+              <a:rPr lang="cs-CZ" dirty="0"/>
+              <a:t> Linux</a:t>
+            </a:r>
+          </a:p>
+        </p:txBody>
+      </p:sp>
+    </p:spTree>
+    <p:extLst>
+      <p:ext uri="{BB962C8B-B14F-4D97-AF65-F5344CB8AC3E}">
+        <p14:creationId xmlns:p14="http://schemas.microsoft.com/office/powerpoint/2010/main" val="4003637783"/>
+      </p:ext>
+    </p:extLst>
+  </p:cSld>
+  <p:clrMapOvr>
+    <a:masterClrMapping/>
+  </p:clrMapOvr>
+  <mc:AlternateContent xmlns:mc="http://schemas.openxmlformats.org/markup-compatibility/2006" xmlns:p159="http://schemas.microsoft.com/office/powerpoint/2015/09/main">
+    <mc:Choice Requires="p159">
+      <p:transition xmlns:p14="http://schemas.microsoft.com/office/powerpoint/2010/main" spd="slow" p14:dur="2000">
+        <p159:morph option="byObject"/>
+      </p:transition>
+    </mc:Choice>
+    <mc:Fallback xmlns="">
+      <p:transition spd="slow">
+        <p:fade/>
+      </p:transition>
+    </mc:Fallback>
+  </mc:AlternateContent>
+</p:sld>
+</file>
+
+<file path=ppt/slides/slide21.xml><?xml version="1.0" encoding="utf-8"?>
+<p:sld xmlns:a="http://schemas.openxmlformats.org/drawingml/2006/main" xmlns:r="http://schemas.openxmlformats.org/officeDocument/2006/relationships" xmlns:p="http://schemas.openxmlformats.org/presentationml/2006/main">
+  <p:cSld>
+    <p:bg>
+      <p:bgPr>
+        <a:solidFill>
+          <a:schemeClr val="bg1"/>
+        </a:solidFill>
+        <a:effectLst/>
+      </p:bgPr>
+    </p:bg>
+    <p:spTree>
+      <p:nvGrpSpPr>
+        <p:cNvPr id="1" name=""/>
+        <p:cNvGrpSpPr/>
+        <p:nvPr/>
+      </p:nvGrpSpPr>
+      <p:grpSpPr>
+        <a:xfrm>
+          <a:off x="0" y="0"/>
+          <a:ext cx="0" cy="0"/>
+          <a:chOff x="0" y="0"/>
+          <a:chExt cx="0" cy="0"/>
+        </a:xfrm>
+      </p:grpSpPr>
+      <p:sp useBgFill="1">
+        <p:nvSpPr>
+          <p:cNvPr id="10" name="Rectangle 9">
+            <a:extLst>
+              <a:ext uri="{FF2B5EF4-FFF2-40B4-BE49-F238E27FC236}">
+                <a16:creationId xmlns:a16="http://schemas.microsoft.com/office/drawing/2014/main" id="{C868C70C-E5C4-CD47-888C-FCB3373B6D38}"/>
+              </a:ext>
+              <a:ext uri="{C183D7F6-B498-43B3-948B-1728B52AA6E4}">
+                <adec:decorative xmlns:adec="http://schemas.microsoft.com/office/drawing/2017/decorative" val="1"/>
+              </a:ext>
+            </a:extLst>
+          </p:cNvPr>
+          <p:cNvSpPr>
+            <a:spLocks noGrp="1" noRot="1" noChangeAspect="1" noMove="1" noResize="1" noEditPoints="1" noAdjustHandles="1" noChangeArrowheads="1" noChangeShapeType="1" noTextEdit="1"/>
+          </p:cNvSpPr>
+          <p:nvPr>
+            <p:extLst>
+              <p:ext uri="{386F3935-93C4-4BCD-93E2-E3B085C9AB24}">
+                <p16:designElem xmlns:p16="http://schemas.microsoft.com/office/powerpoint/2015/main" val="1"/>
+              </p:ext>
+            </p:extLst>
+          </p:nvPr>
+        </p:nvSpPr>
+        <p:spPr>
+          <a:xfrm>
+            <a:off x="0" y="0"/>
+            <a:ext cx="12188952" cy="6858000"/>
+          </a:xfrm>
+          <a:prstGeom prst="rect">
+            <a:avLst/>
+          </a:prstGeom>
+          <a:ln>
+            <a:noFill/>
+          </a:ln>
+        </p:spPr>
+        <p:style>
+          <a:lnRef idx="2">
+            <a:schemeClr val="accent1">
+              <a:shade val="50000"/>
+            </a:schemeClr>
+          </a:lnRef>
+          <a:fillRef idx="1">
+            <a:schemeClr val="accent1"/>
+          </a:fillRef>
+          <a:effectRef idx="0">
+            <a:schemeClr val="accent1"/>
+          </a:effectRef>
+          <a:fontRef idx="minor">
+            <a:schemeClr val="lt1"/>
+          </a:fontRef>
+        </p:style>
+        <p:txBody>
+          <a:bodyPr rtlCol="0" anchor="ctr"/>
+          <a:lstStyle/>
+          <a:p>
+            <a:pPr algn="ctr"/>
+            <a:endParaRPr lang="en-US"/>
+          </a:p>
+        </p:txBody>
+      </p:sp>
+      <p:sp>
+        <p:nvSpPr>
+          <p:cNvPr id="2" name="Nadpis 1">
+            <a:extLst>
+              <a:ext uri="{FF2B5EF4-FFF2-40B4-BE49-F238E27FC236}">
+                <a16:creationId xmlns:a16="http://schemas.microsoft.com/office/drawing/2014/main" id="{0308B59C-22B6-46D3-AEDF-052BCC0235AF}"/>
+              </a:ext>
+            </a:extLst>
+          </p:cNvPr>
+          <p:cNvSpPr>
+            <a:spLocks noGrp="1"/>
+          </p:cNvSpPr>
+          <p:nvPr>
+            <p:ph type="title"/>
+          </p:nvPr>
+        </p:nvSpPr>
+        <p:spPr>
+          <a:xfrm>
+            <a:off x="565151" y="455362"/>
+            <a:ext cx="6881728" cy="1550419"/>
+          </a:xfrm>
+        </p:spPr>
+        <p:txBody>
+          <a:bodyPr>
+            <a:normAutofit/>
+          </a:bodyPr>
+          <a:lstStyle/>
+          <a:p>
+            <a:r>
+              <a:rPr lang="cs-CZ" dirty="0"/>
+              <a:t>Hannah Montana Linux</a:t>
+            </a:r>
+          </a:p>
+        </p:txBody>
+      </p:sp>
+      <p:sp>
+        <p:nvSpPr>
+          <p:cNvPr id="3" name="Zástupný obsah 2">
+            <a:extLst>
+              <a:ext uri="{FF2B5EF4-FFF2-40B4-BE49-F238E27FC236}">
+                <a16:creationId xmlns:a16="http://schemas.microsoft.com/office/drawing/2014/main" id="{C6A24448-7B36-4B8F-A9D2-A3547D86629E}"/>
+              </a:ext>
+            </a:extLst>
+          </p:cNvPr>
+          <p:cNvSpPr>
+            <a:spLocks noGrp="1"/>
+          </p:cNvSpPr>
+          <p:nvPr>
+            <p:ph idx="1"/>
+          </p:nvPr>
+        </p:nvSpPr>
+        <p:spPr>
+          <a:xfrm>
+            <a:off x="565151" y="2160016"/>
+            <a:ext cx="6881728" cy="3926152"/>
+          </a:xfrm>
+        </p:spPr>
+        <p:txBody>
+          <a:bodyPr>
+            <a:normAutofit/>
+          </a:bodyPr>
+          <a:lstStyle/>
+          <a:p>
+            <a:r>
+              <a:rPr lang="cs-CZ" dirty="0"/>
+              <a:t>Tato distribuce je to co říká</a:t>
+            </a:r>
+          </a:p>
+          <a:p>
+            <a:r>
+              <a:rPr lang="cs-CZ" dirty="0"/>
+              <a:t>Tento Linux byl určen pro dívky okolo roku 2003</a:t>
+            </a:r>
+          </a:p>
+          <a:p>
+            <a:r>
+              <a:rPr lang="cs-CZ" dirty="0"/>
+              <a:t>Je vybaven tématem televizního seriálu, který je v jeho názvu</a:t>
+            </a:r>
+          </a:p>
+          <a:p>
+            <a:r>
+              <a:rPr lang="cs-CZ" dirty="0"/>
+              <a:t>Je to derivát </a:t>
+            </a:r>
+            <a:r>
+              <a:rPr lang="cs-CZ" dirty="0" err="1"/>
+              <a:t>Kubuntu</a:t>
+            </a:r>
+            <a:endParaRPr lang="cs-CZ" dirty="0"/>
+          </a:p>
+        </p:txBody>
+      </p:sp>
+      <p:pic>
+        <p:nvPicPr>
+          <p:cNvPr id="5" name="Obrázek 4">
+            <a:extLst>
+              <a:ext uri="{FF2B5EF4-FFF2-40B4-BE49-F238E27FC236}">
+                <a16:creationId xmlns:a16="http://schemas.microsoft.com/office/drawing/2014/main" id="{DED92F3C-6434-4040-9F16-F3D3AB4BE677}"/>
+              </a:ext>
+            </a:extLst>
+          </p:cNvPr>
+          <p:cNvPicPr>
+            <a:picLocks noChangeAspect="1"/>
+          </p:cNvPicPr>
+          <p:nvPr/>
+        </p:nvPicPr>
+        <p:blipFill rotWithShape="1">
+          <a:blip r:embed="rId3"/>
+          <a:srcRect r="8833"/>
+          <a:stretch/>
+        </p:blipFill>
+        <p:spPr>
+          <a:xfrm>
+            <a:off x="8018632" y="10"/>
+            <a:ext cx="4173368" cy="6857990"/>
+          </a:xfrm>
+          <a:prstGeom prst="rect">
+            <a:avLst/>
+          </a:prstGeom>
+        </p:spPr>
+      </p:pic>
+      <p:sp>
+        <p:nvSpPr>
+          <p:cNvPr id="12" name="Rectangle 11">
+            <a:extLst>
+              <a:ext uri="{FF2B5EF4-FFF2-40B4-BE49-F238E27FC236}">
+                <a16:creationId xmlns:a16="http://schemas.microsoft.com/office/drawing/2014/main" id="{D8C68F39-5E8A-844C-A8FD-394F253C1E5F}"/>
+              </a:ext>
+              <a:ext uri="{C183D7F6-B498-43B3-948B-1728B52AA6E4}">
+                <adec:decorative xmlns:adec="http://schemas.microsoft.com/office/drawing/2017/decorative" val="1"/>
+              </a:ext>
+            </a:extLst>
+          </p:cNvPr>
+          <p:cNvSpPr>
+            <a:spLocks noGrp="1" noRot="1" noChangeAspect="1" noMove="1" noResize="1" noEditPoints="1" noAdjustHandles="1" noChangeArrowheads="1" noChangeShapeType="1" noTextEdit="1"/>
+          </p:cNvSpPr>
+          <p:nvPr>
+            <p:extLst>
+              <p:ext uri="{386F3935-93C4-4BCD-93E2-E3B085C9AB24}">
+                <p16:designElem xmlns:p16="http://schemas.microsoft.com/office/powerpoint/2015/main" val="1"/>
+              </p:ext>
+            </p:extLst>
+          </p:nvPr>
+        </p:nvSpPr>
+        <p:spPr>
+          <a:xfrm>
+            <a:off x="8018632" y="565153"/>
+            <a:ext cx="1133856" cy="6292847"/>
+          </a:xfrm>
+          <a:prstGeom prst="rect">
+            <a:avLst/>
+          </a:prstGeom>
+          <a:gradFill flip="none" rotWithShape="1">
+            <a:gsLst>
+              <a:gs pos="0">
+                <a:schemeClr val="accent1">
+                  <a:alpha val="50000"/>
+                </a:schemeClr>
+              </a:gs>
+              <a:gs pos="81000">
+                <a:schemeClr val="accent4">
+                  <a:alpha val="50000"/>
+                </a:schemeClr>
+              </a:gs>
+              <a:gs pos="25000">
+                <a:schemeClr val="accent2">
+                  <a:alpha val="60000"/>
+                </a:schemeClr>
+              </a:gs>
+              <a:gs pos="50000">
+                <a:schemeClr val="accent3">
+                  <a:alpha val="55000"/>
+                </a:schemeClr>
+              </a:gs>
+              <a:gs pos="99000">
+                <a:schemeClr val="accent5">
+                  <a:alpha val="50000"/>
+                </a:schemeClr>
+              </a:gs>
+            </a:gsLst>
+            <a:path path="circle">
+              <a:fillToRect r="100000" b="100000"/>
+            </a:path>
+            <a:tileRect l="-100000" t="-100000"/>
+          </a:gradFill>
+          <a:ln>
+            <a:noFill/>
+          </a:ln>
+        </p:spPr>
+        <p:style>
+          <a:lnRef idx="2">
+            <a:schemeClr val="accent1">
+              <a:shade val="50000"/>
+            </a:schemeClr>
+          </a:lnRef>
+          <a:fillRef idx="1">
+            <a:schemeClr val="accent1"/>
+          </a:fillRef>
+          <a:effectRef idx="0">
+            <a:schemeClr val="accent1"/>
+          </a:effectRef>
+          <a:fontRef idx="minor">
+            <a:schemeClr val="lt1"/>
+          </a:fontRef>
+        </p:style>
+        <p:txBody>
+          <a:bodyPr rtlCol="0" anchor="ctr"/>
+          <a:lstStyle/>
+          <a:p>
+            <a:pPr algn="ctr"/>
+            <a:endParaRPr lang="en-US"/>
+          </a:p>
+        </p:txBody>
+      </p:sp>
+      <p:sp>
+        <p:nvSpPr>
+          <p:cNvPr id="14" name="Rectangle 13">
+            <a:extLst>
+              <a:ext uri="{FF2B5EF4-FFF2-40B4-BE49-F238E27FC236}">
+                <a16:creationId xmlns:a16="http://schemas.microsoft.com/office/drawing/2014/main" id="{BC583CEB-AC2B-2640-94F6-5958E6BC5BAB}"/>
+              </a:ext>
+              <a:ext uri="{C183D7F6-B498-43B3-948B-1728B52AA6E4}">
+                <adec:decorative xmlns:adec="http://schemas.microsoft.com/office/drawing/2017/decorative" val="1"/>
+              </a:ext>
+            </a:extLst>
+          </p:cNvPr>
+          <p:cNvSpPr>
+            <a:spLocks noGrp="1" noRot="1" noChangeAspect="1" noMove="1" noResize="1" noEditPoints="1" noAdjustHandles="1" noChangeArrowheads="1" noChangeShapeType="1" noTextEdit="1"/>
+          </p:cNvSpPr>
+          <p:nvPr>
+            <p:extLst>
+              <p:ext uri="{386F3935-93C4-4BCD-93E2-E3B085C9AB24}">
+                <p16:designElem xmlns:p16="http://schemas.microsoft.com/office/powerpoint/2015/main" val="1"/>
+              </p:ext>
+            </p:extLst>
+          </p:nvPr>
+        </p:nvSpPr>
+        <p:spPr>
+          <a:xfrm>
+            <a:off x="8018632" y="-3"/>
+            <a:ext cx="565150" cy="6857999"/>
+          </a:xfrm>
+          <a:prstGeom prst="rect">
+            <a:avLst/>
+          </a:prstGeom>
+          <a:gradFill flip="none" rotWithShape="1">
+            <a:gsLst>
+              <a:gs pos="0">
+                <a:schemeClr val="accent1">
+                  <a:alpha val="50000"/>
+                </a:schemeClr>
+              </a:gs>
+              <a:gs pos="81000">
+                <a:schemeClr val="accent4">
+                  <a:alpha val="50000"/>
+                </a:schemeClr>
+              </a:gs>
+              <a:gs pos="25000">
+                <a:schemeClr val="accent2">
+                  <a:alpha val="60000"/>
+                </a:schemeClr>
+              </a:gs>
+              <a:gs pos="49000">
+                <a:schemeClr val="accent3">
+                  <a:alpha val="55000"/>
+                </a:schemeClr>
+              </a:gs>
+              <a:gs pos="99000">
+                <a:schemeClr val="accent5">
+                  <a:alpha val="50000"/>
+                </a:schemeClr>
+              </a:gs>
+            </a:gsLst>
+            <a:path path="circle">
+              <a:fillToRect r="100000" b="100000"/>
+            </a:path>
+            <a:tileRect l="-100000" t="-100000"/>
+          </a:gradFill>
+          <a:ln>
+            <a:noFill/>
+          </a:ln>
+        </p:spPr>
+        <p:style>
+          <a:lnRef idx="2">
+            <a:schemeClr val="accent1">
+              <a:shade val="50000"/>
+            </a:schemeClr>
+          </a:lnRef>
+          <a:fillRef idx="1">
+            <a:schemeClr val="accent1"/>
+          </a:fillRef>
+          <a:effectRef idx="0">
+            <a:schemeClr val="accent1"/>
+          </a:effectRef>
+          <a:fontRef idx="minor">
+            <a:schemeClr val="lt1"/>
+          </a:fontRef>
+        </p:style>
+        <p:txBody>
+          <a:bodyPr rtlCol="0" anchor="ctr"/>
+          <a:lstStyle/>
+          <a:p>
+            <a:pPr algn="ctr"/>
+            <a:endParaRPr lang="en-US"/>
+          </a:p>
+        </p:txBody>
+      </p:sp>
+    </p:spTree>
+    <p:extLst>
+      <p:ext uri="{BB962C8B-B14F-4D97-AF65-F5344CB8AC3E}">
+        <p14:creationId xmlns:p14="http://schemas.microsoft.com/office/powerpoint/2010/main" val="4188016671"/>
+      </p:ext>
+    </p:extLst>
+  </p:cSld>
+  <p:clrMapOvr>
+    <a:masterClrMapping/>
+  </p:clrMapOvr>
+  <mc:AlternateContent xmlns:mc="http://schemas.openxmlformats.org/markup-compatibility/2006" xmlns:p159="http://schemas.microsoft.com/office/powerpoint/2015/09/main">
+    <mc:Choice Requires="p159">
+      <p:transition xmlns:p14="http://schemas.microsoft.com/office/powerpoint/2010/main" spd="slow" p14:dur="2000">
+        <p159:morph option="byObject"/>
+      </p:transition>
+    </mc:Choice>
+    <mc:Fallback xmlns="">
+      <p:transition spd="slow">
+        <p:fade/>
+      </p:transition>
+    </mc:Fallback>
+  </mc:AlternateContent>
+</p:sld>
+</file>
+
+<file path=ppt/slides/slide22.xml><?xml version="1.0" encoding="utf-8"?>
+<p:sld xmlns:a="http://schemas.openxmlformats.org/drawingml/2006/main" xmlns:r="http://schemas.openxmlformats.org/officeDocument/2006/relationships" xmlns:p="http://schemas.openxmlformats.org/presentationml/2006/main">
+  <p:cSld>
+    <p:spTree>
+      <p:nvGrpSpPr>
+        <p:cNvPr id="1" name=""/>
+        <p:cNvGrpSpPr/>
+        <p:nvPr/>
+      </p:nvGrpSpPr>
+      <p:grpSpPr>
+        <a:xfrm>
+          <a:off x="0" y="0"/>
+          <a:ext cx="0" cy="0"/>
+          <a:chOff x="0" y="0"/>
+          <a:chExt cx="0" cy="0"/>
+        </a:xfrm>
+      </p:grpSpPr>
+      <p:sp>
+        <p:nvSpPr>
+          <p:cNvPr id="2" name="Nadpis 1">
+            <a:extLst>
+              <a:ext uri="{FF2B5EF4-FFF2-40B4-BE49-F238E27FC236}">
+                <a16:creationId xmlns:a16="http://schemas.microsoft.com/office/drawing/2014/main" id="{6ECCA9A8-EA1D-458B-9E62-F99DC8B80BFD}"/>
+              </a:ext>
+            </a:extLst>
+          </p:cNvPr>
+          <p:cNvSpPr>
+            <a:spLocks noGrp="1"/>
+          </p:cNvSpPr>
+          <p:nvPr>
+            <p:ph type="title"/>
+          </p:nvPr>
+        </p:nvSpPr>
+        <p:spPr>
+          <a:xfrm>
+            <a:off x="1587710" y="455363"/>
+            <a:ext cx="9486690" cy="759484"/>
+          </a:xfrm>
+        </p:spPr>
+        <p:txBody>
+          <a:bodyPr>
+            <a:normAutofit fontScale="90000"/>
+          </a:bodyPr>
+          <a:lstStyle/>
+          <a:p>
+            <a:r>
+              <a:rPr lang="cs-CZ" dirty="0"/>
+              <a:t>Použitá literatura:</a:t>
+            </a:r>
+          </a:p>
+        </p:txBody>
+      </p:sp>
+      <p:sp>
+        <p:nvSpPr>
+          <p:cNvPr id="3" name="Zástupný obsah 2">
+            <a:extLst>
+              <a:ext uri="{FF2B5EF4-FFF2-40B4-BE49-F238E27FC236}">
+                <a16:creationId xmlns:a16="http://schemas.microsoft.com/office/drawing/2014/main" id="{B509AEC9-D333-412E-9D62-B635E42D3021}"/>
+              </a:ext>
+            </a:extLst>
+          </p:cNvPr>
+          <p:cNvSpPr>
+            <a:spLocks noGrp="1"/>
+          </p:cNvSpPr>
+          <p:nvPr>
+            <p:ph idx="1"/>
+          </p:nvPr>
+        </p:nvSpPr>
+        <p:spPr>
+          <a:xfrm>
+            <a:off x="1587710" y="1214847"/>
+            <a:ext cx="9486690" cy="4871321"/>
+          </a:xfrm>
+        </p:spPr>
+        <p:txBody>
+          <a:bodyPr/>
+          <a:lstStyle/>
+          <a:p>
+            <a:endParaRPr lang="cs-CZ"/>
+          </a:p>
+        </p:txBody>
+      </p:sp>
+    </p:spTree>
+    <p:extLst>
+      <p:ext uri="{BB962C8B-B14F-4D97-AF65-F5344CB8AC3E}">
+        <p14:creationId xmlns:p14="http://schemas.microsoft.com/office/powerpoint/2010/main" val="4277115754"/>
+      </p:ext>
+    </p:extLst>
+  </p:cSld>
+  <p:clrMapOvr>
+    <a:masterClrMapping/>
+  </p:clrMapOvr>
+  <mc:AlternateContent xmlns:mc="http://schemas.openxmlformats.org/markup-compatibility/2006" xmlns:p159="http://schemas.microsoft.com/office/powerpoint/2015/09/main">
+    <mc:Choice Requires="p159">
+      <p:transition xmlns:p14="http://schemas.microsoft.com/office/powerpoint/2010/main" spd="slow" p14:dur="2000">
+        <p159:morph option="byObject"/>
+      </p:transition>
+    </mc:Choice>
+    <mc:Fallback xmlns="">
+      <p:transition spd="slow">
+        <p:fade/>
+      </p:transition>
+    </mc:Fallback>
+  </mc:AlternateContent>
+</p:sld>
+</file>
+
+<file path=ppt/slides/slide23.xml><?xml version="1.0" encoding="utf-8"?>
+<p:sld xmlns:a="http://schemas.openxmlformats.org/drawingml/2006/main" xmlns:r="http://schemas.openxmlformats.org/officeDocument/2006/relationships" xmlns:p="http://schemas.openxmlformats.org/presentationml/2006/main">
+  <p:cSld>
+    <p:bg>
+      <p:bgPr>
+        <a:solidFill>
+          <a:schemeClr val="bg1"/>
+        </a:solidFill>
+        <a:effectLst/>
+      </p:bgPr>
+    </p:bg>
+    <p:spTree>
+      <p:nvGrpSpPr>
+        <p:cNvPr id="1" name=""/>
+        <p:cNvGrpSpPr/>
+        <p:nvPr/>
+      </p:nvGrpSpPr>
+      <p:grpSpPr>
+        <a:xfrm>
+          <a:off x="0" y="0"/>
+          <a:ext cx="0" cy="0"/>
+          <a:chOff x="0" y="0"/>
+          <a:chExt cx="0" cy="0"/>
+        </a:xfrm>
+      </p:grpSpPr>
+      <p:sp useBgFill="1">
+        <p:nvSpPr>
+          <p:cNvPr id="12" name="Rectangle 11">
+            <a:extLst>
+              <a:ext uri="{FF2B5EF4-FFF2-40B4-BE49-F238E27FC236}">
+                <a16:creationId xmlns:a16="http://schemas.microsoft.com/office/drawing/2014/main" id="{23BB7E73-E730-42EA-AACE-D1E323EA547E}"/>
+              </a:ext>
+              <a:ext uri="{C183D7F6-B498-43B3-948B-1728B52AA6E4}">
+                <adec:decorative xmlns:adec="http://schemas.microsoft.com/office/drawing/2017/decorative" val="1"/>
+              </a:ext>
+            </a:extLst>
+          </p:cNvPr>
+          <p:cNvSpPr>
+            <a:spLocks noGrp="1" noRot="1" noChangeAspect="1" noMove="1" noResize="1" noEditPoints="1" noAdjustHandles="1" noChangeArrowheads="1" noChangeShapeType="1" noTextEdit="1"/>
+          </p:cNvSpPr>
+          <p:nvPr>
+            <p:extLst>
+              <p:ext uri="{386F3935-93C4-4BCD-93E2-E3B085C9AB24}">
+                <p16:designElem xmlns:p16="http://schemas.microsoft.com/office/powerpoint/2015/main" val="1"/>
+              </p:ext>
+            </p:extLst>
+          </p:nvPr>
+        </p:nvSpPr>
+        <p:spPr>
+          <a:xfrm>
+            <a:off x="3048" y="0"/>
+            <a:ext cx="12188952" cy="6858000"/>
+          </a:xfrm>
+          <a:prstGeom prst="rect">
+            <a:avLst/>
+          </a:prstGeom>
+          <a:ln>
+            <a:noFill/>
+          </a:ln>
+        </p:spPr>
+        <p:style>
+          <a:lnRef idx="2">
+            <a:schemeClr val="accent1">
+              <a:shade val="50000"/>
+            </a:schemeClr>
+          </a:lnRef>
+          <a:fillRef idx="1">
+            <a:schemeClr val="accent1"/>
+          </a:fillRef>
+          <a:effectRef idx="0">
+            <a:schemeClr val="accent1"/>
+          </a:effectRef>
+          <a:fontRef idx="minor">
+            <a:schemeClr val="lt1"/>
+          </a:fontRef>
+        </p:style>
+        <p:txBody>
+          <a:bodyPr rtlCol="0" anchor="ctr"/>
+          <a:lstStyle/>
+          <a:p>
+            <a:pPr algn="ctr"/>
+            <a:endParaRPr lang="en-US"/>
+          </a:p>
+        </p:txBody>
+      </p:sp>
+      <p:sp>
+        <p:nvSpPr>
+          <p:cNvPr id="14" name="Rectangle 13">
+            <a:extLst>
+              <a:ext uri="{FF2B5EF4-FFF2-40B4-BE49-F238E27FC236}">
+                <a16:creationId xmlns:a16="http://schemas.microsoft.com/office/drawing/2014/main" id="{F1F6C2E9-B316-4410-88E5-74F044FC3575}"/>
+              </a:ext>
+              <a:ext uri="{C183D7F6-B498-43B3-948B-1728B52AA6E4}">
+                <adec:decorative xmlns:adec="http://schemas.microsoft.com/office/drawing/2017/decorative" val="1"/>
+              </a:ext>
+            </a:extLst>
+          </p:cNvPr>
+          <p:cNvSpPr>
+            <a:spLocks noGrp="1" noRot="1" noChangeAspect="1" noMove="1" noResize="1" noEditPoints="1" noAdjustHandles="1" noChangeArrowheads="1" noChangeShapeType="1" noTextEdit="1"/>
+          </p:cNvSpPr>
+          <p:nvPr>
+            <p:extLst>
+              <p:ext uri="{386F3935-93C4-4BCD-93E2-E3B085C9AB24}">
+                <p16:designElem xmlns:p16="http://schemas.microsoft.com/office/powerpoint/2015/main" val="1"/>
+              </p:ext>
+            </p:extLst>
+          </p:nvPr>
+        </p:nvSpPr>
+        <p:spPr>
+          <a:xfrm>
+            <a:off x="-1" y="565153"/>
+            <a:ext cx="5106593" cy="6292847"/>
+          </a:xfrm>
+          <a:prstGeom prst="rect">
+            <a:avLst/>
+          </a:prstGeom>
+          <a:gradFill flip="none" rotWithShape="1">
+            <a:gsLst>
+              <a:gs pos="0">
+                <a:schemeClr val="accent1">
+                  <a:alpha val="50000"/>
+                </a:schemeClr>
+              </a:gs>
+              <a:gs pos="81000">
+                <a:schemeClr val="accent4">
+                  <a:alpha val="50000"/>
+                </a:schemeClr>
+              </a:gs>
+              <a:gs pos="25000">
+                <a:schemeClr val="accent2">
+                  <a:alpha val="60000"/>
+                </a:schemeClr>
+              </a:gs>
+              <a:gs pos="50000">
+                <a:schemeClr val="accent3">
+                  <a:alpha val="55000"/>
+                </a:schemeClr>
+              </a:gs>
+              <a:gs pos="99000">
+                <a:schemeClr val="accent5">
+                  <a:alpha val="50000"/>
+                </a:schemeClr>
+              </a:gs>
+            </a:gsLst>
+            <a:path path="circle">
+              <a:fillToRect r="100000" b="100000"/>
+            </a:path>
+            <a:tileRect l="-100000" t="-100000"/>
+          </a:gradFill>
+          <a:ln>
+            <a:noFill/>
+          </a:ln>
+        </p:spPr>
+        <p:style>
+          <a:lnRef idx="2">
+            <a:schemeClr val="accent1">
+              <a:shade val="50000"/>
+            </a:schemeClr>
+          </a:lnRef>
+          <a:fillRef idx="1">
+            <a:schemeClr val="accent1"/>
+          </a:fillRef>
+          <a:effectRef idx="0">
+            <a:schemeClr val="accent1"/>
+          </a:effectRef>
+          <a:fontRef idx="minor">
+            <a:schemeClr val="lt1"/>
+          </a:fontRef>
+        </p:style>
+        <p:txBody>
+          <a:bodyPr rtlCol="0" anchor="ctr"/>
+          <a:lstStyle/>
+          <a:p>
+            <a:pPr algn="ctr"/>
+            <a:endParaRPr lang="en-US"/>
+          </a:p>
+        </p:txBody>
+      </p:sp>
+      <p:sp>
+        <p:nvSpPr>
+          <p:cNvPr id="16" name="Rectangle 15">
+            <a:extLst>
+              <a:ext uri="{FF2B5EF4-FFF2-40B4-BE49-F238E27FC236}">
+                <a16:creationId xmlns:a16="http://schemas.microsoft.com/office/drawing/2014/main" id="{83D07262-43A6-451F-9B19-77B943C6399D}"/>
+              </a:ext>
+              <a:ext uri="{C183D7F6-B498-43B3-948B-1728B52AA6E4}">
+                <adec:decorative xmlns:adec="http://schemas.microsoft.com/office/drawing/2017/decorative" val="1"/>
+              </a:ext>
+            </a:extLst>
+          </p:cNvPr>
+          <p:cNvSpPr>
+            <a:spLocks noGrp="1" noRot="1" noChangeAspect="1" noMove="1" noResize="1" noEditPoints="1" noAdjustHandles="1" noChangeArrowheads="1" noChangeShapeType="1" noTextEdit="1"/>
+          </p:cNvSpPr>
+          <p:nvPr>
+            <p:extLst>
+              <p:ext uri="{386F3935-93C4-4BCD-93E2-E3B085C9AB24}">
+                <p16:designElem xmlns:p16="http://schemas.microsoft.com/office/powerpoint/2015/main" val="1"/>
+              </p:ext>
+            </p:extLst>
+          </p:nvPr>
+        </p:nvSpPr>
+        <p:spPr>
+          <a:xfrm>
+            <a:off x="0" y="1"/>
+            <a:ext cx="4537887" cy="6857999"/>
+          </a:xfrm>
+          <a:prstGeom prst="rect">
+            <a:avLst/>
+          </a:prstGeom>
+          <a:gradFill flip="none" rotWithShape="1">
+            <a:gsLst>
+              <a:gs pos="0">
+                <a:schemeClr val="accent1">
+                  <a:alpha val="50000"/>
+                </a:schemeClr>
+              </a:gs>
+              <a:gs pos="81000">
+                <a:schemeClr val="accent4">
+                  <a:alpha val="50000"/>
+                </a:schemeClr>
+              </a:gs>
+              <a:gs pos="25000">
+                <a:schemeClr val="accent2">
+                  <a:alpha val="60000"/>
+                </a:schemeClr>
+              </a:gs>
+              <a:gs pos="49000">
+                <a:schemeClr val="accent3">
+                  <a:alpha val="55000"/>
+                </a:schemeClr>
+              </a:gs>
+              <a:gs pos="99000">
+                <a:schemeClr val="accent5">
+                  <a:alpha val="50000"/>
+                </a:schemeClr>
+              </a:gs>
+            </a:gsLst>
+            <a:path path="circle">
+              <a:fillToRect r="100000" b="100000"/>
+            </a:path>
+            <a:tileRect l="-100000" t="-100000"/>
+          </a:gradFill>
+          <a:ln>
+            <a:noFill/>
+          </a:ln>
+        </p:spPr>
+        <p:style>
+          <a:lnRef idx="2">
+            <a:schemeClr val="accent1">
+              <a:shade val="50000"/>
+            </a:schemeClr>
+          </a:lnRef>
+          <a:fillRef idx="1">
+            <a:schemeClr val="accent1"/>
+          </a:fillRef>
+          <a:effectRef idx="0">
+            <a:schemeClr val="accent1"/>
+          </a:effectRef>
+          <a:fontRef idx="minor">
+            <a:schemeClr val="lt1"/>
+          </a:fontRef>
+        </p:style>
+        <p:txBody>
+          <a:bodyPr rtlCol="0" anchor="ctr"/>
+          <a:lstStyle/>
+          <a:p>
+            <a:pPr algn="ctr"/>
+            <a:endParaRPr lang="en-US"/>
+          </a:p>
+        </p:txBody>
+      </p:sp>
+      <p:sp>
+        <p:nvSpPr>
+          <p:cNvPr id="2" name="Nadpis 1">
+            <a:extLst>
+              <a:ext uri="{FF2B5EF4-FFF2-40B4-BE49-F238E27FC236}">
+                <a16:creationId xmlns:a16="http://schemas.microsoft.com/office/drawing/2014/main" id="{C0A1A29F-E292-4DB2-878C-6ED13D841F72}"/>
+              </a:ext>
+            </a:extLst>
+          </p:cNvPr>
+          <p:cNvSpPr>
+            <a:spLocks noGrp="1"/>
+          </p:cNvSpPr>
+          <p:nvPr>
+            <p:ph type="title"/>
+          </p:nvPr>
+        </p:nvSpPr>
+        <p:spPr>
+          <a:xfrm>
+            <a:off x="5763820" y="455362"/>
+            <a:ext cx="5310579" cy="1550419"/>
+          </a:xfrm>
+        </p:spPr>
+        <p:txBody>
+          <a:bodyPr vert="horz" lIns="91440" tIns="45720" rIns="91440" bIns="45720" rtlCol="0" anchor="t">
+            <a:normAutofit/>
+          </a:bodyPr>
+          <a:lstStyle/>
+          <a:p>
+            <a:r>
+              <a:rPr lang="en-US" b="1" kern="1200">
+                <a:solidFill>
+                  <a:schemeClr val="tx1"/>
+                </a:solidFill>
+                <a:latin typeface="+mj-lt"/>
+                <a:ea typeface="+mj-ea"/>
+                <a:cs typeface="+mj-cs"/>
+              </a:rPr>
+              <a:t>Odkaz na repozitář:</a:t>
+            </a:r>
+          </a:p>
+        </p:txBody>
+      </p:sp>
+      <p:sp>
+        <p:nvSpPr>
+          <p:cNvPr id="7" name="TextovéPole 6">
+            <a:extLst>
+              <a:ext uri="{FF2B5EF4-FFF2-40B4-BE49-F238E27FC236}">
+                <a16:creationId xmlns:a16="http://schemas.microsoft.com/office/drawing/2014/main" id="{94CA30AF-5FEE-4A93-9478-DC89410D449F}"/>
+              </a:ext>
+            </a:extLst>
+          </p:cNvPr>
+          <p:cNvSpPr txBox="1"/>
+          <p:nvPr/>
+        </p:nvSpPr>
+        <p:spPr>
+          <a:xfrm>
+            <a:off x="5763820" y="2160016"/>
+            <a:ext cx="5310579" cy="3926152"/>
+          </a:xfrm>
+          <a:prstGeom prst="rect">
+            <a:avLst/>
+          </a:prstGeom>
+        </p:spPr>
+        <p:txBody>
+          <a:bodyPr vert="horz" lIns="91440" tIns="45720" rIns="91440" bIns="45720" rtlCol="0">
+            <a:normAutofit/>
+          </a:bodyPr>
+          <a:lstStyle/>
+          <a:p>
+            <a:pPr indent="-228600">
+              <a:lnSpc>
+                <a:spcPct val="110000"/>
+              </a:lnSpc>
+              <a:spcAft>
+                <a:spcPts val="600"/>
+              </a:spcAft>
+              <a:buClr>
+                <a:schemeClr val="accent1"/>
+              </a:buClr>
+              <a:buFont typeface="Arial" panose="020B0604020202020204" pitchFamily="34" charset="0"/>
+              <a:buChar char="•"/>
+            </a:pPr>
+            <a:r>
+              <a:rPr lang="en-US">
+                <a:hlinkClick r:id="rId2"/>
+              </a:rPr>
+              <a:t>RadRoz12/Linux (github.com)</a:t>
+            </a:r>
+            <a:endParaRPr lang="en-US"/>
+          </a:p>
+        </p:txBody>
+      </p:sp>
+      <p:pic>
+        <p:nvPicPr>
+          <p:cNvPr id="5" name="Zástupný obsah 4" descr="USB">
+            <a:hlinkClick r:id="rId3"/>
+            <a:extLst>
+              <a:ext uri="{FF2B5EF4-FFF2-40B4-BE49-F238E27FC236}">
+                <a16:creationId xmlns:a16="http://schemas.microsoft.com/office/drawing/2014/main" id="{D123F897-DFF7-4AE3-B618-23A620D63994}"/>
+              </a:ext>
+            </a:extLst>
+          </p:cNvPr>
+          <p:cNvPicPr>
+            <a:picLocks noGrp="1" noChangeAspect="1"/>
+          </p:cNvPicPr>
+          <p:nvPr>
+            <p:ph idx="1"/>
+          </p:nvPr>
+        </p:nvPicPr>
+        <p:blipFill>
+          <a:blip r:embed="rId4">
+            <a:extLst>
+              <a:ext uri="{28A0092B-C50C-407E-A947-70E740481C1C}">
+                <a14:useLocalDpi xmlns:a14="http://schemas.microsoft.com/office/drawing/2010/main" val="0"/>
+              </a:ext>
+              <a:ext uri="{96DAC541-7B7A-43D3-8B79-37D633B846F1}">
+                <asvg:svgBlip xmlns:asvg="http://schemas.microsoft.com/office/drawing/2016/SVG/main" r:embed="rId5"/>
+              </a:ext>
+            </a:extLst>
+          </a:blip>
+          <a:stretch>
+            <a:fillRect/>
+          </a:stretch>
+        </p:blipFill>
+        <p:spPr>
+          <a:xfrm>
+            <a:off x="660276" y="2058268"/>
+            <a:ext cx="3217333" cy="3217333"/>
+          </a:xfrm>
+          <a:prstGeom prst="rect">
+            <a:avLst/>
+          </a:prstGeom>
+        </p:spPr>
+      </p:pic>
+    </p:spTree>
+    <p:extLst>
+      <p:ext uri="{BB962C8B-B14F-4D97-AF65-F5344CB8AC3E}">
+        <p14:creationId xmlns:p14="http://schemas.microsoft.com/office/powerpoint/2010/main" val="1109442526"/>
+      </p:ext>
+    </p:extLst>
+  </p:cSld>
+  <p:clrMapOvr>
+    <a:masterClrMapping/>
+  </p:clrMapOvr>
+  <mc:AlternateContent xmlns:mc="http://schemas.openxmlformats.org/markup-compatibility/2006" xmlns:p159="http://schemas.microsoft.com/office/powerpoint/2015/09/main">
+    <mc:Choice Requires="p159">
+      <p:transition xmlns:p14="http://schemas.microsoft.com/office/powerpoint/2010/main" spd="slow" p14:dur="2000">
+        <p159:morph option="byObject"/>
+      </p:transition>
+    </mc:Choice>
+    <mc:Fallback xmlns="">
+      <p:transition spd="slow">
+        <p:fade/>
+      </p:transition>
+    </mc:Fallback>
+  </mc:AlternateContent>
+</p:sld>
+</file>
+
 <file path=ppt/slides/slide3.xml><?xml version="1.0" encoding="utf-8"?>
 <p:sld xmlns:a="http://schemas.openxmlformats.org/drawingml/2006/main" xmlns:r="http://schemas.openxmlformats.org/officeDocument/2006/relationships" xmlns:p="http://schemas.openxmlformats.org/presentationml/2006/main">
   <p:cSld>
@@ -20049,13 +23513,13 @@
   <p:clrMapOvr>
     <a:masterClrMapping/>
   </p:clrMapOvr>
-  <mc:AlternateContent xmlns:mc="http://schemas.openxmlformats.org/markup-compatibility/2006">
-    <mc:Choice xmlns:p159="http://schemas.microsoft.com/office/powerpoint/2015/09/main" Requires="p159">
+  <mc:AlternateContent xmlns:mc="http://schemas.openxmlformats.org/markup-compatibility/2006" xmlns:p159="http://schemas.microsoft.com/office/powerpoint/2015/09/main">
+    <mc:Choice Requires="p159">
       <p:transition xmlns:p14="http://schemas.microsoft.com/office/powerpoint/2010/main" spd="slow" p14:dur="2000">
         <p159:morph option="byObject"/>
       </p:transition>
     </mc:Choice>
-    <mc:Fallback>
+    <mc:Fallback xmlns="">
       <p:transition spd="slow">
         <p:fade/>
       </p:transition>
@@ -21295,13 +24759,13 @@
   <p:clrMapOvr>
     <a:masterClrMapping/>
   </p:clrMapOvr>
-  <mc:AlternateContent xmlns:mc="http://schemas.openxmlformats.org/markup-compatibility/2006">
-    <mc:Choice xmlns:p159="http://schemas.microsoft.com/office/powerpoint/2015/09/main" Requires="p159">
+  <mc:AlternateContent xmlns:mc="http://schemas.openxmlformats.org/markup-compatibility/2006" xmlns:p159="http://schemas.microsoft.com/office/powerpoint/2015/09/main">
+    <mc:Choice Requires="p159">
       <p:transition xmlns:p14="http://schemas.microsoft.com/office/powerpoint/2010/main" spd="slow" p14:dur="2000">
         <p159:morph option="byObject"/>
       </p:transition>
     </mc:Choice>
-    <mc:Fallback>
+    <mc:Fallback xmlns="">
       <p:transition spd="slow">
         <p:fade/>
       </p:transition>
@@ -21767,13 +25231,13 @@
   <p:clrMapOvr>
     <a:masterClrMapping/>
   </p:clrMapOvr>
-  <mc:AlternateContent xmlns:mc="http://schemas.openxmlformats.org/markup-compatibility/2006">
-    <mc:Choice xmlns:p159="http://schemas.microsoft.com/office/powerpoint/2015/09/main" Requires="p159">
+  <mc:AlternateContent xmlns:mc="http://schemas.openxmlformats.org/markup-compatibility/2006" xmlns:p159="http://schemas.microsoft.com/office/powerpoint/2015/09/main">
+    <mc:Choice Requires="p159">
       <p:transition xmlns:p14="http://schemas.microsoft.com/office/powerpoint/2010/main" spd="slow" p14:dur="2000">
         <p159:morph option="byObject"/>
       </p:transition>
     </mc:Choice>
-    <mc:Fallback>
+    <mc:Fallback xmlns="">
       <p:transition spd="slow">
         <p:fade/>
       </p:transition>
@@ -23167,13 +26631,13 @@
   <p:clrMapOvr>
     <a:masterClrMapping/>
   </p:clrMapOvr>
-  <mc:AlternateContent xmlns:mc="http://schemas.openxmlformats.org/markup-compatibility/2006">
-    <mc:Choice xmlns:p159="http://schemas.microsoft.com/office/powerpoint/2015/09/main" Requires="p159">
+  <mc:AlternateContent xmlns:mc="http://schemas.openxmlformats.org/markup-compatibility/2006" xmlns:p159="http://schemas.microsoft.com/office/powerpoint/2015/09/main">
+    <mc:Choice Requires="p159">
       <p:transition xmlns:p14="http://schemas.microsoft.com/office/powerpoint/2010/main" spd="slow" p14:dur="2000">
         <p159:morph option="byObject"/>
       </p:transition>
     </mc:Choice>
-    <mc:Fallback>
+    <mc:Fallback xmlns="">
       <p:transition spd="slow">
         <p:fade/>
       </p:transition>
@@ -24301,13 +27765,13 @@
   <p:clrMapOvr>
     <a:masterClrMapping/>
   </p:clrMapOvr>
-  <mc:AlternateContent xmlns:mc="http://schemas.openxmlformats.org/markup-compatibility/2006">
-    <mc:Choice xmlns:p159="http://schemas.microsoft.com/office/powerpoint/2015/09/main" Requires="p159">
+  <mc:AlternateContent xmlns:mc="http://schemas.openxmlformats.org/markup-compatibility/2006" xmlns:p159="http://schemas.microsoft.com/office/powerpoint/2015/09/main">
+    <mc:Choice Requires="p159">
       <p:transition xmlns:p14="http://schemas.microsoft.com/office/powerpoint/2010/main" spd="slow" p14:dur="2000">
         <p159:morph option="byObject"/>
       </p:transition>
     </mc:Choice>
-    <mc:Fallback>
+    <mc:Fallback xmlns="">
       <p:transition spd="slow">
         <p:fade/>
       </p:transition>
@@ -24578,13 +28042,13 @@
   <p:clrMapOvr>
     <a:masterClrMapping/>
   </p:clrMapOvr>
-  <mc:AlternateContent xmlns:mc="http://schemas.openxmlformats.org/markup-compatibility/2006">
-    <mc:Choice xmlns:p159="http://schemas.microsoft.com/office/powerpoint/2015/09/main" Requires="p159">
+  <mc:AlternateContent xmlns:mc="http://schemas.openxmlformats.org/markup-compatibility/2006" xmlns:p159="http://schemas.microsoft.com/office/powerpoint/2015/09/main">
+    <mc:Choice Requires="p159">
       <p:transition xmlns:p14="http://schemas.microsoft.com/office/powerpoint/2010/main" spd="slow" p14:dur="2000">
         <p159:morph option="byObject"/>
       </p:transition>
     </mc:Choice>
-    <mc:Fallback>
+    <mc:Fallback xmlns="">
       <p:transition spd="slow">
         <p:fade/>
       </p:transition>
@@ -28769,13 +32233,13 @@
   <p:clrMapOvr>
     <a:masterClrMapping/>
   </p:clrMapOvr>
-  <mc:AlternateContent xmlns:mc="http://schemas.openxmlformats.org/markup-compatibility/2006">
-    <mc:Choice xmlns:p159="http://schemas.microsoft.com/office/powerpoint/2015/09/main" Requires="p159">
+  <mc:AlternateContent xmlns:mc="http://schemas.openxmlformats.org/markup-compatibility/2006" xmlns:p159="http://schemas.microsoft.com/office/powerpoint/2015/09/main">
+    <mc:Choice Requires="p159">
       <p:transition xmlns:p14="http://schemas.microsoft.com/office/powerpoint/2010/main" spd="slow" p14:dur="2000">
         <p159:morph option="byObject"/>
       </p:transition>
     </mc:Choice>
-    <mc:Fallback>
+    <mc:Fallback xmlns="">
       <p:transition spd="slow">
         <p:fade/>
       </p:transition>

</xml_diff>

<commit_message>
Přidáno pár ikon, TID
</commit_message>
<xml_diff>
--- a/Linux.pptx
+++ b/Linux.pptx
@@ -5,7 +5,7 @@
     <p:sldMasterId id="2147483673" r:id="rId1"/>
   </p:sldMasterIdLst>
   <p:notesMasterIdLst>
-    <p:notesMasterId r:id="rId25"/>
+    <p:notesMasterId r:id="rId27"/>
   </p:notesMasterIdLst>
   <p:sldIdLst>
     <p:sldId id="256" r:id="rId2"/>
@@ -18,8 +18,8 @@
     <p:sldId id="261" r:id="rId9"/>
     <p:sldId id="262" r:id="rId10"/>
     <p:sldId id="267" r:id="rId11"/>
-    <p:sldId id="263" r:id="rId12"/>
-    <p:sldId id="264" r:id="rId13"/>
+    <p:sldId id="264" r:id="rId12"/>
+    <p:sldId id="263" r:id="rId13"/>
     <p:sldId id="265" r:id="rId14"/>
     <p:sldId id="266" r:id="rId15"/>
     <p:sldId id="269" r:id="rId16"/>
@@ -29,8 +29,10 @@
     <p:sldId id="277" r:id="rId20"/>
     <p:sldId id="273" r:id="rId21"/>
     <p:sldId id="278" r:id="rId22"/>
-    <p:sldId id="275" r:id="rId23"/>
-    <p:sldId id="274" r:id="rId24"/>
+    <p:sldId id="279" r:id="rId23"/>
+    <p:sldId id="280" r:id="rId24"/>
+    <p:sldId id="275" r:id="rId25"/>
+    <p:sldId id="274" r:id="rId26"/>
   </p:sldIdLst>
   <p:sldSz cx="12192000" cy="6858000"/>
   <p:notesSz cx="6858000" cy="9144000"/>
@@ -8448,7 +8450,7 @@
       </p:grpSpPr>
       <p:sp>
         <p:nvSpPr>
-          <p:cNvPr id="2" name="Zástupný symbol pro obrázek snímku 1"/>
+          <p:cNvPr id="2" name="Slide Image Placeholder 1"/>
           <p:cNvSpPr>
             <a:spLocks noGrp="1" noRot="1" noChangeAspect="1"/>
           </p:cNvSpPr>
@@ -8460,7 +8462,7 @@
       </p:sp>
       <p:sp>
         <p:nvSpPr>
-          <p:cNvPr id="3" name="Zástupný symbol pro poznámky 2"/>
+          <p:cNvPr id="3" name="Notes Placeholder 2"/>
           <p:cNvSpPr>
             <a:spLocks noGrp="1"/>
           </p:cNvSpPr>
@@ -8473,16 +8475,13 @@
           <a:bodyPr/>
           <a:lstStyle/>
           <a:p>
-            <a:r>
-              <a:rPr lang="cs-CZ" dirty="0"/>
-              <a:t>Tím, že skrývá soubory, je hodně bezpečný, protože v případě útoku malwarem jsou soubory izolovány a není možné k nim přistoupit</a:t>
-            </a:r>
+            <a:endParaRPr lang="cs-CZ" dirty="0"/>
           </a:p>
         </p:txBody>
       </p:sp>
       <p:sp>
         <p:nvSpPr>
-          <p:cNvPr id="4" name="Zástupný symbol pro číslo snímku 3"/>
+          <p:cNvPr id="4" name="Slide Number Placeholder 3"/>
           <p:cNvSpPr>
             <a:spLocks noGrp="1"/>
           </p:cNvSpPr>
@@ -8497,7 +8496,7 @@
           <a:p>
             <a:fld id="{D252E0EA-6D0E-4413-B5B0-00C1F5DDE783}" type="slidenum">
               <a:rPr lang="cs-CZ" smtClean="0"/>
-              <a:t>16</a:t>
+              <a:t>15</a:t>
             </a:fld>
             <a:endParaRPr lang="cs-CZ"/>
           </a:p>
@@ -8506,7 +8505,7 @@
     </p:spTree>
     <p:extLst>
       <p:ext uri="{BB962C8B-B14F-4D97-AF65-F5344CB8AC3E}">
-        <p14:creationId xmlns:p14="http://schemas.microsoft.com/office/powerpoint/2010/main" val="1560081789"/>
+        <p14:creationId xmlns:p14="http://schemas.microsoft.com/office/powerpoint/2010/main" val="1308254504"/>
       </p:ext>
     </p:extLst>
   </p:cSld>
@@ -8562,7 +8561,7 @@
           <a:p>
             <a:r>
               <a:rPr lang="cs-CZ" dirty="0"/>
-              <a:t>Přestože se jedná o stejný operační systém, každé grafické prostředí nabízí jiné funkce.</a:t>
+              <a:t>Tím, že skrývá soubory, je hodně bezpečný, protože v případě útoku malwarem jsou soubory izolovány a není možné k nim přistoupit</a:t>
             </a:r>
           </a:p>
         </p:txBody>
@@ -8584,6 +8583,93 @@
           <a:p>
             <a:fld id="{D252E0EA-6D0E-4413-B5B0-00C1F5DDE783}" type="slidenum">
               <a:rPr lang="cs-CZ" smtClean="0"/>
+              <a:t>16</a:t>
+            </a:fld>
+            <a:endParaRPr lang="cs-CZ"/>
+          </a:p>
+        </p:txBody>
+      </p:sp>
+    </p:spTree>
+    <p:extLst>
+      <p:ext uri="{BB962C8B-B14F-4D97-AF65-F5344CB8AC3E}">
+        <p14:creationId xmlns:p14="http://schemas.microsoft.com/office/powerpoint/2010/main" val="1560081789"/>
+      </p:ext>
+    </p:extLst>
+  </p:cSld>
+  <p:clrMapOvr>
+    <a:masterClrMapping/>
+  </p:clrMapOvr>
+</p:notes>
+</file>
+
+<file path=ppt/notesSlides/notesSlide12.xml><?xml version="1.0" encoding="utf-8"?>
+<p:notes xmlns:a="http://schemas.openxmlformats.org/drawingml/2006/main" xmlns:r="http://schemas.openxmlformats.org/officeDocument/2006/relationships" xmlns:p="http://schemas.openxmlformats.org/presentationml/2006/main">
+  <p:cSld>
+    <p:spTree>
+      <p:nvGrpSpPr>
+        <p:cNvPr id="1" name=""/>
+        <p:cNvGrpSpPr/>
+        <p:nvPr/>
+      </p:nvGrpSpPr>
+      <p:grpSpPr>
+        <a:xfrm>
+          <a:off x="0" y="0"/>
+          <a:ext cx="0" cy="0"/>
+          <a:chOff x="0" y="0"/>
+          <a:chExt cx="0" cy="0"/>
+        </a:xfrm>
+      </p:grpSpPr>
+      <p:sp>
+        <p:nvSpPr>
+          <p:cNvPr id="2" name="Zástupný symbol pro obrázek snímku 1"/>
+          <p:cNvSpPr>
+            <a:spLocks noGrp="1" noRot="1" noChangeAspect="1"/>
+          </p:cNvSpPr>
+          <p:nvPr>
+            <p:ph type="sldImg"/>
+          </p:nvPr>
+        </p:nvSpPr>
+        <p:spPr/>
+      </p:sp>
+      <p:sp>
+        <p:nvSpPr>
+          <p:cNvPr id="3" name="Zástupný symbol pro poznámky 2"/>
+          <p:cNvSpPr>
+            <a:spLocks noGrp="1"/>
+          </p:cNvSpPr>
+          <p:nvPr>
+            <p:ph type="body" idx="1"/>
+          </p:nvPr>
+        </p:nvSpPr>
+        <p:spPr/>
+        <p:txBody>
+          <a:bodyPr/>
+          <a:lstStyle/>
+          <a:p>
+            <a:r>
+              <a:rPr lang="cs-CZ" dirty="0"/>
+              <a:t>Přestože se jedná o stejný operační systém, každé grafické prostředí nabízí jiné funkce.</a:t>
+            </a:r>
+          </a:p>
+        </p:txBody>
+      </p:sp>
+      <p:sp>
+        <p:nvSpPr>
+          <p:cNvPr id="4" name="Zástupný symbol pro číslo snímku 3"/>
+          <p:cNvSpPr>
+            <a:spLocks noGrp="1"/>
+          </p:cNvSpPr>
+          <p:nvPr>
+            <p:ph type="sldNum" sz="quarter" idx="5"/>
+          </p:nvPr>
+        </p:nvSpPr>
+        <p:spPr/>
+        <p:txBody>
+          <a:bodyPr/>
+          <a:lstStyle/>
+          <a:p>
+            <a:fld id="{D252E0EA-6D0E-4413-B5B0-00C1F5DDE783}" type="slidenum">
+              <a:rPr lang="cs-CZ" smtClean="0"/>
               <a:t>19</a:t>
             </a:fld>
             <a:endParaRPr lang="cs-CZ"/>
@@ -8603,7 +8689,7 @@
 </p:notes>
 </file>
 
-<file path=ppt/notesSlides/notesSlide12.xml><?xml version="1.0" encoding="utf-8"?>
+<file path=ppt/notesSlides/notesSlide13.xml><?xml version="1.0" encoding="utf-8"?>
 <p:notes xmlns:a="http://schemas.openxmlformats.org/drawingml/2006/main" xmlns:r="http://schemas.openxmlformats.org/officeDocument/2006/relationships" xmlns:p="http://schemas.openxmlformats.org/presentationml/2006/main">
   <p:cSld>
     <p:spTree>
@@ -8927,15 +9013,13 @@
           <a:p>
             <a:r>
               <a:rPr lang="cs-CZ" dirty="0"/>
-              <a:t>Podle serveru webtribunal.org používá </a:t>
+              <a:t>Podle serveru webtribunal.org používá Linux asi 96,6 procent z milionu serverů na světě</a:t>
             </a:r>
-            <a:r>
-              <a:rPr lang="cs-CZ" dirty="0" err="1"/>
-              <a:t>linux</a:t>
-            </a:r>
+          </a:p>
+          <a:p>
             <a:r>
               <a:rPr lang="cs-CZ" dirty="0"/>
-              <a:t> asi 96,6 procent z milionu serverů na světě</a:t>
+              <a:t>Škálovatelnost – schopnost pracovat s daty s náhlou změnou</a:t>
             </a:r>
           </a:p>
         </p:txBody>
@@ -9234,7 +9318,7 @@
           <a:p>
             <a:fld id="{D252E0EA-6D0E-4413-B5B0-00C1F5DDE783}" type="slidenum">
               <a:rPr lang="cs-CZ" smtClean="0"/>
-              <a:t>12</a:t>
+              <a:t>11</a:t>
             </a:fld>
             <a:endParaRPr lang="cs-CZ"/>
           </a:p>
@@ -9277,19 +9361,19 @@
             <a:spLocks noGrp="1" noRot="1" noChangeAspect="1"/>
           </p:cNvSpPr>
           <p:nvPr>
-            <p:ph type="sldImg"/>
+            <p:ph type="sldImg" idx="2"/>
           </p:nvPr>
         </p:nvSpPr>
         <p:spPr/>
       </p:sp>
       <p:sp>
         <p:nvSpPr>
-          <p:cNvPr id="3" name="Notes Placeholder 2"/>
+          <p:cNvPr id="3" name="Text Placeholder 2"/>
           <p:cNvSpPr>
             <a:spLocks noGrp="1"/>
           </p:cNvSpPr>
           <p:nvPr>
-            <p:ph type="body" idx="1"/>
+            <p:ph type="body" idx="3"/>
           </p:nvPr>
         </p:nvSpPr>
         <p:spPr/>
@@ -9298,57 +9382,31 @@
           <a:lstStyle/>
           <a:p>
             <a:r>
-              <a:rPr lang="cs-CZ" dirty="0"/>
-              <a:t>O </a:t>
+              <a:rPr lang="en-US"/>
+              <a:t>Pro torrenty se to hodí zvláště pro lidi, kteří nechtějí mít počítač zapnutý 24/7</a:t>
             </a:r>
+          </a:p>
+          <a:p>
+            <a:endParaRPr lang="en-US"/>
+          </a:p>
+          <a:p>
             <a:r>
-              <a:rPr lang="cs-CZ" dirty="0" err="1"/>
-              <a:t>Kali</a:t>
+              <a:rPr lang="en-US"/>
+              <a:t>Jen tak pro zajímavost, zašel jsem na stránku a už nefunguje</a:t>
             </a:r>
+          </a:p>
+          <a:p>
+            <a:endParaRPr lang="en-US"/>
+          </a:p>
+          <a:p>
             <a:r>
-              <a:rPr lang="cs-CZ" dirty="0"/>
-              <a:t> Linuxu a možná i </a:t>
+              <a:rPr lang="en-US"/>
+              <a:t>A konec podpory MCE byla oznámena v květnu 2015 před vydáním Windows 10</a:t>
             </a:r>
-            <a:r>
-              <a:rPr lang="cs-CZ" dirty="0" err="1"/>
-              <a:t>BlackTracku</a:t>
-            </a:r>
-            <a:r>
-              <a:rPr lang="cs-CZ" dirty="0"/>
-              <a:t> něco později.</a:t>
-            </a:r>
-          </a:p>
-        </p:txBody>
-      </p:sp>
-      <p:sp>
-        <p:nvSpPr>
-          <p:cNvPr id="4" name="Slide Number Placeholder 3"/>
-          <p:cNvSpPr>
-            <a:spLocks noGrp="1"/>
-          </p:cNvSpPr>
-          <p:nvPr>
-            <p:ph type="sldNum" sz="quarter" idx="5"/>
-          </p:nvPr>
-        </p:nvSpPr>
-        <p:spPr/>
-        <p:txBody>
-          <a:bodyPr/>
-          <a:lstStyle/>
-          <a:p>
-            <a:fld id="{D252E0EA-6D0E-4413-B5B0-00C1F5DDE783}" type="slidenum">
-              <a:rPr lang="cs-CZ" smtClean="0"/>
-              <a:t>13</a:t>
-            </a:fld>
-            <a:endParaRPr lang="cs-CZ"/>
           </a:p>
         </p:txBody>
       </p:sp>
     </p:spTree>
-    <p:extLst>
-      <p:ext uri="{BB962C8B-B14F-4D97-AF65-F5344CB8AC3E}">
-        <p14:creationId xmlns:p14="http://schemas.microsoft.com/office/powerpoint/2010/main" val="2780433366"/>
-      </p:ext>
-    </p:extLst>
   </p:cSld>
   <p:clrMapOvr>
     <a:masterClrMapping/>
@@ -9400,7 +9458,26 @@
           <a:bodyPr/>
           <a:lstStyle/>
           <a:p>
-            <a:endParaRPr lang="cs-CZ" dirty="0"/>
+            <a:r>
+              <a:rPr lang="cs-CZ" dirty="0"/>
+              <a:t>O </a:t>
+            </a:r>
+            <a:r>
+              <a:rPr lang="cs-CZ" dirty="0" err="1"/>
+              <a:t>Kali</a:t>
+            </a:r>
+            <a:r>
+              <a:rPr lang="cs-CZ" dirty="0"/>
+              <a:t> Linuxu a možná i </a:t>
+            </a:r>
+            <a:r>
+              <a:rPr lang="cs-CZ" dirty="0" err="1"/>
+              <a:t>BlackTracku</a:t>
+            </a:r>
+            <a:r>
+              <a:rPr lang="cs-CZ" dirty="0"/>
+              <a:t> něco později.</a:t>
+            </a:r>
           </a:p>
         </p:txBody>
       </p:sp>
@@ -9421,7 +9498,7 @@
           <a:p>
             <a:fld id="{D252E0EA-6D0E-4413-B5B0-00C1F5DDE783}" type="slidenum">
               <a:rPr lang="cs-CZ" smtClean="0"/>
-              <a:t>15</a:t>
+              <a:t>13</a:t>
             </a:fld>
             <a:endParaRPr lang="cs-CZ"/>
           </a:p>
@@ -9430,7 +9507,7 @@
     </p:spTree>
     <p:extLst>
       <p:ext uri="{BB962C8B-B14F-4D97-AF65-F5344CB8AC3E}">
-        <p14:creationId xmlns:p14="http://schemas.microsoft.com/office/powerpoint/2010/main" val="1308254504"/>
+        <p14:creationId xmlns:p14="http://schemas.microsoft.com/office/powerpoint/2010/main" val="2780433366"/>
       </p:ext>
     </p:extLst>
   </p:cSld>
@@ -16279,233 +16356,6 @@
       </p:grpSpPr>
       <p:sp>
         <p:nvSpPr>
-          <p:cNvPr id="3" name="Content Placeholder 2">
-            <a:extLst>
-              <a:ext uri="{FF2B5EF4-FFF2-40B4-BE49-F238E27FC236}">
-                <a16:creationId xmlns:a16="http://schemas.microsoft.com/office/drawing/2014/main" id="{59FED67B-14E0-B844-C9B4-2A0FE5A90941}"/>
-              </a:ext>
-            </a:extLst>
-          </p:cNvPr>
-          <p:cNvSpPr>
-            <a:spLocks noGrp="1"/>
-          </p:cNvSpPr>
-          <p:nvPr>
-            <p:ph idx="1"/>
-          </p:nvPr>
-        </p:nvSpPr>
-        <p:spPr>
-          <a:xfrm>
-            <a:off x="1559135" y="1495424"/>
-            <a:ext cx="9486690" cy="3896651"/>
-          </a:xfrm>
-        </p:spPr>
-        <p:txBody>
-          <a:bodyPr/>
-          <a:lstStyle/>
-          <a:p>
-            <a:endParaRPr lang="cs-CZ" dirty="0"/>
-          </a:p>
-        </p:txBody>
-      </p:sp>
-      <p:sp>
-        <p:nvSpPr>
-          <p:cNvPr id="4" name="TextBox 3">
-            <a:extLst>
-              <a:ext uri="{FF2B5EF4-FFF2-40B4-BE49-F238E27FC236}">
-                <a16:creationId xmlns:a16="http://schemas.microsoft.com/office/drawing/2014/main" id="{6433F5EB-7D82-82DE-237F-8E83708D4EBC}"/>
-              </a:ext>
-            </a:extLst>
-          </p:cNvPr>
-          <p:cNvSpPr txBox="1"/>
-          <p:nvPr/>
-        </p:nvSpPr>
-        <p:spPr>
-          <a:xfrm>
-            <a:off x="1559135" y="723900"/>
-            <a:ext cx="6924675" cy="461665"/>
-          </a:xfrm>
-          <a:prstGeom prst="rect">
-            <a:avLst/>
-          </a:prstGeom>
-          <a:noFill/>
-        </p:spPr>
-        <p:txBody>
-          <a:bodyPr wrap="square" rtlCol="0">
-            <a:spAutoFit/>
-          </a:bodyPr>
-          <a:lstStyle/>
-          <a:p>
-            <a:r>
-              <a:rPr lang="cs-CZ" sz="2400" b="1" dirty="0" err="1"/>
-              <a:t>Backup</a:t>
-            </a:r>
-            <a:r>
-              <a:rPr lang="cs-CZ" sz="2400" b="1" dirty="0"/>
-              <a:t> a </a:t>
-            </a:r>
-            <a:r>
-              <a:rPr lang="cs-CZ" sz="2400" b="1" dirty="0" err="1"/>
-              <a:t>torrenty</a:t>
-            </a:r>
-            <a:r>
-              <a:rPr lang="cs-CZ" sz="2400" b="1" dirty="0"/>
-              <a:t>:</a:t>
-            </a:r>
-          </a:p>
-        </p:txBody>
-      </p:sp>
-      <p:sp>
-        <p:nvSpPr>
-          <p:cNvPr id="2" name="Action Button: Go Home 1">
-            <a:hlinkClick r:id="rId2" action="ppaction://hlinksldjump" highlightClick="1"/>
-            <a:extLst>
-              <a:ext uri="{FF2B5EF4-FFF2-40B4-BE49-F238E27FC236}">
-                <a16:creationId xmlns:a16="http://schemas.microsoft.com/office/drawing/2014/main" id="{F4E9AD20-D8A4-B861-CF75-8A4D23115672}"/>
-              </a:ext>
-            </a:extLst>
-          </p:cNvPr>
-          <p:cNvSpPr/>
-          <p:nvPr/>
-        </p:nvSpPr>
-        <p:spPr>
-          <a:xfrm>
-            <a:off x="360000" y="6408000"/>
-            <a:ext cx="360000" cy="360000"/>
-          </a:xfrm>
-          <a:prstGeom prst="actionButtonHome">
-            <a:avLst/>
-          </a:prstGeom>
-          <a:solidFill>
-            <a:schemeClr val="bg1"/>
-          </a:solidFill>
-          <a:ln>
-            <a:solidFill>
-              <a:schemeClr val="tx1"/>
-            </a:solidFill>
-          </a:ln>
-        </p:spPr>
-        <p:style>
-          <a:lnRef idx="2">
-            <a:schemeClr val="dk1"/>
-          </a:lnRef>
-          <a:fillRef idx="1">
-            <a:schemeClr val="lt1"/>
-          </a:fillRef>
-          <a:effectRef idx="0">
-            <a:schemeClr val="dk1"/>
-          </a:effectRef>
-          <a:fontRef idx="minor">
-            <a:schemeClr val="dk1"/>
-          </a:fontRef>
-        </p:style>
-        <p:txBody>
-          <a:bodyPr rtlCol="0" anchor="ctr"/>
-          <a:lstStyle/>
-          <a:p>
-            <a:pPr algn="ctr"/>
-            <a:endParaRPr lang="cs-CZ"/>
-          </a:p>
-        </p:txBody>
-      </p:sp>
-      <p:sp>
-        <p:nvSpPr>
-          <p:cNvPr id="5" name="Action Button: Go Forward or Next 4">
-            <a:hlinkClick r:id="" action="ppaction://hlinkshowjump?jump=nextslide" highlightClick="1"/>
-            <a:extLst>
-              <a:ext uri="{FF2B5EF4-FFF2-40B4-BE49-F238E27FC236}">
-                <a16:creationId xmlns:a16="http://schemas.microsoft.com/office/drawing/2014/main" id="{FEEE7EF7-39B5-7293-E195-696F1F124849}"/>
-              </a:ext>
-            </a:extLst>
-          </p:cNvPr>
-          <p:cNvSpPr/>
-          <p:nvPr/>
-        </p:nvSpPr>
-        <p:spPr>
-          <a:xfrm>
-            <a:off x="720000" y="6408000"/>
-            <a:ext cx="360000" cy="360000"/>
-          </a:xfrm>
-          <a:prstGeom prst="actionButtonForwardNext">
-            <a:avLst/>
-          </a:prstGeom>
-          <a:solidFill>
-            <a:schemeClr val="bg1"/>
-          </a:solidFill>
-          <a:ln>
-            <a:solidFill>
-              <a:schemeClr val="tx1"/>
-            </a:solidFill>
-          </a:ln>
-        </p:spPr>
-        <p:style>
-          <a:lnRef idx="2">
-            <a:schemeClr val="accent1">
-              <a:shade val="50000"/>
-            </a:schemeClr>
-          </a:lnRef>
-          <a:fillRef idx="1">
-            <a:schemeClr val="accent1"/>
-          </a:fillRef>
-          <a:effectRef idx="0">
-            <a:schemeClr val="accent1"/>
-          </a:effectRef>
-          <a:fontRef idx="minor">
-            <a:schemeClr val="lt1"/>
-          </a:fontRef>
-        </p:style>
-        <p:txBody>
-          <a:bodyPr rtlCol="0" anchor="ctr"/>
-          <a:lstStyle/>
-          <a:p>
-            <a:pPr algn="ctr"/>
-            <a:endParaRPr lang="cs-CZ"/>
-          </a:p>
-        </p:txBody>
-      </p:sp>
-    </p:spTree>
-    <p:extLst>
-      <p:ext uri="{BB962C8B-B14F-4D97-AF65-F5344CB8AC3E}">
-        <p14:creationId xmlns:p14="http://schemas.microsoft.com/office/powerpoint/2010/main" val="3555367997"/>
-      </p:ext>
-    </p:extLst>
-  </p:cSld>
-  <p:clrMapOvr>
-    <a:masterClrMapping/>
-  </p:clrMapOvr>
-  <mc:AlternateContent xmlns:mc="http://schemas.openxmlformats.org/markup-compatibility/2006" xmlns:p159="http://schemas.microsoft.com/office/powerpoint/2015/09/main">
-    <mc:Choice Requires="p159">
-      <p:transition xmlns:p14="http://schemas.microsoft.com/office/powerpoint/2010/main" spd="slow" p14:dur="2000">
-        <p159:morph option="byObject"/>
-      </p:transition>
-    </mc:Choice>
-    <mc:Fallback xmlns="">
-      <p:transition spd="slow">
-        <p:fade/>
-      </p:transition>
-    </mc:Fallback>
-  </mc:AlternateContent>
-</p:sld>
-</file>
-
-<file path=ppt/slides/slide12.xml><?xml version="1.0" encoding="utf-8"?>
-<p:sld xmlns:a="http://schemas.openxmlformats.org/drawingml/2006/main" xmlns:r="http://schemas.openxmlformats.org/officeDocument/2006/relationships" xmlns:p="http://schemas.openxmlformats.org/presentationml/2006/main">
-  <p:cSld>
-    <p:spTree>
-      <p:nvGrpSpPr>
-        <p:cNvPr id="1" name=""/>
-        <p:cNvGrpSpPr/>
-        <p:nvPr/>
-      </p:nvGrpSpPr>
-      <p:grpSpPr>
-        <a:xfrm>
-          <a:off x="0" y="0"/>
-          <a:ext cx="0" cy="0"/>
-          <a:chOff x="0" y="0"/>
-          <a:chExt cx="0" cy="0"/>
-        </a:xfrm>
-      </p:grpSpPr>
-      <p:sp>
-        <p:nvSpPr>
           <p:cNvPr id="2" name="Title 1">
             <a:extLst>
               <a:ext uri="{FF2B5EF4-FFF2-40B4-BE49-F238E27FC236}">
@@ -16950,6 +16800,264 @@
       <p:bldP spid="5" grpId="0" animBg="1"/>
     </p:bldLst>
   </p:timing>
+</p:sld>
+</file>
+
+<file path=ppt/slides/slide12.xml><?xml version="1.0" encoding="utf-8"?>
+<p:sld xmlns:a="http://schemas.openxmlformats.org/drawingml/2006/main" xmlns:r="http://schemas.openxmlformats.org/officeDocument/2006/relationships" xmlns:p="http://schemas.openxmlformats.org/presentationml/2006/main">
+  <p:cSld>
+    <p:spTree>
+      <p:nvGrpSpPr>
+        <p:cNvPr id="1" name=""/>
+        <p:cNvGrpSpPr/>
+        <p:nvPr/>
+      </p:nvGrpSpPr>
+      <p:grpSpPr>
+        <a:xfrm>
+          <a:off x="0" y="0"/>
+          <a:ext cx="0" cy="0"/>
+          <a:chOff x="0" y="0"/>
+          <a:chExt cx="0" cy="0"/>
+        </a:xfrm>
+      </p:grpSpPr>
+      <p:sp>
+        <p:nvSpPr>
+          <p:cNvPr id="3" name="Content Placeholder 2"/>
+          <p:cNvSpPr>
+            <a:spLocks noGrp="1"/>
+          </p:cNvSpPr>
+          <p:nvPr>
+            <p:ph idx="1"/>
+          </p:nvPr>
+        </p:nvSpPr>
+        <p:spPr>
+          <a:xfrm>
+            <a:off x="1559135" y="1495424"/>
+            <a:ext cx="9486690" cy="4840062"/>
+          </a:xfrm>
+        </p:spPr>
+        <p:txBody>
+          <a:bodyPr>
+            <a:normAutofit/>
+          </a:bodyPr>
+          <a:lstStyle/>
+          <a:p>
+            <a:r>
+              <a:rPr lang="en-US" altLang="cs-CZ" dirty="0"/>
+              <a:t>Počítač s Linuxem se hodí jako server pro Torrenty a backup</a:t>
+            </a:r>
+            <a:endParaRPr lang="cs-CZ" altLang="cs-CZ" dirty="0"/>
+          </a:p>
+          <a:p>
+            <a:endParaRPr lang="cs-CZ" altLang="cs-CZ" dirty="0"/>
+          </a:p>
+          <a:p>
+            <a:r>
+              <a:rPr lang="cs-CZ" altLang="cs-CZ" dirty="0"/>
+              <a:t>To s těmi Torrenty se zvláště hodí pro lidi, kteří sdílejí soubory ve svém počítači a nechtějí svůj počítač mít zapnutý 24/7</a:t>
+            </a:r>
+            <a:endParaRPr lang="en-US" altLang="cs-CZ" dirty="0"/>
+          </a:p>
+          <a:p>
+            <a:endParaRPr lang="cs-CZ" altLang="cs-CZ" dirty="0"/>
+          </a:p>
+          <a:p>
+            <a:r>
+              <a:rPr lang="cs-CZ" altLang="cs-CZ" dirty="0"/>
+              <a:t>Pokud byste chtěli mít doma menší server pro Torrenty, </a:t>
+            </a:r>
+            <a:r>
+              <a:rPr lang="cs-CZ" altLang="cs-CZ" dirty="0" err="1"/>
+              <a:t>backup</a:t>
+            </a:r>
+            <a:r>
+              <a:rPr lang="cs-CZ" altLang="cs-CZ" dirty="0"/>
+              <a:t>, hodí se to pro vás</a:t>
+            </a:r>
+          </a:p>
+          <a:p>
+            <a:endParaRPr lang="en-US" altLang="cs-CZ" dirty="0"/>
+          </a:p>
+          <a:p>
+            <a:r>
+              <a:rPr lang="en-US" altLang="cs-CZ" dirty="0"/>
+              <a:t>Také se hodí jakožto domácí kino, zvlášť potom co Microsoft přestal podporovat svůj Media Center Edition operační systémy</a:t>
+            </a:r>
+          </a:p>
+        </p:txBody>
+      </p:sp>
+      <p:sp>
+        <p:nvSpPr>
+          <p:cNvPr id="4" name="TextBox 3"/>
+          <p:cNvSpPr txBox="1"/>
+          <p:nvPr/>
+        </p:nvSpPr>
+        <p:spPr>
+          <a:xfrm>
+            <a:off x="1559135" y="723900"/>
+            <a:ext cx="6924675" cy="460375"/>
+          </a:xfrm>
+          <a:prstGeom prst="rect">
+            <a:avLst/>
+          </a:prstGeom>
+          <a:noFill/>
+        </p:spPr>
+        <p:txBody>
+          <a:bodyPr wrap="square" rtlCol="0">
+            <a:spAutoFit/>
+          </a:bodyPr>
+          <a:lstStyle/>
+          <a:p>
+            <a:r>
+              <a:rPr lang="cs-CZ" sz="2400" b="1" dirty="0" err="1"/>
+              <a:t>Backup</a:t>
+            </a:r>
+            <a:r>
+              <a:rPr lang="en-US" altLang="cs-CZ" sz="2400" b="1" dirty="0" err="1"/>
+              <a:t>,</a:t>
+            </a:r>
+            <a:r>
+              <a:rPr lang="cs-CZ" sz="2400" b="1" dirty="0"/>
+              <a:t> torrenty</a:t>
+            </a:r>
+            <a:r>
+              <a:rPr lang="en-US" altLang="cs-CZ" sz="2400" b="1" dirty="0" err="1"/>
+              <a:t>, home theater </a:t>
+            </a:r>
+            <a:r>
+              <a:rPr lang="cs-CZ" sz="2400" b="1" dirty="0"/>
+              <a:t>:</a:t>
+            </a:r>
+          </a:p>
+        </p:txBody>
+      </p:sp>
+      <p:sp>
+        <p:nvSpPr>
+          <p:cNvPr id="2" name="Tlačítko akce: Přejít domů 1">
+            <a:hlinkClick r:id="rId3" action="ppaction://hlinksldjump" highlightClick="1"/>
+            <a:extLst>
+              <a:ext uri="{FF2B5EF4-FFF2-40B4-BE49-F238E27FC236}">
+                <a16:creationId xmlns:a16="http://schemas.microsoft.com/office/drawing/2014/main" id="{65DBD8F8-EBA1-4303-8BF5-6CC4FA759833}"/>
+              </a:ext>
+            </a:extLst>
+          </p:cNvPr>
+          <p:cNvSpPr/>
+          <p:nvPr/>
+        </p:nvSpPr>
+        <p:spPr>
+          <a:xfrm>
+            <a:off x="455089" y="6335486"/>
+            <a:ext cx="360000" cy="360000"/>
+          </a:xfrm>
+          <a:prstGeom prst="actionButtonHome">
+            <a:avLst/>
+          </a:prstGeom>
+          <a:solidFill>
+            <a:schemeClr val="bg1"/>
+          </a:solidFill>
+          <a:ln>
+            <a:solidFill>
+              <a:schemeClr val="tx1"/>
+            </a:solidFill>
+          </a:ln>
+        </p:spPr>
+        <p:style>
+          <a:lnRef idx="2">
+            <a:schemeClr val="accent1">
+              <a:shade val="50000"/>
+            </a:schemeClr>
+          </a:lnRef>
+          <a:fillRef idx="1">
+            <a:schemeClr val="accent1"/>
+          </a:fillRef>
+          <a:effectRef idx="0">
+            <a:schemeClr val="accent1"/>
+          </a:effectRef>
+          <a:fontRef idx="minor">
+            <a:schemeClr val="lt1"/>
+          </a:fontRef>
+        </p:style>
+        <p:txBody>
+          <a:bodyPr rtlCol="0" anchor="ctr"/>
+          <a:lstStyle/>
+          <a:p>
+            <a:pPr algn="ctr"/>
+            <a:endParaRPr lang="cs-CZ"/>
+          </a:p>
+        </p:txBody>
+      </p:sp>
+      <p:sp>
+        <p:nvSpPr>
+          <p:cNvPr id="5" name="Tlačítko akce: Přejít vpřed nebo Další 4">
+            <a:hlinkClick r:id="" action="ppaction://hlinkshowjump?jump=nextslide" highlightClick="1"/>
+            <a:extLst>
+              <a:ext uri="{FF2B5EF4-FFF2-40B4-BE49-F238E27FC236}">
+                <a16:creationId xmlns:a16="http://schemas.microsoft.com/office/drawing/2014/main" id="{9D8C0C06-A9DC-4955-87B2-2806CED6E5A7}"/>
+              </a:ext>
+            </a:extLst>
+          </p:cNvPr>
+          <p:cNvSpPr/>
+          <p:nvPr/>
+        </p:nvSpPr>
+        <p:spPr>
+          <a:xfrm>
+            <a:off x="827112" y="6335486"/>
+            <a:ext cx="360000" cy="360000"/>
+          </a:xfrm>
+          <a:prstGeom prst="actionButtonForwardNext">
+            <a:avLst/>
+          </a:prstGeom>
+          <a:solidFill>
+            <a:schemeClr val="bg1"/>
+          </a:solidFill>
+          <a:ln>
+            <a:solidFill>
+              <a:schemeClr val="tx1"/>
+            </a:solidFill>
+          </a:ln>
+        </p:spPr>
+        <p:style>
+          <a:lnRef idx="2">
+            <a:schemeClr val="accent1">
+              <a:shade val="50000"/>
+            </a:schemeClr>
+          </a:lnRef>
+          <a:fillRef idx="1">
+            <a:schemeClr val="accent1"/>
+          </a:fillRef>
+          <a:effectRef idx="0">
+            <a:schemeClr val="accent1"/>
+          </a:effectRef>
+          <a:fontRef idx="minor">
+            <a:schemeClr val="lt1"/>
+          </a:fontRef>
+        </p:style>
+        <p:txBody>
+          <a:bodyPr rtlCol="0" anchor="ctr"/>
+          <a:lstStyle/>
+          <a:p>
+            <a:pPr algn="ctr"/>
+            <a:endParaRPr lang="cs-CZ"/>
+          </a:p>
+        </p:txBody>
+      </p:sp>
+    </p:spTree>
+  </p:cSld>
+  <p:clrMapOvr>
+    <a:masterClrMapping/>
+  </p:clrMapOvr>
+  <mc:AlternateContent xmlns:mc="http://schemas.openxmlformats.org/markup-compatibility/2006" xmlns:p159="http://schemas.microsoft.com/office/powerpoint/2015/09/main">
+    <mc:Choice Requires="p159">
+      <p:transition xmlns:p14="http://schemas.microsoft.com/office/powerpoint/2010/main" spd="slow" p14:dur="2000">
+        <p159:morph option="byObject"/>
+      </p:transition>
+    </mc:Choice>
+    <mc:Fallback xmlns="">
+      <p:transition spd="slow">
+        <p:fade/>
+      </p:transition>
+    </mc:Fallback>
+  </mc:AlternateContent>
 </p:sld>
 </file>
 
@@ -17997,7 +18105,7 @@
         </p:blipFill>
         <p:spPr>
           <a:xfrm>
-            <a:off x="2908482" y="3102428"/>
+            <a:off x="2908482" y="2233749"/>
             <a:ext cx="914400" cy="914400"/>
           </a:xfrm>
         </p:spPr>
@@ -18146,8 +18254,8 @@
         </p:blipFill>
         <p:spPr>
           <a:xfrm>
-            <a:off x="5576750" y="3004458"/>
-            <a:ext cx="1219201" cy="1175656"/>
+            <a:off x="8369120" y="2158637"/>
+            <a:ext cx="1104055" cy="1064623"/>
           </a:xfrm>
           <a:prstGeom prst="rect">
             <a:avLst/>
@@ -18186,7 +18294,7 @@
         </p:blipFill>
         <p:spPr>
           <a:xfrm>
-            <a:off x="8369118" y="3102428"/>
+            <a:off x="2908482" y="4199075"/>
             <a:ext cx="914400" cy="914400"/>
           </a:xfrm>
           <a:prstGeom prst="rect">
@@ -18208,7 +18316,7 @@
         </p:nvSpPr>
         <p:spPr>
           <a:xfrm>
-            <a:off x="2392499" y="4167051"/>
+            <a:off x="2499002" y="3244334"/>
             <a:ext cx="1946365" cy="369332"/>
           </a:xfrm>
           <a:prstGeom prst="rect">
@@ -18244,7 +18352,7 @@
         </p:nvSpPr>
         <p:spPr>
           <a:xfrm>
-            <a:off x="5122816" y="4180113"/>
+            <a:off x="7947964" y="3315547"/>
             <a:ext cx="1946365" cy="369332"/>
           </a:xfrm>
           <a:prstGeom prst="rect">
@@ -18280,7 +18388,7 @@
         </p:nvSpPr>
         <p:spPr>
           <a:xfrm>
-            <a:off x="8033838" y="4180113"/>
+            <a:off x="2573202" y="5198924"/>
             <a:ext cx="1584960" cy="369332"/>
           </a:xfrm>
           <a:prstGeom prst="rect">
@@ -18298,6 +18406,81 @@
             <a:r>
               <a:rPr lang="cs-CZ" dirty="0"/>
               <a:t>Unikáty</a:t>
+            </a:r>
+          </a:p>
+        </p:txBody>
+      </p:sp>
+      <p:pic>
+        <p:nvPicPr>
+          <p:cNvPr id="6" name="Grafický objekt 5" descr="Kolibřík">
+            <a:extLst>
+              <a:ext uri="{FF2B5EF4-FFF2-40B4-BE49-F238E27FC236}">
+                <a16:creationId xmlns:a16="http://schemas.microsoft.com/office/drawing/2014/main" id="{BDC0C475-1DDA-448C-BF7F-CDAEEE5AE138}"/>
+              </a:ext>
+            </a:extLst>
+          </p:cNvPr>
+          <p:cNvPicPr>
+            <a:picLocks noChangeAspect="1"/>
+          </p:cNvPicPr>
+          <p:nvPr/>
+        </p:nvPicPr>
+        <p:blipFill>
+          <a:blip r:embed="rId13">
+            <a:extLst>
+              <a:ext uri="{28A0092B-C50C-407E-A947-70E740481C1C}">
+                <a14:useLocalDpi xmlns:a14="http://schemas.microsoft.com/office/drawing/2010/main" val="0"/>
+              </a:ext>
+              <a:ext uri="{96DAC541-7B7A-43D3-8B79-37D633B846F1}">
+                <asvg:svgBlip xmlns:asvg="http://schemas.microsoft.com/office/drawing/2016/SVG/main" r:embed="rId14"/>
+              </a:ext>
+            </a:extLst>
+          </a:blip>
+          <a:stretch>
+            <a:fillRect/>
+          </a:stretch>
+        </p:blipFill>
+        <p:spPr>
+          <a:xfrm>
+            <a:off x="8463946" y="4199075"/>
+            <a:ext cx="914400" cy="914400"/>
+          </a:xfrm>
+          <a:prstGeom prst="rect">
+            <a:avLst/>
+          </a:prstGeom>
+        </p:spPr>
+      </p:pic>
+      <p:sp>
+        <p:nvSpPr>
+          <p:cNvPr id="8" name="TextovéPole 7">
+            <a:extLst>
+              <a:ext uri="{FF2B5EF4-FFF2-40B4-BE49-F238E27FC236}">
+                <a16:creationId xmlns:a16="http://schemas.microsoft.com/office/drawing/2014/main" id="{F2ACB0EC-D43C-4CA2-B3D4-00C829498475}"/>
+              </a:ext>
+            </a:extLst>
+          </p:cNvPr>
+          <p:cNvSpPr txBox="1"/>
+          <p:nvPr/>
+        </p:nvSpPr>
+        <p:spPr>
+          <a:xfrm>
+            <a:off x="7478744" y="5198924"/>
+            <a:ext cx="2884804" cy="369332"/>
+          </a:xfrm>
+          <a:prstGeom prst="rect">
+            <a:avLst/>
+          </a:prstGeom>
+          <a:noFill/>
+        </p:spPr>
+        <p:txBody>
+          <a:bodyPr wrap="square" rtlCol="0">
+            <a:spAutoFit/>
+          </a:bodyPr>
+          <a:lstStyle/>
+          <a:p>
+            <a:pPr algn="ctr"/>
+            <a:r>
+              <a:rPr lang="cs-CZ" dirty="0"/>
+              <a:t>Nenáročné na hardware</a:t>
             </a:r>
           </a:p>
         </p:txBody>
@@ -18887,7 +19070,7 @@
         </p:spPr>
         <p:txBody>
           <a:bodyPr>
-            <a:normAutofit/>
+            <a:normAutofit fontScale="92500" lnSpcReduction="10000"/>
           </a:bodyPr>
           <a:lstStyle/>
           <a:p>
@@ -18929,6 +19112,17 @@
             <a:r>
               <a:rPr lang="cs-CZ" dirty="0"/>
               <a:t>Tato distribuce není vhodná pro začátečníky ani pro pokročilé uživatele</a:t>
+            </a:r>
+          </a:p>
+          <a:p>
+            <a:pPr>
+              <a:lnSpc>
+                <a:spcPct val="100000"/>
+              </a:lnSpc>
+            </a:pPr>
+            <a:r>
+              <a:rPr lang="cs-CZ" dirty="0"/>
+              <a:t>Nejnovější verze: 4.1.1 (18. 7. 2022)</a:t>
             </a:r>
           </a:p>
         </p:txBody>
@@ -19175,12 +19369,12 @@
         <p:spPr>
           <a:xfrm>
             <a:off x="289560" y="1583742"/>
-            <a:ext cx="4169283" cy="4442262"/>
+            <a:ext cx="4169283" cy="5002238"/>
           </a:xfrm>
         </p:spPr>
         <p:txBody>
           <a:bodyPr>
-            <a:normAutofit fontScale="92500"/>
+            <a:normAutofit lnSpcReduction="10000"/>
           </a:bodyPr>
           <a:lstStyle/>
           <a:p>
@@ -19255,6 +19449,25 @@
               <a:rPr lang="cs-CZ" sz="2400" dirty="0" err="1"/>
               <a:t>Qubes</a:t>
             </a:r>
+            <a:endParaRPr lang="cs-CZ" sz="2400" dirty="0"/>
+          </a:p>
+          <a:p>
+            <a:pPr>
+              <a:lnSpc>
+                <a:spcPct val="100000"/>
+              </a:lnSpc>
+            </a:pPr>
+            <a:r>
+              <a:rPr lang="cs-CZ" sz="2400" dirty="0"/>
+              <a:t>Nejnovější verze: 2019.1</a:t>
+            </a:r>
+          </a:p>
+          <a:p>
+            <a:pPr>
+              <a:lnSpc>
+                <a:spcPct val="100000"/>
+              </a:lnSpc>
+            </a:pPr>
             <a:endParaRPr lang="cs-CZ" sz="2400" dirty="0"/>
           </a:p>
         </p:txBody>
@@ -19746,7 +19959,7 @@
         <p:spPr>
           <a:xfrm>
             <a:off x="576072" y="2160016"/>
-            <a:ext cx="3603625" cy="3926152"/>
+            <a:ext cx="3603625" cy="4697980"/>
           </a:xfrm>
         </p:spPr>
         <p:txBody>
@@ -19756,48 +19969,51 @@
           <a:lstStyle/>
           <a:p>
             <a:r>
-              <a:rPr lang="cs-CZ" sz="2000"/>
+              <a:rPr lang="cs-CZ" sz="2000" dirty="0"/>
               <a:t>Vhodný pro začátečníky, kteří přestoupili z Windows</a:t>
             </a:r>
           </a:p>
           <a:p>
             <a:r>
-              <a:rPr lang="cs-CZ" sz="2000"/>
+              <a:rPr lang="cs-CZ" sz="2000" dirty="0"/>
               <a:t>Dodává se s ekvivalenty Windows aplikací (př.: Microsoft Office je zde zastoupen s </a:t>
             </a:r>
             <a:r>
-              <a:rPr lang="cs-CZ" sz="2000" err="1"/>
+              <a:rPr lang="cs-CZ" sz="2000" dirty="0" err="1"/>
               <a:t>Libreoffice</a:t>
             </a:r>
             <a:r>
-              <a:rPr lang="cs-CZ" sz="2000"/>
+              <a:rPr lang="cs-CZ" sz="2000" dirty="0"/>
               <a:t>)</a:t>
             </a:r>
           </a:p>
           <a:p>
             <a:r>
-              <a:rPr lang="cs-CZ" sz="2000"/>
+              <a:rPr lang="cs-CZ" sz="2000" dirty="0"/>
               <a:t>V tomto operačním systému jsou tři grafická prostředí – </a:t>
             </a:r>
             <a:r>
-              <a:rPr lang="cs-CZ" sz="2000" err="1"/>
+              <a:rPr lang="cs-CZ" sz="2000" dirty="0" err="1"/>
               <a:t>Cinnamon</a:t>
             </a:r>
             <a:r>
-              <a:rPr lang="cs-CZ" sz="2000"/>
+              <a:rPr lang="cs-CZ" sz="2000" dirty="0"/>
               <a:t>, </a:t>
             </a:r>
             <a:r>
-              <a:rPr lang="cs-CZ" sz="2000" err="1"/>
+              <a:rPr lang="cs-CZ" sz="2000" dirty="0" err="1"/>
               <a:t>Xfce</a:t>
             </a:r>
             <a:r>
-              <a:rPr lang="cs-CZ" sz="2000"/>
+              <a:rPr lang="cs-CZ" sz="2000" dirty="0"/>
               <a:t>, Mate</a:t>
             </a:r>
           </a:p>
           <a:p>
-            <a:endParaRPr lang="cs-CZ" sz="2000"/>
+            <a:r>
+              <a:rPr lang="cs-CZ" sz="2000" dirty="0"/>
+              <a:t>Nejnovější verze: 21.1</a:t>
+            </a:r>
           </a:p>
         </p:txBody>
       </p:sp>
@@ -21821,7 +22037,7 @@
               <a:rPr lang="cs-CZ" dirty="0" err="1"/>
               <a:t>Ubuntu</a:t>
             </a:r>
-            <a:endParaRPr lang="cs-CZ"/>
+            <a:endParaRPr lang="cs-CZ" dirty="0"/>
           </a:p>
           <a:p>
             <a:pPr>
@@ -21849,7 +22065,6 @@
               <a:rPr lang="cs-CZ" dirty="0"/>
               <a:t>/, což znamená vymazat disk</a:t>
             </a:r>
-            <a:endParaRPr lang="cs-CZ"/>
           </a:p>
           <a:p>
             <a:pPr>
@@ -21861,7 +22076,6 @@
               <a:rPr lang="cs-CZ" dirty="0"/>
               <a:t>Je to šílené, ale existuje to</a:t>
             </a:r>
-            <a:endParaRPr lang="cs-CZ"/>
           </a:p>
           <a:p>
             <a:pPr>
@@ -21873,7 +22087,6 @@
               <a:rPr lang="cs-CZ" dirty="0"/>
               <a:t>Doporučuji tento systém nepoužívat</a:t>
             </a:r>
-            <a:endParaRPr lang="cs-CZ"/>
           </a:p>
           <a:p>
             <a:pPr>
@@ -21881,7 +22094,7 @@
                 <a:spcPct val="100000"/>
               </a:lnSpc>
             </a:pPr>
-            <a:endParaRPr lang="cs-CZ"/>
+            <a:endParaRPr lang="cs-CZ" dirty="0"/>
           </a:p>
         </p:txBody>
       </p:sp>
@@ -21944,8 +22157,8 @@
         </p:nvSpPr>
         <p:spPr>
           <a:xfrm>
-            <a:off x="6235724" y="6195978"/>
-            <a:ext cx="5403742" cy="369332"/>
+            <a:off x="9228425" y="6304000"/>
+            <a:ext cx="2960527" cy="369332"/>
           </a:xfrm>
           <a:prstGeom prst="rect">
             <a:avLst/>
@@ -22439,6 +22652,190 @@
           <p:cNvPr id="2" name="Nadpis 1">
             <a:extLst>
               <a:ext uri="{FF2B5EF4-FFF2-40B4-BE49-F238E27FC236}">
+                <a16:creationId xmlns:a16="http://schemas.microsoft.com/office/drawing/2014/main" id="{B3B58B8A-8361-4BEA-A77D-EA5394BF59D6}"/>
+              </a:ext>
+            </a:extLst>
+          </p:cNvPr>
+          <p:cNvSpPr>
+            <a:spLocks noGrp="1"/>
+          </p:cNvSpPr>
+          <p:nvPr>
+            <p:ph type="title"/>
+          </p:nvPr>
+        </p:nvSpPr>
+        <p:spPr/>
+        <p:txBody>
+          <a:bodyPr/>
+          <a:lstStyle/>
+          <a:p>
+            <a:endParaRPr lang="cs-CZ"/>
+          </a:p>
+        </p:txBody>
+      </p:sp>
+      <p:sp>
+        <p:nvSpPr>
+          <p:cNvPr id="3" name="Zástupný obsah 2">
+            <a:extLst>
+              <a:ext uri="{FF2B5EF4-FFF2-40B4-BE49-F238E27FC236}">
+                <a16:creationId xmlns:a16="http://schemas.microsoft.com/office/drawing/2014/main" id="{0D3DFBDA-2691-45D1-814B-11108CB71BD5}"/>
+              </a:ext>
+            </a:extLst>
+          </p:cNvPr>
+          <p:cNvSpPr>
+            <a:spLocks noGrp="1"/>
+          </p:cNvSpPr>
+          <p:nvPr>
+            <p:ph idx="1"/>
+          </p:nvPr>
+        </p:nvSpPr>
+        <p:spPr/>
+        <p:txBody>
+          <a:bodyPr/>
+          <a:lstStyle/>
+          <a:p>
+            <a:endParaRPr lang="cs-CZ"/>
+          </a:p>
+        </p:txBody>
+      </p:sp>
+    </p:spTree>
+    <p:extLst>
+      <p:ext uri="{BB962C8B-B14F-4D97-AF65-F5344CB8AC3E}">
+        <p14:creationId xmlns:p14="http://schemas.microsoft.com/office/powerpoint/2010/main" val="2371025091"/>
+      </p:ext>
+    </p:extLst>
+  </p:cSld>
+  <p:clrMapOvr>
+    <a:masterClrMapping/>
+  </p:clrMapOvr>
+  <mc:AlternateContent xmlns:mc="http://schemas.openxmlformats.org/markup-compatibility/2006" xmlns:p159="http://schemas.microsoft.com/office/powerpoint/2015/09/main">
+    <mc:Choice Requires="p159">
+      <p:transition xmlns:p14="http://schemas.microsoft.com/office/powerpoint/2010/main" spd="slow" p14:dur="2000">
+        <p159:morph option="byObject"/>
+      </p:transition>
+    </mc:Choice>
+    <mc:Fallback xmlns="">
+      <p:transition spd="slow">
+        <p:fade/>
+      </p:transition>
+    </mc:Fallback>
+  </mc:AlternateContent>
+</p:sld>
+</file>
+
+<file path=ppt/slides/slide23.xml><?xml version="1.0" encoding="utf-8"?>
+<p:sld xmlns:a="http://schemas.openxmlformats.org/drawingml/2006/main" xmlns:r="http://schemas.openxmlformats.org/officeDocument/2006/relationships" xmlns:p="http://schemas.openxmlformats.org/presentationml/2006/main">
+  <p:cSld>
+    <p:spTree>
+      <p:nvGrpSpPr>
+        <p:cNvPr id="1" name=""/>
+        <p:cNvGrpSpPr/>
+        <p:nvPr/>
+      </p:nvGrpSpPr>
+      <p:grpSpPr>
+        <a:xfrm>
+          <a:off x="0" y="0"/>
+          <a:ext cx="0" cy="0"/>
+          <a:chOff x="0" y="0"/>
+          <a:chExt cx="0" cy="0"/>
+        </a:xfrm>
+      </p:grpSpPr>
+      <p:sp>
+        <p:nvSpPr>
+          <p:cNvPr id="2" name="Nadpis 1">
+            <a:extLst>
+              <a:ext uri="{FF2B5EF4-FFF2-40B4-BE49-F238E27FC236}">
+                <a16:creationId xmlns:a16="http://schemas.microsoft.com/office/drawing/2014/main" id="{0AFEF7BE-CE6B-45FD-8806-FE4A381FF9FF}"/>
+              </a:ext>
+            </a:extLst>
+          </p:cNvPr>
+          <p:cNvSpPr>
+            <a:spLocks noGrp="1"/>
+          </p:cNvSpPr>
+          <p:nvPr>
+            <p:ph type="title"/>
+          </p:nvPr>
+        </p:nvSpPr>
+        <p:spPr/>
+        <p:txBody>
+          <a:bodyPr/>
+          <a:lstStyle/>
+          <a:p>
+            <a:endParaRPr lang="cs-CZ"/>
+          </a:p>
+        </p:txBody>
+      </p:sp>
+      <p:sp>
+        <p:nvSpPr>
+          <p:cNvPr id="3" name="Zástupný obsah 2">
+            <a:extLst>
+              <a:ext uri="{FF2B5EF4-FFF2-40B4-BE49-F238E27FC236}">
+                <a16:creationId xmlns:a16="http://schemas.microsoft.com/office/drawing/2014/main" id="{E5B10B43-FBC1-403A-A1FD-FD6CBEA8118D}"/>
+              </a:ext>
+            </a:extLst>
+          </p:cNvPr>
+          <p:cNvSpPr>
+            <a:spLocks noGrp="1"/>
+          </p:cNvSpPr>
+          <p:nvPr>
+            <p:ph idx="1"/>
+          </p:nvPr>
+        </p:nvSpPr>
+        <p:spPr/>
+        <p:txBody>
+          <a:bodyPr/>
+          <a:lstStyle/>
+          <a:p>
+            <a:endParaRPr lang="cs-CZ"/>
+          </a:p>
+        </p:txBody>
+      </p:sp>
+    </p:spTree>
+    <p:extLst>
+      <p:ext uri="{BB962C8B-B14F-4D97-AF65-F5344CB8AC3E}">
+        <p14:creationId xmlns:p14="http://schemas.microsoft.com/office/powerpoint/2010/main" val="4059909009"/>
+      </p:ext>
+    </p:extLst>
+  </p:cSld>
+  <p:clrMapOvr>
+    <a:masterClrMapping/>
+  </p:clrMapOvr>
+  <mc:AlternateContent xmlns:mc="http://schemas.openxmlformats.org/markup-compatibility/2006" xmlns:p159="http://schemas.microsoft.com/office/powerpoint/2015/09/main">
+    <mc:Choice Requires="p159">
+      <p:transition xmlns:p14="http://schemas.microsoft.com/office/powerpoint/2010/main" spd="slow" p14:dur="2000">
+        <p159:morph option="byObject"/>
+      </p:transition>
+    </mc:Choice>
+    <mc:Fallback xmlns="">
+      <p:transition spd="slow">
+        <p:fade/>
+      </p:transition>
+    </mc:Fallback>
+  </mc:AlternateContent>
+</p:sld>
+</file>
+
+<file path=ppt/slides/slide24.xml><?xml version="1.0" encoding="utf-8"?>
+<p:sld xmlns:a="http://schemas.openxmlformats.org/drawingml/2006/main" xmlns:r="http://schemas.openxmlformats.org/officeDocument/2006/relationships" xmlns:p="http://schemas.openxmlformats.org/presentationml/2006/main">
+  <p:cSld>
+    <p:spTree>
+      <p:nvGrpSpPr>
+        <p:cNvPr id="1" name=""/>
+        <p:cNvGrpSpPr/>
+        <p:nvPr/>
+      </p:nvGrpSpPr>
+      <p:grpSpPr>
+        <a:xfrm>
+          <a:off x="0" y="0"/>
+          <a:ext cx="0" cy="0"/>
+          <a:chOff x="0" y="0"/>
+          <a:chExt cx="0" cy="0"/>
+        </a:xfrm>
+      </p:grpSpPr>
+      <p:sp>
+        <p:nvSpPr>
+          <p:cNvPr id="2" name="Nadpis 1">
+            <a:extLst>
+              <a:ext uri="{FF2B5EF4-FFF2-40B4-BE49-F238E27FC236}">
                 <a16:creationId xmlns:a16="http://schemas.microsoft.com/office/drawing/2014/main" id="{6ECCA9A8-EA1D-458B-9E62-F99DC8B80BFD}"/>
               </a:ext>
             </a:extLst>
@@ -22492,10 +22889,61 @@
           </a:xfrm>
         </p:spPr>
         <p:txBody>
-          <a:bodyPr/>
+          <a:bodyPr>
+            <a:normAutofit fontScale="92500"/>
+          </a:bodyPr>
           <a:lstStyle/>
           <a:p>
-            <a:endParaRPr lang="cs-CZ"/>
+            <a:r>
+              <a:rPr lang="en-US" dirty="0"/>
+              <a:t>Belding, G. The Many Flavors of Linux. https://resources.infosecinstitute.com/topic/the-many-flavors-of-linux/ (accessed Jan 16, 2023).</a:t>
+            </a:r>
+            <a:endParaRPr lang="cs-CZ" dirty="0"/>
+          </a:p>
+          <a:p>
+            <a:r>
+              <a:rPr lang="it-IT" dirty="0"/>
+              <a:t>Linux - Wikipedie, 2023. Linux. Dostupné z: https://cs.wikipedia.org/wiki/Linux (accessed Jan 16, 2023).</a:t>
+            </a:r>
+            <a:endParaRPr lang="cs-CZ" dirty="0"/>
+          </a:p>
+          <a:p>
+            <a:r>
+              <a:rPr lang="en-US" dirty="0"/>
+              <a:t>Whitson, G. Beware These Red Flags At Your Next Open House. https://lifehacker.com/beware-these-red-flags-at-your-next-open-house-1849986319 (accessed Jan 16, 2023).</a:t>
+            </a:r>
+            <a:endParaRPr lang="cs-CZ" dirty="0"/>
+          </a:p>
+          <a:p>
+            <a:r>
+              <a:rPr lang="en-US" dirty="0"/>
+              <a:t>Rackspace, T. What Is Linux Server. https://www.rackspace.com/library/what-is-a-linux-server (accessed Jan </a:t>
+            </a:r>
+            <a:r>
+              <a:rPr lang="cs-CZ" dirty="0"/>
+              <a:t>16</a:t>
+            </a:r>
+            <a:r>
+              <a:rPr lang="en-US" dirty="0"/>
+              <a:t>, 2023).</a:t>
+            </a:r>
+            <a:endParaRPr lang="cs-CZ" dirty="0"/>
+          </a:p>
+          <a:p>
+            <a:r>
+              <a:rPr lang="en-US" dirty="0"/>
+              <a:t>Linux Mint. https://cs.wikipedia.org/wiki/Linux_Mint (accessed Jan 16, 2023).</a:t>
+            </a:r>
+            <a:endParaRPr lang="cs-CZ" dirty="0"/>
+          </a:p>
+          <a:p>
+            <a:endParaRPr lang="cs-CZ" dirty="0"/>
+          </a:p>
+          <a:p>
+            <a:endParaRPr lang="cs-CZ" dirty="0"/>
+          </a:p>
+          <a:p>
+            <a:endParaRPr lang="cs-CZ" dirty="0"/>
           </a:p>
         </p:txBody>
       </p:sp>
@@ -22524,7 +22972,7 @@
 </p:sld>
 </file>
 
-<file path=ppt/slides/slide23.xml><?xml version="1.0" encoding="utf-8"?>
+<file path=ppt/slides/slide25.xml><?xml version="1.0" encoding="utf-8"?>
 <p:sld xmlns:a="http://schemas.openxmlformats.org/drawingml/2006/main" xmlns:r="http://schemas.openxmlformats.org/officeDocument/2006/relationships" xmlns:p="http://schemas.openxmlformats.org/presentationml/2006/main">
   <p:cSld>
     <p:bg>
@@ -27755,6 +28203,284 @@
           </a:p>
         </p:txBody>
       </p:sp>
+      <p:pic>
+        <p:nvPicPr>
+          <p:cNvPr id="6" name="Grafický objekt 5" descr="Databáze">
+            <a:hlinkClick r:id="rId4" action="ppaction://hlinksldjump"/>
+            <a:extLst>
+              <a:ext uri="{FF2B5EF4-FFF2-40B4-BE49-F238E27FC236}">
+                <a16:creationId xmlns:a16="http://schemas.microsoft.com/office/drawing/2014/main" id="{684080B7-669B-4944-A1DC-CAD5C8BD620E}"/>
+              </a:ext>
+            </a:extLst>
+          </p:cNvPr>
+          <p:cNvPicPr>
+            <a:picLocks noChangeAspect="1"/>
+          </p:cNvPicPr>
+          <p:nvPr/>
+        </p:nvPicPr>
+        <p:blipFill>
+          <a:blip r:embed="rId5">
+            <a:extLst>
+              <a:ext uri="{28A0092B-C50C-407E-A947-70E740481C1C}">
+                <a14:useLocalDpi xmlns:a14="http://schemas.microsoft.com/office/drawing/2010/main" val="0"/>
+              </a:ext>
+              <a:ext uri="{96DAC541-7B7A-43D3-8B79-37D633B846F1}">
+                <asvg:svgBlip xmlns:asvg="http://schemas.microsoft.com/office/drawing/2016/SVG/main" r:embed="rId6"/>
+              </a:ext>
+            </a:extLst>
+          </a:blip>
+          <a:stretch>
+            <a:fillRect/>
+          </a:stretch>
+        </p:blipFill>
+        <p:spPr>
+          <a:xfrm>
+            <a:off x="8259339" y="3957414"/>
+            <a:ext cx="914400" cy="914400"/>
+          </a:xfrm>
+          <a:prstGeom prst="rect">
+            <a:avLst/>
+          </a:prstGeom>
+        </p:spPr>
+      </p:pic>
+      <p:pic>
+        <p:nvPicPr>
+          <p:cNvPr id="8" name="Grafický objekt 7" descr="Procesor">
+            <a:hlinkClick r:id="rId7" action="ppaction://hlinksldjump"/>
+            <a:extLst>
+              <a:ext uri="{FF2B5EF4-FFF2-40B4-BE49-F238E27FC236}">
+                <a16:creationId xmlns:a16="http://schemas.microsoft.com/office/drawing/2014/main" id="{879E58A5-F18A-4FC3-A0F1-BA306EEF5072}"/>
+              </a:ext>
+            </a:extLst>
+          </p:cNvPr>
+          <p:cNvPicPr>
+            <a:picLocks noChangeAspect="1"/>
+          </p:cNvPicPr>
+          <p:nvPr/>
+        </p:nvPicPr>
+        <p:blipFill>
+          <a:blip r:embed="rId8">
+            <a:extLst>
+              <a:ext uri="{28A0092B-C50C-407E-A947-70E740481C1C}">
+                <a14:useLocalDpi xmlns:a14="http://schemas.microsoft.com/office/drawing/2010/main" val="0"/>
+              </a:ext>
+              <a:ext uri="{96DAC541-7B7A-43D3-8B79-37D633B846F1}">
+                <asvg:svgBlip xmlns:asvg="http://schemas.microsoft.com/office/drawing/2016/SVG/main" r:embed="rId9"/>
+              </a:ext>
+            </a:extLst>
+          </a:blip>
+          <a:stretch>
+            <a:fillRect/>
+          </a:stretch>
+        </p:blipFill>
+        <p:spPr>
+          <a:xfrm>
+            <a:off x="4959531" y="2971800"/>
+            <a:ext cx="914400" cy="914400"/>
+          </a:xfrm>
+          <a:prstGeom prst="rect">
+            <a:avLst/>
+          </a:prstGeom>
+        </p:spPr>
+      </p:pic>
+      <p:pic>
+        <p:nvPicPr>
+          <p:cNvPr id="10" name="Grafický objekt 9" descr="Počítač">
+            <a:hlinkClick r:id="rId10" action="ppaction://hlinksldjump"/>
+            <a:extLst>
+              <a:ext uri="{FF2B5EF4-FFF2-40B4-BE49-F238E27FC236}">
+                <a16:creationId xmlns:a16="http://schemas.microsoft.com/office/drawing/2014/main" id="{5A6905FC-0CEE-45B5-8FA3-C5A8A4B2DF36}"/>
+              </a:ext>
+            </a:extLst>
+          </p:cNvPr>
+          <p:cNvPicPr>
+            <a:picLocks noChangeAspect="1"/>
+          </p:cNvPicPr>
+          <p:nvPr/>
+        </p:nvPicPr>
+        <p:blipFill>
+          <a:blip r:embed="rId11">
+            <a:extLst>
+              <a:ext uri="{28A0092B-C50C-407E-A947-70E740481C1C}">
+                <a14:useLocalDpi xmlns:a14="http://schemas.microsoft.com/office/drawing/2010/main" val="0"/>
+              </a:ext>
+              <a:ext uri="{96DAC541-7B7A-43D3-8B79-37D633B846F1}">
+                <asvg:svgBlip xmlns:asvg="http://schemas.microsoft.com/office/drawing/2016/SVG/main" r:embed="rId12"/>
+              </a:ext>
+            </a:extLst>
+          </a:blip>
+          <a:stretch>
+            <a:fillRect/>
+          </a:stretch>
+        </p:blipFill>
+        <p:spPr>
+          <a:xfrm>
+            <a:off x="7135494" y="2971800"/>
+            <a:ext cx="914400" cy="914400"/>
+          </a:xfrm>
+          <a:prstGeom prst="rect">
+            <a:avLst/>
+          </a:prstGeom>
+        </p:spPr>
+      </p:pic>
+      <p:pic>
+        <p:nvPicPr>
+          <p:cNvPr id="12" name="Grafický objekt 11" descr="Tablet">
+            <a:hlinkClick r:id="rId13" action="ppaction://hlinksldjump"/>
+            <a:extLst>
+              <a:ext uri="{FF2B5EF4-FFF2-40B4-BE49-F238E27FC236}">
+                <a16:creationId xmlns:a16="http://schemas.microsoft.com/office/drawing/2014/main" id="{C752E08A-67B0-4B38-BFA2-B77E3480ACEE}"/>
+              </a:ext>
+            </a:extLst>
+          </p:cNvPr>
+          <p:cNvPicPr>
+            <a:picLocks noChangeAspect="1"/>
+          </p:cNvPicPr>
+          <p:nvPr/>
+        </p:nvPicPr>
+        <p:blipFill>
+          <a:blip r:embed="rId14">
+            <a:extLst>
+              <a:ext uri="{28A0092B-C50C-407E-A947-70E740481C1C}">
+                <a14:useLocalDpi xmlns:a14="http://schemas.microsoft.com/office/drawing/2010/main" val="0"/>
+              </a:ext>
+              <a:ext uri="{96DAC541-7B7A-43D3-8B79-37D633B846F1}">
+                <asvg:svgBlip xmlns:asvg="http://schemas.microsoft.com/office/drawing/2016/SVG/main" r:embed="rId15"/>
+              </a:ext>
+            </a:extLst>
+          </a:blip>
+          <a:stretch>
+            <a:fillRect/>
+          </a:stretch>
+        </p:blipFill>
+        <p:spPr>
+          <a:xfrm>
+            <a:off x="9311457" y="2971800"/>
+            <a:ext cx="914400" cy="914400"/>
+          </a:xfrm>
+          <a:prstGeom prst="rect">
+            <a:avLst/>
+          </a:prstGeom>
+        </p:spPr>
+      </p:pic>
+      <p:pic>
+        <p:nvPicPr>
+          <p:cNvPr id="14" name="Grafický objekt 13" descr="Stahování z cloudu">
+            <a:extLst>
+              <a:ext uri="{FF2B5EF4-FFF2-40B4-BE49-F238E27FC236}">
+                <a16:creationId xmlns:a16="http://schemas.microsoft.com/office/drawing/2014/main" id="{4EC2F534-CE38-4572-A166-EC20A7D38EC3}"/>
+              </a:ext>
+            </a:extLst>
+          </p:cNvPr>
+          <p:cNvPicPr>
+            <a:picLocks noChangeAspect="1"/>
+          </p:cNvPicPr>
+          <p:nvPr/>
+        </p:nvPicPr>
+        <p:blipFill>
+          <a:blip r:embed="rId16">
+            <a:extLst>
+              <a:ext uri="{28A0092B-C50C-407E-A947-70E740481C1C}">
+                <a14:useLocalDpi xmlns:a14="http://schemas.microsoft.com/office/drawing/2010/main" val="0"/>
+              </a:ext>
+              <a:ext uri="{96DAC541-7B7A-43D3-8B79-37D633B846F1}">
+                <asvg:svgBlip xmlns:asvg="http://schemas.microsoft.com/office/drawing/2016/SVG/main" r:embed="rId17"/>
+              </a:ext>
+            </a:extLst>
+          </a:blip>
+          <a:stretch>
+            <a:fillRect/>
+          </a:stretch>
+        </p:blipFill>
+        <p:spPr>
+          <a:xfrm>
+            <a:off x="3871549" y="3886200"/>
+            <a:ext cx="914400" cy="914400"/>
+          </a:xfrm>
+          <a:prstGeom prst="rect">
+            <a:avLst/>
+          </a:prstGeom>
+        </p:spPr>
+      </p:pic>
+      <p:pic>
+        <p:nvPicPr>
+          <p:cNvPr id="16" name="Grafický objekt 15" descr="Programátor">
+            <a:extLst>
+              <a:ext uri="{FF2B5EF4-FFF2-40B4-BE49-F238E27FC236}">
+                <a16:creationId xmlns:a16="http://schemas.microsoft.com/office/drawing/2014/main" id="{521E5CFD-470F-4C73-BC16-09A589722501}"/>
+              </a:ext>
+            </a:extLst>
+          </p:cNvPr>
+          <p:cNvPicPr>
+            <a:picLocks noChangeAspect="1"/>
+          </p:cNvPicPr>
+          <p:nvPr/>
+        </p:nvPicPr>
+        <p:blipFill>
+          <a:blip r:embed="rId18">
+            <a:extLst>
+              <a:ext uri="{28A0092B-C50C-407E-A947-70E740481C1C}">
+                <a14:useLocalDpi xmlns:a14="http://schemas.microsoft.com/office/drawing/2010/main" val="0"/>
+              </a:ext>
+              <a:ext uri="{96DAC541-7B7A-43D3-8B79-37D633B846F1}">
+                <asvg:svgBlip xmlns:asvg="http://schemas.microsoft.com/office/drawing/2016/SVG/main" r:embed="rId19"/>
+              </a:ext>
+            </a:extLst>
+          </a:blip>
+          <a:stretch>
+            <a:fillRect/>
+          </a:stretch>
+        </p:blipFill>
+        <p:spPr>
+          <a:xfrm>
+            <a:off x="6065444" y="3886200"/>
+            <a:ext cx="914400" cy="914400"/>
+          </a:xfrm>
+          <a:prstGeom prst="rect">
+            <a:avLst/>
+          </a:prstGeom>
+        </p:spPr>
+      </p:pic>
+      <p:pic>
+        <p:nvPicPr>
+          <p:cNvPr id="18" name="Grafický objekt 17" descr="Server">
+            <a:hlinkClick r:id="rId20" action="ppaction://hlinksldjump"/>
+            <a:extLst>
+              <a:ext uri="{FF2B5EF4-FFF2-40B4-BE49-F238E27FC236}">
+                <a16:creationId xmlns:a16="http://schemas.microsoft.com/office/drawing/2014/main" id="{EC6CA1B1-C197-4D42-B9AC-C3139A3A8857}"/>
+              </a:ext>
+            </a:extLst>
+          </p:cNvPr>
+          <p:cNvPicPr>
+            <a:picLocks noChangeAspect="1"/>
+          </p:cNvPicPr>
+          <p:nvPr/>
+        </p:nvPicPr>
+        <p:blipFill>
+          <a:blip r:embed="rId21">
+            <a:extLst>
+              <a:ext uri="{28A0092B-C50C-407E-A947-70E740481C1C}">
+                <a14:useLocalDpi xmlns:a14="http://schemas.microsoft.com/office/drawing/2010/main" val="0"/>
+              </a:ext>
+              <a:ext uri="{96DAC541-7B7A-43D3-8B79-37D633B846F1}">
+                <asvg:svgBlip xmlns:asvg="http://schemas.microsoft.com/office/drawing/2016/SVG/main" r:embed="rId22"/>
+              </a:ext>
+            </a:extLst>
+          </a:blip>
+          <a:stretch>
+            <a:fillRect/>
+          </a:stretch>
+        </p:blipFill>
+        <p:spPr>
+          <a:xfrm>
+            <a:off x="2957149" y="2971800"/>
+            <a:ext cx="914400" cy="914400"/>
+          </a:xfrm>
+          <a:prstGeom prst="rect">
+            <a:avLst/>
+          </a:prstGeom>
+        </p:spPr>
+      </p:pic>
     </p:spTree>
     <p:extLst>
       <p:ext uri="{BB962C8B-B14F-4D97-AF65-F5344CB8AC3E}">
@@ -27848,13 +28574,42 @@
         </p:nvSpPr>
         <p:spPr/>
         <p:txBody>
-          <a:bodyPr/>
+          <a:bodyPr>
+            <a:normAutofit lnSpcReduction="10000"/>
+          </a:bodyPr>
           <a:lstStyle/>
           <a:p>
             <a:r>
               <a:rPr lang="cs-CZ" dirty="0"/>
               <a:t>Jeho využití bylo a je zdarma</a:t>
             </a:r>
+          </a:p>
+          <a:p>
+            <a:endParaRPr lang="cs-CZ" dirty="0"/>
+          </a:p>
+          <a:p>
+            <a:r>
+              <a:rPr lang="cs-CZ" dirty="0"/>
+              <a:t>Využívá se hlavně pro svoji rychlost, stabilitu, bezpečnost a škálovatelnost</a:t>
+            </a:r>
+          </a:p>
+          <a:p>
+            <a:pPr marL="0" indent="0">
+              <a:buNone/>
+            </a:pPr>
+            <a:endParaRPr lang="cs-CZ" dirty="0"/>
+          </a:p>
+          <a:p>
+            <a:r>
+              <a:rPr lang="cs-CZ" dirty="0"/>
+              <a:t>Linux se zde využívá, protože je méně náročný na výpočetní zdroje</a:t>
+            </a:r>
+          </a:p>
+          <a:p>
+            <a:pPr marL="0" indent="0">
+              <a:buNone/>
+            </a:pPr>
+            <a:endParaRPr lang="cs-CZ" dirty="0"/>
           </a:p>
           <a:p>
             <a:r>
@@ -28403,7 +29158,7 @@
                                         <p:tgtEl>
                                           <p:spTgt spid="3">
                                             <p:txEl>
-                                              <p:pRg st="1" end="1"/>
+                                              <p:pRg st="2" end="2"/>
                                             </p:txEl>
                                           </p:spTgt>
                                         </p:tgtEl>
@@ -28421,7 +29176,7 @@
                                         <p:tgtEl>
                                           <p:spTgt spid="3">
                                             <p:txEl>
-                                              <p:pRg st="1" end="1"/>
+                                              <p:pRg st="2" end="2"/>
                                             </p:txEl>
                                           </p:spTgt>
                                         </p:tgtEl>
@@ -28433,7 +29188,7 @@
                                         <p:tgtEl>
                                           <p:spTgt spid="3">
                                             <p:txEl>
-                                              <p:pRg st="1" end="1"/>
+                                              <p:pRg st="2" end="2"/>
                                             </p:txEl>
                                           </p:spTgt>
                                         </p:tgtEl>
@@ -28460,7 +29215,7 @@
                                         <p:tgtEl>
                                           <p:spTgt spid="3">
                                             <p:txEl>
-                                              <p:pRg st="1" end="1"/>
+                                              <p:pRg st="2" end="2"/>
                                             </p:txEl>
                                           </p:spTgt>
                                         </p:tgtEl>
@@ -28505,12 +29260,242 @@
                               <p:par>
                                 <p:cTn id="33" presetID="42" presetClass="entr" presetSubtype="0" fill="hold" grpId="0" nodeType="clickEffect">
                                   <p:stCondLst>
+                                    <p:cond delay="1000"/>
+                                  </p:stCondLst>
+                                  <p:childTnLst>
+                                    <p:set>
+                                      <p:cBhvr>
+                                        <p:cTn id="34" dur="1" fill="hold">
+                                          <p:stCondLst>
+                                            <p:cond delay="0"/>
+                                          </p:stCondLst>
+                                        </p:cTn>
+                                        <p:tgtEl>
+                                          <p:spTgt spid="3">
+                                            <p:txEl>
+                                              <p:pRg st="4" end="4"/>
+                                            </p:txEl>
+                                          </p:spTgt>
+                                        </p:tgtEl>
+                                        <p:attrNameLst>
+                                          <p:attrName>style.visibility</p:attrName>
+                                        </p:attrNameLst>
+                                      </p:cBhvr>
+                                      <p:to>
+                                        <p:strVal val="visible"/>
+                                      </p:to>
+                                    </p:set>
+                                    <p:animEffect transition="in" filter="fade">
+                                      <p:cBhvr>
+                                        <p:cTn id="35" dur="1000"/>
+                                        <p:tgtEl>
+                                          <p:spTgt spid="3">
+                                            <p:txEl>
+                                              <p:pRg st="4" end="4"/>
+                                            </p:txEl>
+                                          </p:spTgt>
+                                        </p:tgtEl>
+                                      </p:cBhvr>
+                                    </p:animEffect>
+                                    <p:anim calcmode="lin" valueType="num">
+                                      <p:cBhvr>
+                                        <p:cTn id="36" dur="1000" fill="hold"/>
+                                        <p:tgtEl>
+                                          <p:spTgt spid="3">
+                                            <p:txEl>
+                                              <p:pRg st="4" end="4"/>
+                                            </p:txEl>
+                                          </p:spTgt>
+                                        </p:tgtEl>
+                                        <p:attrNameLst>
+                                          <p:attrName>ppt_x</p:attrName>
+                                        </p:attrNameLst>
+                                      </p:cBhvr>
+                                      <p:tavLst>
+                                        <p:tav tm="0">
+                                          <p:val>
+                                            <p:strVal val="#ppt_x"/>
+                                          </p:val>
+                                        </p:tav>
+                                        <p:tav tm="100000">
+                                          <p:val>
+                                            <p:strVal val="#ppt_x"/>
+                                          </p:val>
+                                        </p:tav>
+                                      </p:tavLst>
+                                    </p:anim>
+                                    <p:anim calcmode="lin" valueType="num">
+                                      <p:cBhvr>
+                                        <p:cTn id="37" dur="1000" fill="hold"/>
+                                        <p:tgtEl>
+                                          <p:spTgt spid="3">
+                                            <p:txEl>
+                                              <p:pRg st="4" end="4"/>
+                                            </p:txEl>
+                                          </p:spTgt>
+                                        </p:tgtEl>
+                                        <p:attrNameLst>
+                                          <p:attrName>ppt_y</p:attrName>
+                                        </p:attrNameLst>
+                                      </p:cBhvr>
+                                      <p:tavLst>
+                                        <p:tav tm="0">
+                                          <p:val>
+                                            <p:strVal val="#ppt_y+.1"/>
+                                          </p:val>
+                                        </p:tav>
+                                        <p:tav tm="100000">
+                                          <p:val>
+                                            <p:strVal val="#ppt_y"/>
+                                          </p:val>
+                                        </p:tav>
+                                      </p:tavLst>
+                                    </p:anim>
+                                  </p:childTnLst>
+                                </p:cTn>
+                              </p:par>
+                            </p:childTnLst>
+                          </p:cTn>
+                        </p:par>
+                      </p:childTnLst>
+                    </p:cTn>
+                  </p:par>
+                  <p:par>
+                    <p:cTn id="38" fill="hold">
+                      <p:stCondLst>
+                        <p:cond delay="indefinite"/>
+                      </p:stCondLst>
+                      <p:childTnLst>
+                        <p:par>
+                          <p:cTn id="39" fill="hold">
+                            <p:stCondLst>
+                              <p:cond delay="0"/>
+                            </p:stCondLst>
+                            <p:childTnLst>
+                              <p:par>
+                                <p:cTn id="40" presetID="42" presetClass="entr" presetSubtype="0" fill="hold" grpId="0" nodeType="clickEffect">
+                                  <p:stCondLst>
+                                    <p:cond delay="1000"/>
+                                  </p:stCondLst>
+                                  <p:childTnLst>
+                                    <p:set>
+                                      <p:cBhvr>
+                                        <p:cTn id="41" dur="1" fill="hold">
+                                          <p:stCondLst>
+                                            <p:cond delay="0"/>
+                                          </p:stCondLst>
+                                        </p:cTn>
+                                        <p:tgtEl>
+                                          <p:spTgt spid="3">
+                                            <p:txEl>
+                                              <p:pRg st="6" end="6"/>
+                                            </p:txEl>
+                                          </p:spTgt>
+                                        </p:tgtEl>
+                                        <p:attrNameLst>
+                                          <p:attrName>style.visibility</p:attrName>
+                                        </p:attrNameLst>
+                                      </p:cBhvr>
+                                      <p:to>
+                                        <p:strVal val="visible"/>
+                                      </p:to>
+                                    </p:set>
+                                    <p:animEffect transition="in" filter="fade">
+                                      <p:cBhvr>
+                                        <p:cTn id="42" dur="1000"/>
+                                        <p:tgtEl>
+                                          <p:spTgt spid="3">
+                                            <p:txEl>
+                                              <p:pRg st="6" end="6"/>
+                                            </p:txEl>
+                                          </p:spTgt>
+                                        </p:tgtEl>
+                                      </p:cBhvr>
+                                    </p:animEffect>
+                                    <p:anim calcmode="lin" valueType="num">
+                                      <p:cBhvr>
+                                        <p:cTn id="43" dur="1000" fill="hold"/>
+                                        <p:tgtEl>
+                                          <p:spTgt spid="3">
+                                            <p:txEl>
+                                              <p:pRg st="6" end="6"/>
+                                            </p:txEl>
+                                          </p:spTgt>
+                                        </p:tgtEl>
+                                        <p:attrNameLst>
+                                          <p:attrName>ppt_x</p:attrName>
+                                        </p:attrNameLst>
+                                      </p:cBhvr>
+                                      <p:tavLst>
+                                        <p:tav tm="0">
+                                          <p:val>
+                                            <p:strVal val="#ppt_x"/>
+                                          </p:val>
+                                        </p:tav>
+                                        <p:tav tm="100000">
+                                          <p:val>
+                                            <p:strVal val="#ppt_x"/>
+                                          </p:val>
+                                        </p:tav>
+                                      </p:tavLst>
+                                    </p:anim>
+                                    <p:anim calcmode="lin" valueType="num">
+                                      <p:cBhvr>
+                                        <p:cTn id="44" dur="1000" fill="hold"/>
+                                        <p:tgtEl>
+                                          <p:spTgt spid="3">
+                                            <p:txEl>
+                                              <p:pRg st="6" end="6"/>
+                                            </p:txEl>
+                                          </p:spTgt>
+                                        </p:tgtEl>
+                                        <p:attrNameLst>
+                                          <p:attrName>ppt_y</p:attrName>
+                                        </p:attrNameLst>
+                                      </p:cBhvr>
+                                      <p:tavLst>
+                                        <p:tav tm="0">
+                                          <p:val>
+                                            <p:strVal val="#ppt_y+.1"/>
+                                          </p:val>
+                                        </p:tav>
+                                        <p:tav tm="100000">
+                                          <p:val>
+                                            <p:strVal val="#ppt_y"/>
+                                          </p:val>
+                                        </p:tav>
+                                      </p:tavLst>
+                                    </p:anim>
+                                  </p:childTnLst>
+                                </p:cTn>
+                              </p:par>
+                            </p:childTnLst>
+                          </p:cTn>
+                        </p:par>
+                      </p:childTnLst>
+                    </p:cTn>
+                  </p:par>
+                  <p:par>
+                    <p:cTn id="45" fill="hold">
+                      <p:stCondLst>
+                        <p:cond delay="indefinite"/>
+                      </p:stCondLst>
+                      <p:childTnLst>
+                        <p:par>
+                          <p:cTn id="46" fill="hold">
+                            <p:stCondLst>
+                              <p:cond delay="0"/>
+                            </p:stCondLst>
+                            <p:childTnLst>
+                              <p:par>
+                                <p:cTn id="47" presetID="42" presetClass="entr" presetSubtype="0" fill="hold" grpId="0" nodeType="clickEffect">
+                                  <p:stCondLst>
                                     <p:cond delay="0"/>
                                   </p:stCondLst>
                                   <p:childTnLst>
                                     <p:set>
                                       <p:cBhvr>
-                                        <p:cTn id="34" dur="1" fill="hold">
+                                        <p:cTn id="48" dur="1" fill="hold">
                                           <p:stCondLst>
                                             <p:cond delay="0"/>
                                           </p:stCondLst>
@@ -28528,7 +29513,7 @@
                                     </p:set>
                                     <p:animEffect transition="in" filter="fade">
                                       <p:cBhvr>
-                                        <p:cTn id="35" dur="1000"/>
+                                        <p:cTn id="49" dur="1000"/>
                                         <p:tgtEl>
                                           <p:spTgt spid="5"/>
                                         </p:tgtEl>
@@ -28536,7 +29521,7 @@
                                     </p:animEffect>
                                     <p:anim calcmode="lin" valueType="num">
                                       <p:cBhvr>
-                                        <p:cTn id="36" dur="1000" fill="hold"/>
+                                        <p:cTn id="50" dur="1000" fill="hold"/>
                                         <p:tgtEl>
                                           <p:spTgt spid="5"/>
                                         </p:tgtEl>
@@ -28559,7 +29544,7 @@
                                     </p:anim>
                                     <p:anim calcmode="lin" valueType="num">
                                       <p:cBhvr>
-                                        <p:cTn id="37" dur="1000" fill="hold"/>
+                                        <p:cTn id="51" dur="1000" fill="hold"/>
                                         <p:tgtEl>
                                           <p:spTgt spid="5"/>
                                         </p:tgtEl>
@@ -28584,14 +29569,14 @@
                                 </p:cTn>
                               </p:par>
                               <p:par>
-                                <p:cTn id="38" presetID="42" presetClass="entr" presetSubtype="0" fill="hold" grpId="0" nodeType="withEffect">
+                                <p:cTn id="52" presetID="42" presetClass="entr" presetSubtype="0" fill="hold" grpId="0" nodeType="withEffect">
                                   <p:stCondLst>
                                     <p:cond delay="0"/>
                                   </p:stCondLst>
                                   <p:childTnLst>
                                     <p:set>
                                       <p:cBhvr>
-                                        <p:cTn id="39" dur="1" fill="hold">
+                                        <p:cTn id="53" dur="1" fill="hold">
                                           <p:stCondLst>
                                             <p:cond delay="0"/>
                                           </p:stCondLst>
@@ -28609,7 +29594,7 @@
                                     </p:set>
                                     <p:animEffect transition="in" filter="fade">
                                       <p:cBhvr>
-                                        <p:cTn id="40" dur="1000"/>
+                                        <p:cTn id="54" dur="1000"/>
                                         <p:tgtEl>
                                           <p:spTgt spid="6"/>
                                         </p:tgtEl>
@@ -28617,7 +29602,7 @@
                                     </p:animEffect>
                                     <p:anim calcmode="lin" valueType="num">
                                       <p:cBhvr>
-                                        <p:cTn id="41" dur="1000" fill="hold"/>
+                                        <p:cTn id="55" dur="1000" fill="hold"/>
                                         <p:tgtEl>
                                           <p:spTgt spid="6"/>
                                         </p:tgtEl>
@@ -28640,7 +29625,7 @@
                                     </p:anim>
                                     <p:anim calcmode="lin" valueType="num">
                                       <p:cBhvr>
-                                        <p:cTn id="42" dur="1000" fill="hold"/>
+                                        <p:cTn id="56" dur="1000" fill="hold"/>
                                         <p:tgtEl>
                                           <p:spTgt spid="6"/>
                                         </p:tgtEl>

</xml_diff>